<commit_message>
Fixed some details, added Use case example, improved sequence diagram
</commit_message>
<xml_diff>
--- a/docs/images/openbaton-stencils.pptx
+++ b/docs/images/openbaton-stencils.pptx
@@ -9,6 +9,8 @@
     <p:sldId id="257" r:id="rId3"/>
     <p:sldId id="258" r:id="rId4"/>
     <p:sldId id="259" r:id="rId5"/>
+    <p:sldId id="261" r:id="rId6"/>
+    <p:sldId id="260" r:id="rId7"/>
   </p:sldIdLst>
   <p:sldSz cx="9144000" cy="6858000" type="screen4x3"/>
   <p:notesSz cx="6858000" cy="9144000"/>
@@ -7876,8 +7878,8 @@
         </p:nvSpPr>
         <p:spPr>
           <a:xfrm>
-            <a:off x="2401147" y="279373"/>
-            <a:ext cx="1273343" cy="369332"/>
+            <a:off x="2459329" y="279373"/>
+            <a:ext cx="1031415" cy="307777"/>
           </a:xfrm>
           <a:prstGeom prst="rect">
             <a:avLst/>
@@ -7891,10 +7893,10 @@
           <a:lstStyle/>
           <a:p>
             <a:r>
-              <a:rPr lang="en-US" dirty="0" smtClean="0"/>
+              <a:rPr lang="en-US" sz="1400" dirty="0" smtClean="0"/>
               <a:t>INSTATIATE</a:t>
             </a:r>
-            <a:endParaRPr lang="en-US" dirty="0"/>
+            <a:endParaRPr lang="en-US" sz="1400" dirty="0"/>
           </a:p>
         </p:txBody>
       </p:sp>
@@ -8047,8 +8049,8 @@
         </p:nvSpPr>
         <p:spPr>
           <a:xfrm>
-            <a:off x="2049496" y="982317"/>
-            <a:ext cx="2081820" cy="369332"/>
+            <a:off x="2144921" y="982317"/>
+            <a:ext cx="1660230" cy="307777"/>
           </a:xfrm>
           <a:prstGeom prst="rect">
             <a:avLst/>
@@ -8062,10 +8064,10 @@
           <a:lstStyle/>
           <a:p>
             <a:r>
-              <a:rPr lang="en-US" dirty="0" smtClean="0"/>
+              <a:rPr lang="en-US" sz="1400" dirty="0" smtClean="0"/>
               <a:t>GRANT_OPERATION</a:t>
             </a:r>
-            <a:endParaRPr lang="en-US" dirty="0"/>
+            <a:endParaRPr lang="en-US" sz="1400" dirty="0"/>
           </a:p>
         </p:txBody>
       </p:sp>
@@ -8139,8 +8141,8 @@
         </p:nvSpPr>
         <p:spPr>
           <a:xfrm>
-            <a:off x="1948988" y="1590142"/>
-            <a:ext cx="2374192" cy="369332"/>
+            <a:off x="2031221" y="1590142"/>
+            <a:ext cx="1887631" cy="307777"/>
           </a:xfrm>
           <a:prstGeom prst="rect">
             <a:avLst/>
@@ -8154,10 +8156,10 @@
           <a:lstStyle/>
           <a:p>
             <a:r>
-              <a:rPr lang="en-US" dirty="0" smtClean="0"/>
+              <a:rPr lang="en-US" sz="1400" dirty="0" smtClean="0"/>
               <a:t>ALLOCATE_RESOURCES</a:t>
             </a:r>
-            <a:endParaRPr lang="en-US" dirty="0"/>
+            <a:endParaRPr lang="en-US" sz="1400" dirty="0"/>
           </a:p>
         </p:txBody>
       </p:sp>
@@ -8482,8 +8484,8 @@
         </p:nvSpPr>
         <p:spPr>
           <a:xfrm>
-            <a:off x="5224244" y="2073413"/>
-            <a:ext cx="2574029" cy="369332"/>
+            <a:off x="5343025" y="2119093"/>
+            <a:ext cx="2043060" cy="307777"/>
           </a:xfrm>
           <a:prstGeom prst="rect">
             <a:avLst/>
@@ -8497,10 +8499,10 @@
           <a:lstStyle/>
           <a:p>
             <a:r>
-              <a:rPr lang="en-US" dirty="0" smtClean="0"/>
+              <a:rPr lang="en-US" sz="1400" dirty="0" smtClean="0"/>
               <a:t>SAVE &amp; EXECUTE SCRIPTS</a:t>
             </a:r>
-            <a:endParaRPr lang="en-US" dirty="0"/>
+            <a:endParaRPr lang="en-US" sz="1400" dirty="0"/>
           </a:p>
         </p:txBody>
       </p:sp>
@@ -8856,8 +8858,8 @@
         </p:nvSpPr>
         <p:spPr>
           <a:xfrm>
-            <a:off x="5462691" y="3848778"/>
-            <a:ext cx="1881081" cy="369332"/>
+            <a:off x="5632799" y="3894458"/>
+            <a:ext cx="1463512" cy="307777"/>
           </a:xfrm>
           <a:prstGeom prst="rect">
             <a:avLst/>
@@ -8871,10 +8873,10 @@
           <a:lstStyle/>
           <a:p>
             <a:r>
-              <a:rPr lang="en-US" dirty="0" smtClean="0"/>
+              <a:rPr lang="en-US" sz="1400" dirty="0" smtClean="0"/>
               <a:t>EXECUTE SCRIPTS</a:t>
             </a:r>
-            <a:endParaRPr lang="en-US" dirty="0"/>
+            <a:endParaRPr lang="en-US" sz="1400" dirty="0"/>
           </a:p>
         </p:txBody>
       </p:sp>
@@ -9230,8 +9232,8 @@
         </p:nvSpPr>
         <p:spPr>
           <a:xfrm>
-            <a:off x="5496646" y="5244801"/>
-            <a:ext cx="1881081" cy="369332"/>
+            <a:off x="5632799" y="5290481"/>
+            <a:ext cx="1463512" cy="307777"/>
           </a:xfrm>
           <a:prstGeom prst="rect">
             <a:avLst/>
@@ -9245,10 +9247,10 @@
           <a:lstStyle/>
           <a:p>
             <a:r>
-              <a:rPr lang="en-US" dirty="0" smtClean="0"/>
+              <a:rPr lang="en-US" sz="1400" dirty="0" smtClean="0"/>
               <a:t>EXECUTE SCRIPTS</a:t>
             </a:r>
-            <a:endParaRPr lang="en-US" dirty="0"/>
+            <a:endParaRPr lang="en-US" sz="1400" dirty="0"/>
           </a:p>
         </p:txBody>
       </p:sp>
@@ -9283,10 +9285,2710 @@
           </a:effectLst>
         </p:spPr>
       </p:cxnSp>
+      <p:sp>
+        <p:nvSpPr>
+          <p:cNvPr id="106" name="TextBox 105"/>
+          <p:cNvSpPr txBox="1"/>
+          <p:nvPr/>
+        </p:nvSpPr>
+        <p:spPr>
+          <a:xfrm>
+            <a:off x="2641615" y="3719261"/>
+            <a:ext cx="787395" cy="307777"/>
+          </a:xfrm>
+          <a:prstGeom prst="rect">
+            <a:avLst/>
+          </a:prstGeom>
+          <a:noFill/>
+        </p:spPr>
+        <p:txBody>
+          <a:bodyPr wrap="none" rtlCol="0">
+            <a:spAutoFit/>
+          </a:bodyPr>
+          <a:lstStyle/>
+          <a:p>
+            <a:r>
+              <a:rPr lang="en-US" sz="1400" dirty="0" smtClean="0"/>
+              <a:t>MODIFY</a:t>
+            </a:r>
+            <a:endParaRPr lang="en-US" sz="1400" dirty="0"/>
+          </a:p>
+        </p:txBody>
+      </p:sp>
+      <p:sp>
+        <p:nvSpPr>
+          <p:cNvPr id="107" name="TextBox 106"/>
+          <p:cNvSpPr txBox="1"/>
+          <p:nvPr/>
+        </p:nvSpPr>
+        <p:spPr>
+          <a:xfrm>
+            <a:off x="2713730" y="5107201"/>
+            <a:ext cx="646331" cy="307777"/>
+          </a:xfrm>
+          <a:prstGeom prst="rect">
+            <a:avLst/>
+          </a:prstGeom>
+          <a:noFill/>
+        </p:spPr>
+        <p:txBody>
+          <a:bodyPr wrap="none" rtlCol="0">
+            <a:spAutoFit/>
+          </a:bodyPr>
+          <a:lstStyle/>
+          <a:p>
+            <a:r>
+              <a:rPr lang="en-US" sz="1400" dirty="0" smtClean="0"/>
+              <a:t>START</a:t>
+            </a:r>
+            <a:endParaRPr lang="en-US" sz="1400" dirty="0"/>
+          </a:p>
+        </p:txBody>
+      </p:sp>
     </p:spTree>
     <p:extLst>
       <p:ext uri="{BB962C8B-B14F-4D97-AF65-F5344CB8AC3E}">
         <p14:creationId xmlns:p14="http://schemas.microsoft.com/office/powerpoint/2010/main" val="1805970862"/>
+      </p:ext>
+    </p:extLst>
+  </p:cSld>
+  <p:clrMapOvr>
+    <a:masterClrMapping/>
+  </p:clrMapOvr>
+</p:sld>
+</file>
+
+<file path=ppt/slides/slide5.xml><?xml version="1.0" encoding="utf-8"?>
+<p:sld xmlns:a="http://schemas.openxmlformats.org/drawingml/2006/main" xmlns:r="http://schemas.openxmlformats.org/officeDocument/2006/relationships" xmlns:p="http://schemas.openxmlformats.org/presentationml/2006/main">
+  <p:cSld>
+    <p:spTree>
+      <p:nvGrpSpPr>
+        <p:cNvPr id="1" name=""/>
+        <p:cNvGrpSpPr/>
+        <p:nvPr/>
+      </p:nvGrpSpPr>
+      <p:grpSpPr>
+        <a:xfrm>
+          <a:off x="0" y="0"/>
+          <a:ext cx="0" cy="0"/>
+          <a:chOff x="0" y="0"/>
+          <a:chExt cx="0" cy="0"/>
+        </a:xfrm>
+      </p:grpSpPr>
+      <p:grpSp>
+        <p:nvGrpSpPr>
+          <p:cNvPr id="11" name="Group 10"/>
+          <p:cNvGrpSpPr/>
+          <p:nvPr/>
+        </p:nvGrpSpPr>
+        <p:grpSpPr>
+          <a:xfrm>
+            <a:off x="719811" y="-328889"/>
+            <a:ext cx="1107618" cy="7053291"/>
+            <a:chOff x="719811" y="858819"/>
+            <a:chExt cx="1308636" cy="4997605"/>
+          </a:xfrm>
+        </p:grpSpPr>
+        <p:sp>
+          <p:nvSpPr>
+            <p:cNvPr id="5" name="Rounded Rectangle 4"/>
+            <p:cNvSpPr/>
+            <p:nvPr/>
+          </p:nvSpPr>
+          <p:spPr>
+            <a:xfrm>
+              <a:off x="719811" y="858819"/>
+              <a:ext cx="1308636" cy="338047"/>
+            </a:xfrm>
+            <a:prstGeom prst="roundRect">
+              <a:avLst/>
+            </a:prstGeom>
+            <a:solidFill>
+              <a:srgbClr val="E68F00"/>
+            </a:solidFill>
+            <a:ln w="6350" cap="flat" cmpd="sng" algn="ctr">
+              <a:noFill/>
+              <a:prstDash val="solid"/>
+              <a:round/>
+              <a:headEnd type="none" w="med" len="med"/>
+              <a:tailEnd type="none" w="med" len="med"/>
+            </a:ln>
+            <a:effectLst>
+              <a:outerShdw blurRad="190500" dist="25400" dir="2700000">
+                <a:srgbClr val="000000">
+                  <a:alpha val="43000"/>
+                </a:srgbClr>
+              </a:outerShdw>
+            </a:effectLst>
+          </p:spPr>
+          <p:txBody>
+            <a:bodyPr rtlCol="0" anchor="b"/>
+            <a:lstStyle/>
+            <a:p>
+              <a:pPr algn="ctr" defTabSz="914400" fontAlgn="auto">
+                <a:spcBef>
+                  <a:spcPts val="0"/>
+                </a:spcBef>
+                <a:spcAft>
+                  <a:spcPts val="0"/>
+                </a:spcAft>
+              </a:pPr>
+              <a:r>
+                <a:rPr lang="en-US" kern="0" dirty="0">
+                  <a:solidFill>
+                    <a:schemeClr val="bg1"/>
+                  </a:solidFill>
+                  <a:latin typeface="Tahoma"/>
+                  <a:ea typeface="+mn-ea"/>
+                </a:rPr>
+                <a:t>NFVO</a:t>
+              </a:r>
+            </a:p>
+          </p:txBody>
+        </p:sp>
+        <p:cxnSp>
+          <p:nvCxnSpPr>
+            <p:cNvPr id="8" name="Elbow Connector 21"/>
+            <p:cNvCxnSpPr>
+              <a:stCxn id="5" idx="2"/>
+            </p:cNvCxnSpPr>
+            <p:nvPr/>
+          </p:nvCxnSpPr>
+          <p:spPr>
+            <a:xfrm>
+              <a:off x="1374129" y="1196866"/>
+              <a:ext cx="0" cy="4659558"/>
+            </a:xfrm>
+            <a:prstGeom prst="straightConnector1">
+              <a:avLst/>
+            </a:prstGeom>
+            <a:ln w="25400">
+              <a:solidFill>
+                <a:srgbClr val="E68F00"/>
+              </a:solidFill>
+              <a:headEnd type="none" w="med" len="med"/>
+              <a:tailEnd type="none" w="med" len="med"/>
+            </a:ln>
+          </p:spPr>
+          <p:style>
+            <a:lnRef idx="2">
+              <a:schemeClr val="accent4"/>
+            </a:lnRef>
+            <a:fillRef idx="1">
+              <a:schemeClr val="lt1"/>
+            </a:fillRef>
+            <a:effectRef idx="0">
+              <a:schemeClr val="accent4"/>
+            </a:effectRef>
+            <a:fontRef idx="minor">
+              <a:schemeClr val="dk1"/>
+            </a:fontRef>
+          </p:style>
+        </p:cxnSp>
+      </p:grpSp>
+      <p:grpSp>
+        <p:nvGrpSpPr>
+          <p:cNvPr id="19" name="Group 18"/>
+          <p:cNvGrpSpPr/>
+          <p:nvPr/>
+        </p:nvGrpSpPr>
+        <p:grpSpPr>
+          <a:xfrm>
+            <a:off x="4131316" y="-392845"/>
+            <a:ext cx="1331375" cy="7117247"/>
+            <a:chOff x="3502176" y="875106"/>
+            <a:chExt cx="1935747" cy="4981318"/>
+          </a:xfrm>
+        </p:grpSpPr>
+        <p:sp>
+          <p:nvSpPr>
+            <p:cNvPr id="4" name="Rounded Rectangle 3"/>
+            <p:cNvSpPr/>
+            <p:nvPr/>
+          </p:nvSpPr>
+          <p:spPr>
+            <a:xfrm>
+              <a:off x="3502176" y="875106"/>
+              <a:ext cx="1935747" cy="472425"/>
+            </a:xfrm>
+            <a:prstGeom prst="roundRect">
+              <a:avLst/>
+            </a:prstGeom>
+            <a:solidFill>
+              <a:srgbClr val="E68F00"/>
+            </a:solidFill>
+            <a:ln w="6350" cap="flat" cmpd="sng" algn="ctr">
+              <a:noFill/>
+              <a:prstDash val="solid"/>
+              <a:round/>
+              <a:headEnd type="none" w="med" len="med"/>
+              <a:tailEnd type="none" w="med" len="med"/>
+            </a:ln>
+            <a:effectLst>
+              <a:outerShdw blurRad="190500" dist="25400" dir="2700000">
+                <a:srgbClr val="000000">
+                  <a:alpha val="43000"/>
+                </a:srgbClr>
+              </a:outerShdw>
+            </a:effectLst>
+          </p:spPr>
+          <p:txBody>
+            <a:bodyPr rtlCol="0" anchor="b"/>
+            <a:lstStyle/>
+            <a:p>
+              <a:pPr algn="ctr"/>
+              <a:r>
+                <a:rPr lang="en-US" kern="0" dirty="0" smtClean="0">
+                  <a:solidFill>
+                    <a:schemeClr val="bg1"/>
+                  </a:solidFill>
+                  <a:latin typeface="Tahoma"/>
+                </a:rPr>
+                <a:t>Generic VNFM</a:t>
+              </a:r>
+              <a:endParaRPr lang="en-US" kern="0" dirty="0">
+                <a:solidFill>
+                  <a:schemeClr val="bg1"/>
+                </a:solidFill>
+                <a:latin typeface="Tahoma"/>
+              </a:endParaRPr>
+            </a:p>
+          </p:txBody>
+        </p:sp>
+        <p:cxnSp>
+          <p:nvCxnSpPr>
+            <p:cNvPr id="12" name="Elbow Connector 21"/>
+            <p:cNvCxnSpPr>
+              <a:stCxn id="4" idx="2"/>
+            </p:cNvCxnSpPr>
+            <p:nvPr/>
+          </p:nvCxnSpPr>
+          <p:spPr>
+            <a:xfrm>
+              <a:off x="4470050" y="1347531"/>
+              <a:ext cx="0" cy="4508893"/>
+            </a:xfrm>
+            <a:prstGeom prst="straightConnector1">
+              <a:avLst/>
+            </a:prstGeom>
+            <a:ln w="25400">
+              <a:solidFill>
+                <a:srgbClr val="E68F00"/>
+              </a:solidFill>
+              <a:headEnd type="none" w="med" len="med"/>
+              <a:tailEnd type="none" w="med" len="med"/>
+            </a:ln>
+          </p:spPr>
+          <p:style>
+            <a:lnRef idx="2">
+              <a:schemeClr val="accent4"/>
+            </a:lnRef>
+            <a:fillRef idx="1">
+              <a:schemeClr val="lt1"/>
+            </a:fillRef>
+            <a:effectRef idx="0">
+              <a:schemeClr val="accent4"/>
+            </a:effectRef>
+            <a:fontRef idx="minor">
+              <a:schemeClr val="dk1"/>
+            </a:fontRef>
+          </p:style>
+        </p:cxnSp>
+      </p:grpSp>
+      <p:grpSp>
+        <p:nvGrpSpPr>
+          <p:cNvPr id="18" name="Group 17"/>
+          <p:cNvGrpSpPr/>
+          <p:nvPr/>
+        </p:nvGrpSpPr>
+        <p:grpSpPr>
+          <a:xfrm>
+            <a:off x="7455912" y="-392843"/>
+            <a:ext cx="1149670" cy="7117245"/>
+            <a:chOff x="6669835" y="858819"/>
+            <a:chExt cx="1935747" cy="4997605"/>
+          </a:xfrm>
+        </p:grpSpPr>
+        <p:sp>
+          <p:nvSpPr>
+            <p:cNvPr id="7" name="Rounded Rectangle 6"/>
+            <p:cNvSpPr/>
+            <p:nvPr/>
+          </p:nvSpPr>
+          <p:spPr>
+            <a:xfrm>
+              <a:off x="6669835" y="858819"/>
+              <a:ext cx="1935747" cy="473969"/>
+            </a:xfrm>
+            <a:prstGeom prst="roundRect">
+              <a:avLst/>
+            </a:prstGeom>
+            <a:solidFill>
+              <a:srgbClr val="E68F00"/>
+            </a:solidFill>
+            <a:ln w="6350" cap="flat" cmpd="sng" algn="ctr">
+              <a:noFill/>
+              <a:prstDash val="solid"/>
+              <a:round/>
+              <a:headEnd type="none" w="med" len="med"/>
+              <a:tailEnd type="none" w="med" len="med"/>
+            </a:ln>
+            <a:effectLst>
+              <a:outerShdw blurRad="190500" dist="25400" dir="2700000">
+                <a:srgbClr val="000000">
+                  <a:alpha val="43000"/>
+                </a:srgbClr>
+              </a:outerShdw>
+            </a:effectLst>
+          </p:spPr>
+          <p:txBody>
+            <a:bodyPr rtlCol="0" anchor="b"/>
+            <a:lstStyle/>
+            <a:p>
+              <a:pPr algn="ctr"/>
+              <a:r>
+                <a:rPr lang="en-US" kern="0" dirty="0" smtClean="0">
+                  <a:solidFill>
+                    <a:schemeClr val="bg1"/>
+                  </a:solidFill>
+                  <a:latin typeface="Tahoma"/>
+                </a:rPr>
+                <a:t>Generic </a:t>
+              </a:r>
+              <a:r>
+                <a:rPr lang="en-US" kern="0" dirty="0" smtClean="0">
+                  <a:solidFill>
+                    <a:schemeClr val="bg1"/>
+                  </a:solidFill>
+                  <a:latin typeface="Tahoma"/>
+                </a:rPr>
+                <a:t>EMS</a:t>
+              </a:r>
+              <a:endParaRPr lang="en-US" kern="0" dirty="0">
+                <a:solidFill>
+                  <a:schemeClr val="bg1"/>
+                </a:solidFill>
+                <a:latin typeface="Tahoma"/>
+              </a:endParaRPr>
+            </a:p>
+          </p:txBody>
+        </p:sp>
+        <p:cxnSp>
+          <p:nvCxnSpPr>
+            <p:cNvPr id="15" name="Elbow Connector 21"/>
+            <p:cNvCxnSpPr>
+              <a:stCxn id="7" idx="2"/>
+            </p:cNvCxnSpPr>
+            <p:nvPr/>
+          </p:nvCxnSpPr>
+          <p:spPr>
+            <a:xfrm>
+              <a:off x="7637709" y="1332788"/>
+              <a:ext cx="0" cy="4523636"/>
+            </a:xfrm>
+            <a:prstGeom prst="straightConnector1">
+              <a:avLst/>
+            </a:prstGeom>
+            <a:ln w="25400">
+              <a:solidFill>
+                <a:srgbClr val="E68F00"/>
+              </a:solidFill>
+              <a:headEnd type="none" w="med" len="med"/>
+              <a:tailEnd type="none" w="med" len="med"/>
+            </a:ln>
+          </p:spPr>
+          <p:style>
+            <a:lnRef idx="2">
+              <a:schemeClr val="accent4"/>
+            </a:lnRef>
+            <a:fillRef idx="1">
+              <a:schemeClr val="lt1"/>
+            </a:fillRef>
+            <a:effectRef idx="0">
+              <a:schemeClr val="accent4"/>
+            </a:effectRef>
+            <a:fontRef idx="minor">
+              <a:schemeClr val="dk1"/>
+            </a:fontRef>
+          </p:style>
+        </p:cxnSp>
+      </p:grpSp>
+      <p:sp>
+        <p:nvSpPr>
+          <p:cNvPr id="30" name="TextBox 29"/>
+          <p:cNvSpPr txBox="1"/>
+          <p:nvPr/>
+        </p:nvSpPr>
+        <p:spPr>
+          <a:xfrm>
+            <a:off x="2519605" y="279373"/>
+            <a:ext cx="1031415" cy="307777"/>
+          </a:xfrm>
+          <a:prstGeom prst="rect">
+            <a:avLst/>
+          </a:prstGeom>
+          <a:noFill/>
+        </p:spPr>
+        <p:txBody>
+          <a:bodyPr wrap="none" rtlCol="0">
+            <a:spAutoFit/>
+          </a:bodyPr>
+          <a:lstStyle/>
+          <a:p>
+            <a:r>
+              <a:rPr lang="en-US" sz="1400" dirty="0" smtClean="0"/>
+              <a:t>INSTATIATE</a:t>
+            </a:r>
+            <a:endParaRPr lang="en-US" sz="1400" dirty="0"/>
+          </a:p>
+        </p:txBody>
+      </p:sp>
+      <p:cxnSp>
+        <p:nvCxnSpPr>
+          <p:cNvPr id="31" name="Straight Connector 30"/>
+          <p:cNvCxnSpPr/>
+          <p:nvPr/>
+        </p:nvCxnSpPr>
+        <p:spPr>
+          <a:xfrm>
+            <a:off x="1273620" y="648705"/>
+            <a:ext cx="3523384" cy="0"/>
+          </a:xfrm>
+          <a:prstGeom prst="line">
+            <a:avLst/>
+          </a:prstGeom>
+          <a:noFill/>
+          <a:ln w="15875" cap="flat" cmpd="sng" algn="ctr">
+            <a:solidFill>
+              <a:srgbClr val="009473"/>
+            </a:solidFill>
+            <a:prstDash val="solid"/>
+            <a:tailEnd type="triangle" w="med" len="sm"/>
+          </a:ln>
+          <a:effectLst>
+            <a:outerShdw blurRad="50800" dist="38100" dir="2700000" algn="tl" rotWithShape="0">
+              <a:prstClr val="black">
+                <a:alpha val="40000"/>
+              </a:prstClr>
+            </a:outerShdw>
+          </a:effectLst>
+        </p:spPr>
+      </p:cxnSp>
+      <p:sp>
+        <p:nvSpPr>
+          <p:cNvPr id="59" name="Rounded Rectangle 58"/>
+          <p:cNvSpPr/>
+          <p:nvPr/>
+        </p:nvSpPr>
+        <p:spPr>
+          <a:xfrm>
+            <a:off x="4678559" y="757439"/>
+            <a:ext cx="236889" cy="490380"/>
+          </a:xfrm>
+          <a:prstGeom prst="roundRect">
+            <a:avLst>
+              <a:gd name="adj" fmla="val 8225"/>
+            </a:avLst>
+          </a:prstGeom>
+          <a:solidFill>
+            <a:srgbClr val="009473"/>
+          </a:solidFill>
+          <a:ln w="6350" cap="flat" cmpd="sng" algn="ctr">
+            <a:noFill/>
+            <a:prstDash val="solid"/>
+            <a:round/>
+            <a:headEnd type="none" w="med" len="med"/>
+            <a:tailEnd type="none" w="med" len="med"/>
+          </a:ln>
+          <a:effectLst>
+            <a:outerShdw blurRad="190500" dist="25400" dir="2700000">
+              <a:srgbClr val="000000">
+                <a:alpha val="43000"/>
+              </a:srgbClr>
+            </a:outerShdw>
+          </a:effectLst>
+        </p:spPr>
+        <p:txBody>
+          <a:bodyPr rtlCol="0" anchor="ctr"/>
+          <a:lstStyle/>
+          <a:p>
+            <a:pPr algn="ctr" defTabSz="914400"/>
+            <a:endParaRPr lang="en-US" sz="1400" kern="0" dirty="0">
+              <a:solidFill>
+                <a:prstClr val="white"/>
+              </a:solidFill>
+              <a:latin typeface="Tahoma"/>
+              <a:ea typeface="ＭＳ Ｐゴシック" pitchFamily="46" charset="-128"/>
+            </a:endParaRPr>
+          </a:p>
+        </p:txBody>
+      </p:sp>
+      <p:sp>
+        <p:nvSpPr>
+          <p:cNvPr id="60" name="TextBox 59"/>
+          <p:cNvSpPr txBox="1"/>
+          <p:nvPr/>
+        </p:nvSpPr>
+        <p:spPr>
+          <a:xfrm>
+            <a:off x="4915448" y="832320"/>
+            <a:ext cx="928459" cy="276999"/>
+          </a:xfrm>
+          <a:prstGeom prst="rect">
+            <a:avLst/>
+          </a:prstGeom>
+          <a:noFill/>
+        </p:spPr>
+        <p:txBody>
+          <a:bodyPr wrap="none" rtlCol="0">
+            <a:spAutoFit/>
+          </a:bodyPr>
+          <a:lstStyle/>
+          <a:p>
+            <a:r>
+              <a:rPr lang="en-US" sz="1200" dirty="0" err="1" smtClean="0"/>
+              <a:t>createVNFR</a:t>
+            </a:r>
+            <a:endParaRPr lang="en-US" sz="1200" dirty="0"/>
+          </a:p>
+        </p:txBody>
+      </p:sp>
+      <p:cxnSp>
+        <p:nvCxnSpPr>
+          <p:cNvPr id="61" name="Straight Connector 60"/>
+          <p:cNvCxnSpPr/>
+          <p:nvPr/>
+        </p:nvCxnSpPr>
+        <p:spPr>
+          <a:xfrm flipH="1">
+            <a:off x="1273620" y="1349303"/>
+            <a:ext cx="3523385" cy="0"/>
+          </a:xfrm>
+          <a:prstGeom prst="line">
+            <a:avLst/>
+          </a:prstGeom>
+          <a:noFill/>
+          <a:ln w="15875" cap="flat" cmpd="sng" algn="ctr">
+            <a:solidFill>
+              <a:srgbClr val="009473"/>
+            </a:solidFill>
+            <a:prstDash val="solid"/>
+            <a:tailEnd type="triangle" w="med" len="sm"/>
+          </a:ln>
+          <a:effectLst>
+            <a:outerShdw blurRad="50800" dist="38100" dir="2700000" algn="tl" rotWithShape="0">
+              <a:prstClr val="black">
+                <a:alpha val="40000"/>
+              </a:prstClr>
+            </a:outerShdw>
+          </a:effectLst>
+        </p:spPr>
+      </p:cxnSp>
+      <p:sp>
+        <p:nvSpPr>
+          <p:cNvPr id="66" name="TextBox 65"/>
+          <p:cNvSpPr txBox="1"/>
+          <p:nvPr/>
+        </p:nvSpPr>
+        <p:spPr>
+          <a:xfrm>
+            <a:off x="2205197" y="982317"/>
+            <a:ext cx="1660230" cy="307777"/>
+          </a:xfrm>
+          <a:prstGeom prst="rect">
+            <a:avLst/>
+          </a:prstGeom>
+          <a:noFill/>
+        </p:spPr>
+        <p:txBody>
+          <a:bodyPr wrap="none" rtlCol="0">
+            <a:spAutoFit/>
+          </a:bodyPr>
+          <a:lstStyle/>
+          <a:p>
+            <a:r>
+              <a:rPr lang="en-US" sz="1400" dirty="0" smtClean="0"/>
+              <a:t>GRANT_OPERATION</a:t>
+            </a:r>
+            <a:endParaRPr lang="en-US" sz="1400" dirty="0"/>
+          </a:p>
+        </p:txBody>
+      </p:sp>
+      <p:cxnSp>
+        <p:nvCxnSpPr>
+          <p:cNvPr id="67" name="Straight Connector 66"/>
+          <p:cNvCxnSpPr/>
+          <p:nvPr/>
+        </p:nvCxnSpPr>
+        <p:spPr>
+          <a:xfrm>
+            <a:off x="1273621" y="1550298"/>
+            <a:ext cx="3523384" cy="0"/>
+          </a:xfrm>
+          <a:prstGeom prst="line">
+            <a:avLst/>
+          </a:prstGeom>
+          <a:noFill/>
+          <a:ln w="15875" cap="flat" cmpd="sng" algn="ctr">
+            <a:solidFill>
+              <a:srgbClr val="009473"/>
+            </a:solidFill>
+            <a:prstDash val="solid"/>
+            <a:tailEnd type="triangle" w="med" len="sm"/>
+          </a:ln>
+          <a:effectLst>
+            <a:outerShdw blurRad="50800" dist="38100" dir="2700000" algn="tl" rotWithShape="0">
+              <a:prstClr val="black">
+                <a:alpha val="40000"/>
+              </a:prstClr>
+            </a:outerShdw>
+          </a:effectLst>
+        </p:spPr>
+      </p:cxnSp>
+      <p:cxnSp>
+        <p:nvCxnSpPr>
+          <p:cNvPr id="69" name="Straight Connector 68"/>
+          <p:cNvCxnSpPr/>
+          <p:nvPr/>
+        </p:nvCxnSpPr>
+        <p:spPr>
+          <a:xfrm flipH="1">
+            <a:off x="1273619" y="1938856"/>
+            <a:ext cx="3523385" cy="0"/>
+          </a:xfrm>
+          <a:prstGeom prst="line">
+            <a:avLst/>
+          </a:prstGeom>
+          <a:noFill/>
+          <a:ln w="15875" cap="flat" cmpd="sng" algn="ctr">
+            <a:solidFill>
+              <a:srgbClr val="009473"/>
+            </a:solidFill>
+            <a:prstDash val="solid"/>
+            <a:tailEnd type="triangle" w="med" len="sm"/>
+          </a:ln>
+          <a:effectLst>
+            <a:outerShdw blurRad="50800" dist="38100" dir="2700000" algn="tl" rotWithShape="0">
+              <a:prstClr val="black">
+                <a:alpha val="40000"/>
+              </a:prstClr>
+            </a:outerShdw>
+          </a:effectLst>
+        </p:spPr>
+      </p:cxnSp>
+      <p:sp>
+        <p:nvSpPr>
+          <p:cNvPr id="70" name="TextBox 69"/>
+          <p:cNvSpPr txBox="1"/>
+          <p:nvPr/>
+        </p:nvSpPr>
+        <p:spPr>
+          <a:xfrm>
+            <a:off x="2091497" y="1590142"/>
+            <a:ext cx="1887631" cy="307777"/>
+          </a:xfrm>
+          <a:prstGeom prst="rect">
+            <a:avLst/>
+          </a:prstGeom>
+          <a:noFill/>
+        </p:spPr>
+        <p:txBody>
+          <a:bodyPr wrap="none" rtlCol="0">
+            <a:spAutoFit/>
+          </a:bodyPr>
+          <a:lstStyle/>
+          <a:p>
+            <a:r>
+              <a:rPr lang="en-US" sz="1400" dirty="0" smtClean="0"/>
+              <a:t>ALLOCATE_RESOURCES</a:t>
+            </a:r>
+            <a:endParaRPr lang="en-US" sz="1400" dirty="0"/>
+          </a:p>
+        </p:txBody>
+      </p:sp>
+      <p:cxnSp>
+        <p:nvCxnSpPr>
+          <p:cNvPr id="71" name="Straight Connector 70"/>
+          <p:cNvCxnSpPr/>
+          <p:nvPr/>
+        </p:nvCxnSpPr>
+        <p:spPr>
+          <a:xfrm>
+            <a:off x="1273620" y="2139851"/>
+            <a:ext cx="3523384" cy="0"/>
+          </a:xfrm>
+          <a:prstGeom prst="line">
+            <a:avLst/>
+          </a:prstGeom>
+          <a:noFill/>
+          <a:ln w="15875" cap="flat" cmpd="sng" algn="ctr">
+            <a:solidFill>
+              <a:srgbClr val="009473"/>
+            </a:solidFill>
+            <a:prstDash val="solid"/>
+            <a:tailEnd type="triangle" w="med" len="sm"/>
+          </a:ln>
+          <a:effectLst>
+            <a:outerShdw blurRad="50800" dist="38100" dir="2700000" algn="tl" rotWithShape="0">
+              <a:prstClr val="black">
+                <a:alpha val="40000"/>
+              </a:prstClr>
+            </a:outerShdw>
+          </a:effectLst>
+        </p:spPr>
+      </p:cxnSp>
+      <p:sp>
+        <p:nvSpPr>
+          <p:cNvPr id="72" name="Rounded Rectangle 71"/>
+          <p:cNvSpPr/>
+          <p:nvPr/>
+        </p:nvSpPr>
+        <p:spPr>
+          <a:xfrm>
+            <a:off x="4678559" y="2289432"/>
+            <a:ext cx="236889" cy="1145871"/>
+          </a:xfrm>
+          <a:prstGeom prst="roundRect">
+            <a:avLst>
+              <a:gd name="adj" fmla="val 8225"/>
+            </a:avLst>
+          </a:prstGeom>
+          <a:solidFill>
+            <a:srgbClr val="009473"/>
+          </a:solidFill>
+          <a:ln w="6350" cap="flat" cmpd="sng" algn="ctr">
+            <a:noFill/>
+            <a:prstDash val="solid"/>
+            <a:round/>
+            <a:headEnd type="none" w="med" len="med"/>
+            <a:tailEnd type="none" w="med" len="med"/>
+          </a:ln>
+          <a:effectLst>
+            <a:outerShdw blurRad="190500" dist="25400" dir="2700000">
+              <a:srgbClr val="000000">
+                <a:alpha val="43000"/>
+              </a:srgbClr>
+            </a:outerShdw>
+          </a:effectLst>
+        </p:spPr>
+        <p:txBody>
+          <a:bodyPr rtlCol="0" anchor="ctr"/>
+          <a:lstStyle/>
+          <a:p>
+            <a:pPr algn="ctr" defTabSz="914400"/>
+            <a:endParaRPr lang="en-US" sz="1400" kern="0" dirty="0">
+              <a:solidFill>
+                <a:prstClr val="white"/>
+              </a:solidFill>
+              <a:latin typeface="Tahoma"/>
+              <a:ea typeface="ＭＳ Ｐゴシック" pitchFamily="46" charset="-128"/>
+            </a:endParaRPr>
+          </a:p>
+        </p:txBody>
+      </p:sp>
+      <p:sp>
+        <p:nvSpPr>
+          <p:cNvPr id="73" name="TextBox 72"/>
+          <p:cNvSpPr txBox="1"/>
+          <p:nvPr/>
+        </p:nvSpPr>
+        <p:spPr>
+          <a:xfrm>
+            <a:off x="3906096" y="2642189"/>
+            <a:ext cx="854696" cy="276999"/>
+          </a:xfrm>
+          <a:prstGeom prst="rect">
+            <a:avLst/>
+          </a:prstGeom>
+          <a:noFill/>
+        </p:spPr>
+        <p:txBody>
+          <a:bodyPr wrap="none" rtlCol="0">
+            <a:spAutoFit/>
+          </a:bodyPr>
+          <a:lstStyle/>
+          <a:p>
+            <a:r>
+              <a:rPr lang="en-US" sz="1200" dirty="0" smtClean="0"/>
+              <a:t>instantiate</a:t>
+            </a:r>
+            <a:endParaRPr lang="en-US" sz="1200" dirty="0"/>
+          </a:p>
+        </p:txBody>
+      </p:sp>
+      <p:cxnSp>
+        <p:nvCxnSpPr>
+          <p:cNvPr id="74" name="Straight Connector 73"/>
+          <p:cNvCxnSpPr/>
+          <p:nvPr/>
+        </p:nvCxnSpPr>
+        <p:spPr>
+          <a:xfrm>
+            <a:off x="4915448" y="2442745"/>
+            <a:ext cx="3115299" cy="0"/>
+          </a:xfrm>
+          <a:prstGeom prst="line">
+            <a:avLst/>
+          </a:prstGeom>
+          <a:noFill/>
+          <a:ln w="15875" cap="flat" cmpd="sng" algn="ctr">
+            <a:solidFill>
+              <a:srgbClr val="009473"/>
+            </a:solidFill>
+            <a:prstDash val="solid"/>
+            <a:tailEnd type="triangle" w="med" len="sm"/>
+          </a:ln>
+          <a:effectLst>
+            <a:outerShdw blurRad="50800" dist="38100" dir="2700000" algn="tl" rotWithShape="0">
+              <a:prstClr val="black">
+                <a:alpha val="40000"/>
+              </a:prstClr>
+            </a:outerShdw>
+          </a:effectLst>
+        </p:spPr>
+      </p:cxnSp>
+      <p:cxnSp>
+        <p:nvCxnSpPr>
+          <p:cNvPr id="76" name="Straight Connector 75"/>
+          <p:cNvCxnSpPr/>
+          <p:nvPr/>
+        </p:nvCxnSpPr>
+        <p:spPr>
+          <a:xfrm flipH="1">
+            <a:off x="4915448" y="3297234"/>
+            <a:ext cx="3115300" cy="0"/>
+          </a:xfrm>
+          <a:prstGeom prst="line">
+            <a:avLst/>
+          </a:prstGeom>
+          <a:noFill/>
+          <a:ln w="15875" cap="flat" cmpd="sng" algn="ctr">
+            <a:solidFill>
+              <a:srgbClr val="009473"/>
+            </a:solidFill>
+            <a:prstDash val="solid"/>
+            <a:tailEnd type="triangle" w="med" len="sm"/>
+          </a:ln>
+          <a:effectLst>
+            <a:outerShdw blurRad="50800" dist="38100" dir="2700000" algn="tl" rotWithShape="0">
+              <a:prstClr val="black">
+                <a:alpha val="40000"/>
+              </a:prstClr>
+            </a:outerShdw>
+          </a:effectLst>
+        </p:spPr>
+      </p:cxnSp>
+      <p:sp>
+        <p:nvSpPr>
+          <p:cNvPr id="78" name="Oval 77"/>
+          <p:cNvSpPr/>
+          <p:nvPr/>
+        </p:nvSpPr>
+        <p:spPr>
+          <a:xfrm>
+            <a:off x="6325239" y="2631309"/>
+            <a:ext cx="86101" cy="86887"/>
+          </a:xfrm>
+          <a:prstGeom prst="ellipse">
+            <a:avLst/>
+          </a:prstGeom>
+          <a:solidFill>
+            <a:srgbClr val="009473"/>
+          </a:solidFill>
+          <a:ln w="6350" cap="flat" cmpd="sng" algn="ctr">
+            <a:noFill/>
+            <a:prstDash val="solid"/>
+            <a:round/>
+            <a:headEnd type="none" w="med" len="med"/>
+            <a:tailEnd type="none" w="med" len="med"/>
+          </a:ln>
+          <a:effectLst>
+            <a:outerShdw blurRad="190500" dist="25400" dir="2700000">
+              <a:srgbClr val="000000">
+                <a:alpha val="43000"/>
+              </a:srgbClr>
+            </a:outerShdw>
+          </a:effectLst>
+        </p:spPr>
+        <p:txBody>
+          <a:bodyPr rtlCol="0" anchor="ctr"/>
+          <a:lstStyle/>
+          <a:p>
+            <a:pPr algn="ctr" defTabSz="914400"/>
+            <a:endParaRPr lang="en-US" sz="1400" kern="0">
+              <a:solidFill>
+                <a:prstClr val="white"/>
+              </a:solidFill>
+              <a:latin typeface="Tahoma"/>
+              <a:ea typeface="ＭＳ Ｐゴシック" pitchFamily="46" charset="-128"/>
+            </a:endParaRPr>
+          </a:p>
+        </p:txBody>
+      </p:sp>
+      <p:sp>
+        <p:nvSpPr>
+          <p:cNvPr id="79" name="Oval 78"/>
+          <p:cNvSpPr/>
+          <p:nvPr/>
+        </p:nvSpPr>
+        <p:spPr>
+          <a:xfrm>
+            <a:off x="6325239" y="2820253"/>
+            <a:ext cx="86101" cy="86887"/>
+          </a:xfrm>
+          <a:prstGeom prst="ellipse">
+            <a:avLst/>
+          </a:prstGeom>
+          <a:solidFill>
+            <a:srgbClr val="009473"/>
+          </a:solidFill>
+          <a:ln w="6350" cap="flat" cmpd="sng" algn="ctr">
+            <a:noFill/>
+            <a:prstDash val="solid"/>
+            <a:round/>
+            <a:headEnd type="none" w="med" len="med"/>
+            <a:tailEnd type="none" w="med" len="med"/>
+          </a:ln>
+          <a:effectLst>
+            <a:outerShdw blurRad="190500" dist="25400" dir="2700000">
+              <a:srgbClr val="000000">
+                <a:alpha val="43000"/>
+              </a:srgbClr>
+            </a:outerShdw>
+          </a:effectLst>
+        </p:spPr>
+        <p:txBody>
+          <a:bodyPr rtlCol="0" anchor="ctr"/>
+          <a:lstStyle/>
+          <a:p>
+            <a:pPr algn="ctr" defTabSz="914400"/>
+            <a:endParaRPr lang="en-US" sz="1400" kern="0">
+              <a:solidFill>
+                <a:prstClr val="white"/>
+              </a:solidFill>
+              <a:latin typeface="Tahoma"/>
+              <a:ea typeface="ＭＳ Ｐゴシック" pitchFamily="46" charset="-128"/>
+            </a:endParaRPr>
+          </a:p>
+        </p:txBody>
+      </p:sp>
+      <p:sp>
+        <p:nvSpPr>
+          <p:cNvPr id="80" name="Oval 79"/>
+          <p:cNvSpPr/>
+          <p:nvPr/>
+        </p:nvSpPr>
+        <p:spPr>
+          <a:xfrm>
+            <a:off x="6325239" y="3009197"/>
+            <a:ext cx="86101" cy="86887"/>
+          </a:xfrm>
+          <a:prstGeom prst="ellipse">
+            <a:avLst/>
+          </a:prstGeom>
+          <a:solidFill>
+            <a:srgbClr val="009473"/>
+          </a:solidFill>
+          <a:ln w="6350" cap="flat" cmpd="sng" algn="ctr">
+            <a:noFill/>
+            <a:prstDash val="solid"/>
+            <a:round/>
+            <a:headEnd type="none" w="med" len="med"/>
+            <a:tailEnd type="none" w="med" len="med"/>
+          </a:ln>
+          <a:effectLst>
+            <a:outerShdw blurRad="190500" dist="25400" dir="2700000">
+              <a:srgbClr val="000000">
+                <a:alpha val="43000"/>
+              </a:srgbClr>
+            </a:outerShdw>
+          </a:effectLst>
+        </p:spPr>
+        <p:txBody>
+          <a:bodyPr rtlCol="0" anchor="ctr"/>
+          <a:lstStyle/>
+          <a:p>
+            <a:pPr algn="ctr" defTabSz="914400"/>
+            <a:endParaRPr lang="en-US" sz="1400" kern="0">
+              <a:solidFill>
+                <a:prstClr val="white"/>
+              </a:solidFill>
+              <a:latin typeface="Tahoma"/>
+              <a:ea typeface="ＭＳ Ｐゴシック" pitchFamily="46" charset="-128"/>
+            </a:endParaRPr>
+          </a:p>
+        </p:txBody>
+      </p:sp>
+      <p:sp>
+        <p:nvSpPr>
+          <p:cNvPr id="81" name="TextBox 80"/>
+          <p:cNvSpPr txBox="1"/>
+          <p:nvPr/>
+        </p:nvSpPr>
+        <p:spPr>
+          <a:xfrm>
+            <a:off x="5343025" y="2119093"/>
+            <a:ext cx="2043060" cy="307777"/>
+          </a:xfrm>
+          <a:prstGeom prst="rect">
+            <a:avLst/>
+          </a:prstGeom>
+          <a:noFill/>
+        </p:spPr>
+        <p:txBody>
+          <a:bodyPr wrap="none" rtlCol="0">
+            <a:spAutoFit/>
+          </a:bodyPr>
+          <a:lstStyle/>
+          <a:p>
+            <a:r>
+              <a:rPr lang="en-US" sz="1400" dirty="0" smtClean="0"/>
+              <a:t>SAVE &amp; EXECUTE SCRIPTS</a:t>
+            </a:r>
+            <a:endParaRPr lang="en-US" sz="1400" dirty="0"/>
+          </a:p>
+        </p:txBody>
+      </p:sp>
+      <p:cxnSp>
+        <p:nvCxnSpPr>
+          <p:cNvPr id="82" name="Straight Connector 81"/>
+          <p:cNvCxnSpPr/>
+          <p:nvPr/>
+        </p:nvCxnSpPr>
+        <p:spPr>
+          <a:xfrm flipH="1">
+            <a:off x="1273619" y="3566526"/>
+            <a:ext cx="3523385" cy="0"/>
+          </a:xfrm>
+          <a:prstGeom prst="line">
+            <a:avLst/>
+          </a:prstGeom>
+          <a:noFill/>
+          <a:ln w="15875" cap="flat" cmpd="sng" algn="ctr">
+            <a:solidFill>
+              <a:srgbClr val="009473"/>
+            </a:solidFill>
+            <a:prstDash val="solid"/>
+            <a:tailEnd type="triangle" w="med" len="sm"/>
+          </a:ln>
+          <a:effectLst>
+            <a:outerShdw blurRad="50800" dist="38100" dir="2700000" algn="tl" rotWithShape="0">
+              <a:prstClr val="black">
+                <a:alpha val="40000"/>
+              </a:prstClr>
+            </a:outerShdw>
+          </a:effectLst>
+        </p:spPr>
+      </p:cxnSp>
+      <p:cxnSp>
+        <p:nvCxnSpPr>
+          <p:cNvPr id="83" name="Straight Connector 82"/>
+          <p:cNvCxnSpPr/>
+          <p:nvPr/>
+        </p:nvCxnSpPr>
+        <p:spPr>
+          <a:xfrm>
+            <a:off x="1270691" y="3991547"/>
+            <a:ext cx="3523384" cy="0"/>
+          </a:xfrm>
+          <a:prstGeom prst="line">
+            <a:avLst/>
+          </a:prstGeom>
+          <a:noFill/>
+          <a:ln w="15875" cap="flat" cmpd="sng" algn="ctr">
+            <a:solidFill>
+              <a:srgbClr val="009473"/>
+            </a:solidFill>
+            <a:prstDash val="solid"/>
+            <a:tailEnd type="triangle" w="med" len="sm"/>
+          </a:ln>
+          <a:effectLst>
+            <a:outerShdw blurRad="50800" dist="38100" dir="2700000" algn="tl" rotWithShape="0">
+              <a:prstClr val="black">
+                <a:alpha val="40000"/>
+              </a:prstClr>
+            </a:outerShdw>
+          </a:effectLst>
+        </p:spPr>
+      </p:cxnSp>
+      <p:sp>
+        <p:nvSpPr>
+          <p:cNvPr id="84" name="Rounded Rectangle 83"/>
+          <p:cNvSpPr/>
+          <p:nvPr/>
+        </p:nvSpPr>
+        <p:spPr>
+          <a:xfrm>
+            <a:off x="4675630" y="4141129"/>
+            <a:ext cx="236889" cy="806652"/>
+          </a:xfrm>
+          <a:prstGeom prst="roundRect">
+            <a:avLst>
+              <a:gd name="adj" fmla="val 8225"/>
+            </a:avLst>
+          </a:prstGeom>
+          <a:solidFill>
+            <a:srgbClr val="009473"/>
+          </a:solidFill>
+          <a:ln w="6350" cap="flat" cmpd="sng" algn="ctr">
+            <a:noFill/>
+            <a:prstDash val="solid"/>
+            <a:round/>
+            <a:headEnd type="none" w="med" len="med"/>
+            <a:tailEnd type="none" w="med" len="med"/>
+          </a:ln>
+          <a:effectLst>
+            <a:outerShdw blurRad="190500" dist="25400" dir="2700000">
+              <a:srgbClr val="000000">
+                <a:alpha val="43000"/>
+              </a:srgbClr>
+            </a:outerShdw>
+          </a:effectLst>
+        </p:spPr>
+        <p:txBody>
+          <a:bodyPr rtlCol="0" anchor="ctr"/>
+          <a:lstStyle/>
+          <a:p>
+            <a:pPr algn="ctr" defTabSz="914400"/>
+            <a:endParaRPr lang="en-US" sz="1400" kern="0" dirty="0">
+              <a:solidFill>
+                <a:prstClr val="white"/>
+              </a:solidFill>
+              <a:latin typeface="Tahoma"/>
+              <a:ea typeface="ＭＳ Ｐゴシック" pitchFamily="46" charset="-128"/>
+            </a:endParaRPr>
+          </a:p>
+        </p:txBody>
+      </p:sp>
+      <p:sp>
+        <p:nvSpPr>
+          <p:cNvPr id="85" name="TextBox 84"/>
+          <p:cNvSpPr txBox="1"/>
+          <p:nvPr/>
+        </p:nvSpPr>
+        <p:spPr>
+          <a:xfrm>
+            <a:off x="4116070" y="4442381"/>
+            <a:ext cx="633507" cy="276999"/>
+          </a:xfrm>
+          <a:prstGeom prst="rect">
+            <a:avLst/>
+          </a:prstGeom>
+          <a:noFill/>
+        </p:spPr>
+        <p:txBody>
+          <a:bodyPr wrap="none" rtlCol="0">
+            <a:spAutoFit/>
+          </a:bodyPr>
+          <a:lstStyle/>
+          <a:p>
+            <a:r>
+              <a:rPr lang="en-US" sz="1200" dirty="0" smtClean="0"/>
+              <a:t>modify</a:t>
+            </a:r>
+            <a:endParaRPr lang="en-US" sz="1200" dirty="0"/>
+          </a:p>
+        </p:txBody>
+      </p:sp>
+      <p:cxnSp>
+        <p:nvCxnSpPr>
+          <p:cNvPr id="86" name="Straight Connector 85"/>
+          <p:cNvCxnSpPr/>
+          <p:nvPr/>
+        </p:nvCxnSpPr>
+        <p:spPr>
+          <a:xfrm>
+            <a:off x="4915449" y="4221668"/>
+            <a:ext cx="3115299" cy="0"/>
+          </a:xfrm>
+          <a:prstGeom prst="line">
+            <a:avLst/>
+          </a:prstGeom>
+          <a:noFill/>
+          <a:ln w="15875" cap="flat" cmpd="sng" algn="ctr">
+            <a:solidFill>
+              <a:srgbClr val="009473"/>
+            </a:solidFill>
+            <a:prstDash val="solid"/>
+            <a:tailEnd type="triangle" w="med" len="sm"/>
+          </a:ln>
+          <a:effectLst>
+            <a:outerShdw blurRad="50800" dist="38100" dir="2700000" algn="tl" rotWithShape="0">
+              <a:prstClr val="black">
+                <a:alpha val="40000"/>
+              </a:prstClr>
+            </a:outerShdw>
+          </a:effectLst>
+        </p:spPr>
+      </p:cxnSp>
+      <p:cxnSp>
+        <p:nvCxnSpPr>
+          <p:cNvPr id="87" name="Straight Connector 86"/>
+          <p:cNvCxnSpPr/>
+          <p:nvPr/>
+        </p:nvCxnSpPr>
+        <p:spPr>
+          <a:xfrm flipH="1">
+            <a:off x="4915448" y="4902562"/>
+            <a:ext cx="3115300" cy="0"/>
+          </a:xfrm>
+          <a:prstGeom prst="line">
+            <a:avLst/>
+          </a:prstGeom>
+          <a:noFill/>
+          <a:ln w="15875" cap="flat" cmpd="sng" algn="ctr">
+            <a:solidFill>
+              <a:srgbClr val="009473"/>
+            </a:solidFill>
+            <a:prstDash val="solid"/>
+            <a:tailEnd type="triangle" w="med" len="sm"/>
+          </a:ln>
+          <a:effectLst>
+            <a:outerShdw blurRad="50800" dist="38100" dir="2700000" algn="tl" rotWithShape="0">
+              <a:prstClr val="black">
+                <a:alpha val="40000"/>
+              </a:prstClr>
+            </a:outerShdw>
+          </a:effectLst>
+        </p:spPr>
+      </p:cxnSp>
+      <p:sp>
+        <p:nvSpPr>
+          <p:cNvPr id="88" name="Oval 87"/>
+          <p:cNvSpPr/>
+          <p:nvPr/>
+        </p:nvSpPr>
+        <p:spPr>
+          <a:xfrm>
+            <a:off x="6323775" y="4532578"/>
+            <a:ext cx="86101" cy="86887"/>
+          </a:xfrm>
+          <a:prstGeom prst="ellipse">
+            <a:avLst/>
+          </a:prstGeom>
+          <a:solidFill>
+            <a:srgbClr val="009473"/>
+          </a:solidFill>
+          <a:ln w="6350" cap="flat" cmpd="sng" algn="ctr">
+            <a:noFill/>
+            <a:prstDash val="solid"/>
+            <a:round/>
+            <a:headEnd type="none" w="med" len="med"/>
+            <a:tailEnd type="none" w="med" len="med"/>
+          </a:ln>
+          <a:effectLst>
+            <a:outerShdw blurRad="190500" dist="25400" dir="2700000">
+              <a:srgbClr val="000000">
+                <a:alpha val="43000"/>
+              </a:srgbClr>
+            </a:outerShdw>
+          </a:effectLst>
+        </p:spPr>
+        <p:txBody>
+          <a:bodyPr rtlCol="0" anchor="ctr"/>
+          <a:lstStyle/>
+          <a:p>
+            <a:pPr algn="ctr" defTabSz="914400"/>
+            <a:endParaRPr lang="en-US" sz="1400" kern="0">
+              <a:solidFill>
+                <a:prstClr val="white"/>
+              </a:solidFill>
+              <a:latin typeface="Tahoma"/>
+              <a:ea typeface="ＭＳ Ｐゴシック" pitchFamily="46" charset="-128"/>
+            </a:endParaRPr>
+          </a:p>
+        </p:txBody>
+      </p:sp>
+      <p:sp>
+        <p:nvSpPr>
+          <p:cNvPr id="89" name="Oval 88"/>
+          <p:cNvSpPr/>
+          <p:nvPr/>
+        </p:nvSpPr>
+        <p:spPr>
+          <a:xfrm>
+            <a:off x="6323775" y="4386982"/>
+            <a:ext cx="86101" cy="86887"/>
+          </a:xfrm>
+          <a:prstGeom prst="ellipse">
+            <a:avLst/>
+          </a:prstGeom>
+          <a:solidFill>
+            <a:srgbClr val="009473"/>
+          </a:solidFill>
+          <a:ln w="6350" cap="flat" cmpd="sng" algn="ctr">
+            <a:noFill/>
+            <a:prstDash val="solid"/>
+            <a:round/>
+            <a:headEnd type="none" w="med" len="med"/>
+            <a:tailEnd type="none" w="med" len="med"/>
+          </a:ln>
+          <a:effectLst>
+            <a:outerShdw blurRad="190500" dist="25400" dir="2700000">
+              <a:srgbClr val="000000">
+                <a:alpha val="43000"/>
+              </a:srgbClr>
+            </a:outerShdw>
+          </a:effectLst>
+        </p:spPr>
+        <p:txBody>
+          <a:bodyPr rtlCol="0" anchor="ctr"/>
+          <a:lstStyle/>
+          <a:p>
+            <a:pPr algn="ctr" defTabSz="914400"/>
+            <a:endParaRPr lang="en-US" sz="1400" kern="0">
+              <a:solidFill>
+                <a:prstClr val="white"/>
+              </a:solidFill>
+              <a:latin typeface="Tahoma"/>
+              <a:ea typeface="ＭＳ Ｐゴシック" pitchFamily="46" charset="-128"/>
+            </a:endParaRPr>
+          </a:p>
+        </p:txBody>
+      </p:sp>
+      <p:sp>
+        <p:nvSpPr>
+          <p:cNvPr id="90" name="Oval 89"/>
+          <p:cNvSpPr/>
+          <p:nvPr/>
+        </p:nvSpPr>
+        <p:spPr>
+          <a:xfrm>
+            <a:off x="6323775" y="4678173"/>
+            <a:ext cx="86101" cy="86887"/>
+          </a:xfrm>
+          <a:prstGeom prst="ellipse">
+            <a:avLst/>
+          </a:prstGeom>
+          <a:solidFill>
+            <a:srgbClr val="009473"/>
+          </a:solidFill>
+          <a:ln w="6350" cap="flat" cmpd="sng" algn="ctr">
+            <a:noFill/>
+            <a:prstDash val="solid"/>
+            <a:round/>
+            <a:headEnd type="none" w="med" len="med"/>
+            <a:tailEnd type="none" w="med" len="med"/>
+          </a:ln>
+          <a:effectLst>
+            <a:outerShdw blurRad="190500" dist="25400" dir="2700000">
+              <a:srgbClr val="000000">
+                <a:alpha val="43000"/>
+              </a:srgbClr>
+            </a:outerShdw>
+          </a:effectLst>
+        </p:spPr>
+        <p:txBody>
+          <a:bodyPr rtlCol="0" anchor="ctr"/>
+          <a:lstStyle/>
+          <a:p>
+            <a:pPr algn="ctr" defTabSz="914400"/>
+            <a:endParaRPr lang="en-US" sz="1400" kern="0">
+              <a:solidFill>
+                <a:prstClr val="white"/>
+              </a:solidFill>
+              <a:latin typeface="Tahoma"/>
+              <a:ea typeface="ＭＳ Ｐゴシック" pitchFamily="46" charset="-128"/>
+            </a:endParaRPr>
+          </a:p>
+        </p:txBody>
+      </p:sp>
+      <p:sp>
+        <p:nvSpPr>
+          <p:cNvPr id="91" name="TextBox 90"/>
+          <p:cNvSpPr txBox="1"/>
+          <p:nvPr/>
+        </p:nvSpPr>
+        <p:spPr>
+          <a:xfrm>
+            <a:off x="5632799" y="3894458"/>
+            <a:ext cx="1463512" cy="307777"/>
+          </a:xfrm>
+          <a:prstGeom prst="rect">
+            <a:avLst/>
+          </a:prstGeom>
+          <a:noFill/>
+        </p:spPr>
+        <p:txBody>
+          <a:bodyPr wrap="none" rtlCol="0">
+            <a:spAutoFit/>
+          </a:bodyPr>
+          <a:lstStyle/>
+          <a:p>
+            <a:r>
+              <a:rPr lang="en-US" sz="1400" dirty="0" smtClean="0"/>
+              <a:t>EXECUTE SCRIPTS</a:t>
+            </a:r>
+            <a:endParaRPr lang="en-US" sz="1400" dirty="0"/>
+          </a:p>
+        </p:txBody>
+      </p:sp>
+      <p:cxnSp>
+        <p:nvCxnSpPr>
+          <p:cNvPr id="92" name="Straight Connector 91"/>
+          <p:cNvCxnSpPr/>
+          <p:nvPr/>
+        </p:nvCxnSpPr>
+        <p:spPr>
+          <a:xfrm flipH="1">
+            <a:off x="1270690" y="5052782"/>
+            <a:ext cx="3523385" cy="0"/>
+          </a:xfrm>
+          <a:prstGeom prst="line">
+            <a:avLst/>
+          </a:prstGeom>
+          <a:noFill/>
+          <a:ln w="15875" cap="flat" cmpd="sng" algn="ctr">
+            <a:solidFill>
+              <a:srgbClr val="009473"/>
+            </a:solidFill>
+            <a:prstDash val="solid"/>
+            <a:tailEnd type="triangle" w="med" len="sm"/>
+          </a:ln>
+          <a:effectLst>
+            <a:outerShdw blurRad="50800" dist="38100" dir="2700000" algn="tl" rotWithShape="0">
+              <a:prstClr val="black">
+                <a:alpha val="40000"/>
+              </a:prstClr>
+            </a:outerShdw>
+          </a:effectLst>
+        </p:spPr>
+      </p:cxnSp>
+      <p:cxnSp>
+        <p:nvCxnSpPr>
+          <p:cNvPr id="93" name="Straight Connector 92"/>
+          <p:cNvCxnSpPr/>
+          <p:nvPr/>
+        </p:nvCxnSpPr>
+        <p:spPr>
+          <a:xfrm>
+            <a:off x="1273621" y="5387570"/>
+            <a:ext cx="3523384" cy="0"/>
+          </a:xfrm>
+          <a:prstGeom prst="line">
+            <a:avLst/>
+          </a:prstGeom>
+          <a:noFill/>
+          <a:ln w="15875" cap="flat" cmpd="sng" algn="ctr">
+            <a:solidFill>
+              <a:srgbClr val="009473"/>
+            </a:solidFill>
+            <a:prstDash val="solid"/>
+            <a:tailEnd type="triangle" w="med" len="sm"/>
+          </a:ln>
+          <a:effectLst>
+            <a:outerShdw blurRad="50800" dist="38100" dir="2700000" algn="tl" rotWithShape="0">
+              <a:prstClr val="black">
+                <a:alpha val="40000"/>
+              </a:prstClr>
+            </a:outerShdw>
+          </a:effectLst>
+        </p:spPr>
+      </p:cxnSp>
+      <p:sp>
+        <p:nvSpPr>
+          <p:cNvPr id="94" name="Rounded Rectangle 93"/>
+          <p:cNvSpPr/>
+          <p:nvPr/>
+        </p:nvSpPr>
+        <p:spPr>
+          <a:xfrm>
+            <a:off x="4654763" y="5537152"/>
+            <a:ext cx="236889" cy="806652"/>
+          </a:xfrm>
+          <a:prstGeom prst="roundRect">
+            <a:avLst>
+              <a:gd name="adj" fmla="val 8225"/>
+            </a:avLst>
+          </a:prstGeom>
+          <a:solidFill>
+            <a:srgbClr val="009473"/>
+          </a:solidFill>
+          <a:ln w="6350" cap="flat" cmpd="sng" algn="ctr">
+            <a:noFill/>
+            <a:prstDash val="solid"/>
+            <a:round/>
+            <a:headEnd type="none" w="med" len="med"/>
+            <a:tailEnd type="none" w="med" len="med"/>
+          </a:ln>
+          <a:effectLst>
+            <a:outerShdw blurRad="190500" dist="25400" dir="2700000">
+              <a:srgbClr val="000000">
+                <a:alpha val="43000"/>
+              </a:srgbClr>
+            </a:outerShdw>
+          </a:effectLst>
+        </p:spPr>
+        <p:txBody>
+          <a:bodyPr rtlCol="0" anchor="ctr"/>
+          <a:lstStyle/>
+          <a:p>
+            <a:pPr algn="ctr" defTabSz="914400"/>
+            <a:endParaRPr lang="en-US" sz="1400" kern="0" dirty="0">
+              <a:solidFill>
+                <a:prstClr val="white"/>
+              </a:solidFill>
+              <a:latin typeface="Tahoma"/>
+              <a:ea typeface="ＭＳ Ｐゴシック" pitchFamily="46" charset="-128"/>
+            </a:endParaRPr>
+          </a:p>
+        </p:txBody>
+      </p:sp>
+      <p:sp>
+        <p:nvSpPr>
+          <p:cNvPr id="95" name="TextBox 94"/>
+          <p:cNvSpPr txBox="1"/>
+          <p:nvPr/>
+        </p:nvSpPr>
+        <p:spPr>
+          <a:xfrm>
+            <a:off x="4223121" y="5884084"/>
+            <a:ext cx="479618" cy="276999"/>
+          </a:xfrm>
+          <a:prstGeom prst="rect">
+            <a:avLst/>
+          </a:prstGeom>
+          <a:noFill/>
+        </p:spPr>
+        <p:txBody>
+          <a:bodyPr wrap="none" rtlCol="0">
+            <a:spAutoFit/>
+          </a:bodyPr>
+          <a:lstStyle/>
+          <a:p>
+            <a:r>
+              <a:rPr lang="en-US" sz="1200" dirty="0" smtClean="0"/>
+              <a:t>start</a:t>
+            </a:r>
+            <a:endParaRPr lang="en-US" sz="1200" dirty="0"/>
+          </a:p>
+        </p:txBody>
+      </p:sp>
+      <p:cxnSp>
+        <p:nvCxnSpPr>
+          <p:cNvPr id="96" name="Straight Connector 95"/>
+          <p:cNvCxnSpPr/>
+          <p:nvPr/>
+        </p:nvCxnSpPr>
+        <p:spPr>
+          <a:xfrm>
+            <a:off x="4894582" y="5617691"/>
+            <a:ext cx="3115299" cy="0"/>
+          </a:xfrm>
+          <a:prstGeom prst="line">
+            <a:avLst/>
+          </a:prstGeom>
+          <a:noFill/>
+          <a:ln w="15875" cap="flat" cmpd="sng" algn="ctr">
+            <a:solidFill>
+              <a:srgbClr val="009473"/>
+            </a:solidFill>
+            <a:prstDash val="solid"/>
+            <a:tailEnd type="triangle" w="med" len="sm"/>
+          </a:ln>
+          <a:effectLst>
+            <a:outerShdw blurRad="50800" dist="38100" dir="2700000" algn="tl" rotWithShape="0">
+              <a:prstClr val="black">
+                <a:alpha val="40000"/>
+              </a:prstClr>
+            </a:outerShdw>
+          </a:effectLst>
+        </p:spPr>
+      </p:cxnSp>
+      <p:cxnSp>
+        <p:nvCxnSpPr>
+          <p:cNvPr id="97" name="Straight Connector 96"/>
+          <p:cNvCxnSpPr/>
+          <p:nvPr/>
+        </p:nvCxnSpPr>
+        <p:spPr>
+          <a:xfrm flipH="1">
+            <a:off x="4894581" y="6298585"/>
+            <a:ext cx="3115300" cy="0"/>
+          </a:xfrm>
+          <a:prstGeom prst="line">
+            <a:avLst/>
+          </a:prstGeom>
+          <a:noFill/>
+          <a:ln w="15875" cap="flat" cmpd="sng" algn="ctr">
+            <a:solidFill>
+              <a:srgbClr val="009473"/>
+            </a:solidFill>
+            <a:prstDash val="solid"/>
+            <a:tailEnd type="triangle" w="med" len="sm"/>
+          </a:ln>
+          <a:effectLst>
+            <a:outerShdw blurRad="50800" dist="38100" dir="2700000" algn="tl" rotWithShape="0">
+              <a:prstClr val="black">
+                <a:alpha val="40000"/>
+              </a:prstClr>
+            </a:outerShdw>
+          </a:effectLst>
+        </p:spPr>
+      </p:cxnSp>
+      <p:sp>
+        <p:nvSpPr>
+          <p:cNvPr id="98" name="Oval 97"/>
+          <p:cNvSpPr/>
+          <p:nvPr/>
+        </p:nvSpPr>
+        <p:spPr>
+          <a:xfrm>
+            <a:off x="6357730" y="5928601"/>
+            <a:ext cx="86101" cy="86887"/>
+          </a:xfrm>
+          <a:prstGeom prst="ellipse">
+            <a:avLst/>
+          </a:prstGeom>
+          <a:solidFill>
+            <a:srgbClr val="009473"/>
+          </a:solidFill>
+          <a:ln w="6350" cap="flat" cmpd="sng" algn="ctr">
+            <a:noFill/>
+            <a:prstDash val="solid"/>
+            <a:round/>
+            <a:headEnd type="none" w="med" len="med"/>
+            <a:tailEnd type="none" w="med" len="med"/>
+          </a:ln>
+          <a:effectLst>
+            <a:outerShdw blurRad="190500" dist="25400" dir="2700000">
+              <a:srgbClr val="000000">
+                <a:alpha val="43000"/>
+              </a:srgbClr>
+            </a:outerShdw>
+          </a:effectLst>
+        </p:spPr>
+        <p:txBody>
+          <a:bodyPr rtlCol="0" anchor="ctr"/>
+          <a:lstStyle/>
+          <a:p>
+            <a:pPr algn="ctr" defTabSz="914400"/>
+            <a:endParaRPr lang="en-US" sz="1400" kern="0">
+              <a:solidFill>
+                <a:prstClr val="white"/>
+              </a:solidFill>
+              <a:latin typeface="Tahoma"/>
+              <a:ea typeface="ＭＳ Ｐゴシック" pitchFamily="46" charset="-128"/>
+            </a:endParaRPr>
+          </a:p>
+        </p:txBody>
+      </p:sp>
+      <p:sp>
+        <p:nvSpPr>
+          <p:cNvPr id="99" name="Oval 98"/>
+          <p:cNvSpPr/>
+          <p:nvPr/>
+        </p:nvSpPr>
+        <p:spPr>
+          <a:xfrm>
+            <a:off x="6357730" y="5783005"/>
+            <a:ext cx="86101" cy="86887"/>
+          </a:xfrm>
+          <a:prstGeom prst="ellipse">
+            <a:avLst/>
+          </a:prstGeom>
+          <a:solidFill>
+            <a:srgbClr val="009473"/>
+          </a:solidFill>
+          <a:ln w="6350" cap="flat" cmpd="sng" algn="ctr">
+            <a:noFill/>
+            <a:prstDash val="solid"/>
+            <a:round/>
+            <a:headEnd type="none" w="med" len="med"/>
+            <a:tailEnd type="none" w="med" len="med"/>
+          </a:ln>
+          <a:effectLst>
+            <a:outerShdw blurRad="190500" dist="25400" dir="2700000">
+              <a:srgbClr val="000000">
+                <a:alpha val="43000"/>
+              </a:srgbClr>
+            </a:outerShdw>
+          </a:effectLst>
+        </p:spPr>
+        <p:txBody>
+          <a:bodyPr rtlCol="0" anchor="ctr"/>
+          <a:lstStyle/>
+          <a:p>
+            <a:pPr algn="ctr" defTabSz="914400"/>
+            <a:endParaRPr lang="en-US" sz="1400" kern="0">
+              <a:solidFill>
+                <a:prstClr val="white"/>
+              </a:solidFill>
+              <a:latin typeface="Tahoma"/>
+              <a:ea typeface="ＭＳ Ｐゴシック" pitchFamily="46" charset="-128"/>
+            </a:endParaRPr>
+          </a:p>
+        </p:txBody>
+      </p:sp>
+      <p:sp>
+        <p:nvSpPr>
+          <p:cNvPr id="100" name="Oval 99"/>
+          <p:cNvSpPr/>
+          <p:nvPr/>
+        </p:nvSpPr>
+        <p:spPr>
+          <a:xfrm>
+            <a:off x="6357730" y="6074196"/>
+            <a:ext cx="86101" cy="86887"/>
+          </a:xfrm>
+          <a:prstGeom prst="ellipse">
+            <a:avLst/>
+          </a:prstGeom>
+          <a:solidFill>
+            <a:srgbClr val="009473"/>
+          </a:solidFill>
+          <a:ln w="6350" cap="flat" cmpd="sng" algn="ctr">
+            <a:noFill/>
+            <a:prstDash val="solid"/>
+            <a:round/>
+            <a:headEnd type="none" w="med" len="med"/>
+            <a:tailEnd type="none" w="med" len="med"/>
+          </a:ln>
+          <a:effectLst>
+            <a:outerShdw blurRad="190500" dist="25400" dir="2700000">
+              <a:srgbClr val="000000">
+                <a:alpha val="43000"/>
+              </a:srgbClr>
+            </a:outerShdw>
+          </a:effectLst>
+        </p:spPr>
+        <p:txBody>
+          <a:bodyPr rtlCol="0" anchor="ctr"/>
+          <a:lstStyle/>
+          <a:p>
+            <a:pPr algn="ctr" defTabSz="914400"/>
+            <a:endParaRPr lang="en-US" sz="1400" kern="0">
+              <a:solidFill>
+                <a:prstClr val="white"/>
+              </a:solidFill>
+              <a:latin typeface="Tahoma"/>
+              <a:ea typeface="ＭＳ Ｐゴシック" pitchFamily="46" charset="-128"/>
+            </a:endParaRPr>
+          </a:p>
+        </p:txBody>
+      </p:sp>
+      <p:sp>
+        <p:nvSpPr>
+          <p:cNvPr id="101" name="TextBox 100"/>
+          <p:cNvSpPr txBox="1"/>
+          <p:nvPr/>
+        </p:nvSpPr>
+        <p:spPr>
+          <a:xfrm>
+            <a:off x="5632799" y="5290481"/>
+            <a:ext cx="1463512" cy="307777"/>
+          </a:xfrm>
+          <a:prstGeom prst="rect">
+            <a:avLst/>
+          </a:prstGeom>
+          <a:noFill/>
+        </p:spPr>
+        <p:txBody>
+          <a:bodyPr wrap="none" rtlCol="0">
+            <a:spAutoFit/>
+          </a:bodyPr>
+          <a:lstStyle/>
+          <a:p>
+            <a:r>
+              <a:rPr lang="en-US" sz="1400" dirty="0" smtClean="0"/>
+              <a:t>EXECUTE SCRIPTS</a:t>
+            </a:r>
+            <a:endParaRPr lang="en-US" sz="1400" dirty="0"/>
+          </a:p>
+        </p:txBody>
+      </p:sp>
+      <p:cxnSp>
+        <p:nvCxnSpPr>
+          <p:cNvPr id="102" name="Straight Connector 101"/>
+          <p:cNvCxnSpPr/>
+          <p:nvPr/>
+        </p:nvCxnSpPr>
+        <p:spPr>
+          <a:xfrm flipH="1">
+            <a:off x="1273621" y="6448805"/>
+            <a:ext cx="3499588" cy="0"/>
+          </a:xfrm>
+          <a:prstGeom prst="line">
+            <a:avLst/>
+          </a:prstGeom>
+          <a:noFill/>
+          <a:ln w="15875" cap="flat" cmpd="sng" algn="ctr">
+            <a:solidFill>
+              <a:srgbClr val="009473"/>
+            </a:solidFill>
+            <a:prstDash val="solid"/>
+            <a:tailEnd type="triangle" w="med" len="sm"/>
+          </a:ln>
+          <a:effectLst>
+            <a:outerShdw blurRad="50800" dist="38100" dir="2700000" algn="tl" rotWithShape="0">
+              <a:prstClr val="black">
+                <a:alpha val="40000"/>
+              </a:prstClr>
+            </a:outerShdw>
+          </a:effectLst>
+        </p:spPr>
+      </p:cxnSp>
+      <p:sp>
+        <p:nvSpPr>
+          <p:cNvPr id="2" name="Oval 1"/>
+          <p:cNvSpPr/>
+          <p:nvPr/>
+        </p:nvSpPr>
+        <p:spPr>
+          <a:xfrm>
+            <a:off x="3746195" y="1017008"/>
+            <a:ext cx="319801" cy="326489"/>
+          </a:xfrm>
+          <a:prstGeom prst="ellipse">
+            <a:avLst/>
+          </a:prstGeom>
+        </p:spPr>
+        <p:style>
+          <a:lnRef idx="1">
+            <a:schemeClr val="accent1"/>
+          </a:lnRef>
+          <a:fillRef idx="3">
+            <a:schemeClr val="accent1"/>
+          </a:fillRef>
+          <a:effectRef idx="2">
+            <a:schemeClr val="accent1"/>
+          </a:effectRef>
+          <a:fontRef idx="minor">
+            <a:schemeClr val="lt1"/>
+          </a:fontRef>
+        </p:style>
+        <p:txBody>
+          <a:bodyPr rtlCol="0" anchor="ctr" anchorCtr="1"/>
+          <a:lstStyle/>
+          <a:p>
+            <a:pPr algn="ctr"/>
+            <a:r>
+              <a:rPr lang="en-US" sz="1400" b="1" dirty="0" smtClean="0">
+                <a:solidFill>
+                  <a:schemeClr val="bg1"/>
+                </a:solidFill>
+              </a:rPr>
+              <a:t>2</a:t>
+            </a:r>
+            <a:endParaRPr lang="en-US" sz="1400" b="1" dirty="0">
+              <a:solidFill>
+                <a:schemeClr val="bg1"/>
+              </a:solidFill>
+            </a:endParaRPr>
+          </a:p>
+        </p:txBody>
+      </p:sp>
+      <p:sp>
+        <p:nvSpPr>
+          <p:cNvPr id="51" name="Oval 50"/>
+          <p:cNvSpPr/>
+          <p:nvPr/>
+        </p:nvSpPr>
+        <p:spPr>
+          <a:xfrm>
+            <a:off x="3542636" y="288979"/>
+            <a:ext cx="319801" cy="326489"/>
+          </a:xfrm>
+          <a:prstGeom prst="ellipse">
+            <a:avLst/>
+          </a:prstGeom>
+        </p:spPr>
+        <p:style>
+          <a:lnRef idx="1">
+            <a:schemeClr val="accent1"/>
+          </a:lnRef>
+          <a:fillRef idx="3">
+            <a:schemeClr val="accent1"/>
+          </a:fillRef>
+          <a:effectRef idx="2">
+            <a:schemeClr val="accent1"/>
+          </a:effectRef>
+          <a:fontRef idx="minor">
+            <a:schemeClr val="lt1"/>
+          </a:fontRef>
+        </p:style>
+        <p:txBody>
+          <a:bodyPr rtlCol="0" anchor="ctr" anchorCtr="1"/>
+          <a:lstStyle/>
+          <a:p>
+            <a:pPr algn="ctr"/>
+            <a:r>
+              <a:rPr lang="en-US" sz="1400" b="1" dirty="0">
+                <a:solidFill>
+                  <a:schemeClr val="bg1"/>
+                </a:solidFill>
+              </a:rPr>
+              <a:t>1</a:t>
+            </a:r>
+          </a:p>
+        </p:txBody>
+      </p:sp>
+      <p:sp>
+        <p:nvSpPr>
+          <p:cNvPr id="52" name="Oval 51"/>
+          <p:cNvSpPr/>
+          <p:nvPr/>
+        </p:nvSpPr>
+        <p:spPr>
+          <a:xfrm>
+            <a:off x="3805151" y="1612367"/>
+            <a:ext cx="319801" cy="326489"/>
+          </a:xfrm>
+          <a:prstGeom prst="ellipse">
+            <a:avLst/>
+          </a:prstGeom>
+        </p:spPr>
+        <p:style>
+          <a:lnRef idx="1">
+            <a:schemeClr val="accent1"/>
+          </a:lnRef>
+          <a:fillRef idx="3">
+            <a:schemeClr val="accent1"/>
+          </a:fillRef>
+          <a:effectRef idx="2">
+            <a:schemeClr val="accent1"/>
+          </a:effectRef>
+          <a:fontRef idx="minor">
+            <a:schemeClr val="lt1"/>
+          </a:fontRef>
+        </p:style>
+        <p:txBody>
+          <a:bodyPr rtlCol="0" anchor="ctr" anchorCtr="1"/>
+          <a:lstStyle/>
+          <a:p>
+            <a:pPr algn="ctr"/>
+            <a:r>
+              <a:rPr lang="en-US" sz="1400" b="1" dirty="0">
+                <a:solidFill>
+                  <a:schemeClr val="bg1"/>
+                </a:solidFill>
+              </a:rPr>
+              <a:t>3</a:t>
+            </a:r>
+          </a:p>
+        </p:txBody>
+      </p:sp>
+      <p:sp>
+        <p:nvSpPr>
+          <p:cNvPr id="53" name="Oval 52"/>
+          <p:cNvSpPr/>
+          <p:nvPr/>
+        </p:nvSpPr>
+        <p:spPr>
+          <a:xfrm>
+            <a:off x="4321423" y="2315700"/>
+            <a:ext cx="319801" cy="326489"/>
+          </a:xfrm>
+          <a:prstGeom prst="ellipse">
+            <a:avLst/>
+          </a:prstGeom>
+        </p:spPr>
+        <p:style>
+          <a:lnRef idx="1">
+            <a:schemeClr val="accent1"/>
+          </a:lnRef>
+          <a:fillRef idx="3">
+            <a:schemeClr val="accent1"/>
+          </a:fillRef>
+          <a:effectRef idx="2">
+            <a:schemeClr val="accent1"/>
+          </a:effectRef>
+          <a:fontRef idx="minor">
+            <a:schemeClr val="lt1"/>
+          </a:fontRef>
+        </p:style>
+        <p:txBody>
+          <a:bodyPr rtlCol="0" anchor="ctr" anchorCtr="1"/>
+          <a:lstStyle/>
+          <a:p>
+            <a:pPr algn="ctr"/>
+            <a:r>
+              <a:rPr lang="en-US" sz="1400" b="1" dirty="0">
+                <a:solidFill>
+                  <a:schemeClr val="bg1"/>
+                </a:solidFill>
+              </a:rPr>
+              <a:t>4</a:t>
+            </a:r>
+          </a:p>
+        </p:txBody>
+      </p:sp>
+      <p:sp>
+        <p:nvSpPr>
+          <p:cNvPr id="54" name="Oval 53"/>
+          <p:cNvSpPr/>
+          <p:nvPr/>
+        </p:nvSpPr>
+        <p:spPr>
+          <a:xfrm>
+            <a:off x="6560472" y="2580651"/>
+            <a:ext cx="319801" cy="326489"/>
+          </a:xfrm>
+          <a:prstGeom prst="ellipse">
+            <a:avLst/>
+          </a:prstGeom>
+        </p:spPr>
+        <p:style>
+          <a:lnRef idx="1">
+            <a:schemeClr val="accent1"/>
+          </a:lnRef>
+          <a:fillRef idx="3">
+            <a:schemeClr val="accent1"/>
+          </a:fillRef>
+          <a:effectRef idx="2">
+            <a:schemeClr val="accent1"/>
+          </a:effectRef>
+          <a:fontRef idx="minor">
+            <a:schemeClr val="lt1"/>
+          </a:fontRef>
+        </p:style>
+        <p:txBody>
+          <a:bodyPr rtlCol="0" anchor="ctr" anchorCtr="1"/>
+          <a:lstStyle/>
+          <a:p>
+            <a:pPr algn="ctr"/>
+            <a:r>
+              <a:rPr lang="en-US" sz="1400" b="1" dirty="0" smtClean="0">
+                <a:solidFill>
+                  <a:schemeClr val="bg1"/>
+                </a:solidFill>
+              </a:rPr>
+              <a:t>5</a:t>
+            </a:r>
+            <a:endParaRPr lang="en-US" sz="1400" b="1" dirty="0">
+              <a:solidFill>
+                <a:schemeClr val="bg1"/>
+              </a:solidFill>
+            </a:endParaRPr>
+          </a:p>
+        </p:txBody>
+      </p:sp>
+      <p:sp>
+        <p:nvSpPr>
+          <p:cNvPr id="55" name="Oval 54"/>
+          <p:cNvSpPr/>
+          <p:nvPr/>
+        </p:nvSpPr>
+        <p:spPr>
+          <a:xfrm>
+            <a:off x="2594949" y="3272058"/>
+            <a:ext cx="319801" cy="326489"/>
+          </a:xfrm>
+          <a:prstGeom prst="ellipse">
+            <a:avLst/>
+          </a:prstGeom>
+        </p:spPr>
+        <p:style>
+          <a:lnRef idx="1">
+            <a:schemeClr val="accent1"/>
+          </a:lnRef>
+          <a:fillRef idx="3">
+            <a:schemeClr val="accent1"/>
+          </a:fillRef>
+          <a:effectRef idx="2">
+            <a:schemeClr val="accent1"/>
+          </a:effectRef>
+          <a:fontRef idx="minor">
+            <a:schemeClr val="lt1"/>
+          </a:fontRef>
+        </p:style>
+        <p:txBody>
+          <a:bodyPr rtlCol="0" anchor="ctr" anchorCtr="1"/>
+          <a:lstStyle/>
+          <a:p>
+            <a:pPr algn="ctr"/>
+            <a:r>
+              <a:rPr lang="en-US" sz="1400" b="1" dirty="0">
+                <a:solidFill>
+                  <a:schemeClr val="bg1"/>
+                </a:solidFill>
+              </a:rPr>
+              <a:t>6</a:t>
+            </a:r>
+          </a:p>
+        </p:txBody>
+      </p:sp>
+      <p:sp>
+        <p:nvSpPr>
+          <p:cNvPr id="56" name="Oval 55"/>
+          <p:cNvSpPr/>
+          <p:nvPr/>
+        </p:nvSpPr>
+        <p:spPr>
+          <a:xfrm>
+            <a:off x="3398983" y="3676397"/>
+            <a:ext cx="319801" cy="326489"/>
+          </a:xfrm>
+          <a:prstGeom prst="ellipse">
+            <a:avLst/>
+          </a:prstGeom>
+        </p:spPr>
+        <p:style>
+          <a:lnRef idx="1">
+            <a:schemeClr val="accent1"/>
+          </a:lnRef>
+          <a:fillRef idx="3">
+            <a:schemeClr val="accent1"/>
+          </a:fillRef>
+          <a:effectRef idx="2">
+            <a:schemeClr val="accent1"/>
+          </a:effectRef>
+          <a:fontRef idx="minor">
+            <a:schemeClr val="lt1"/>
+          </a:fontRef>
+        </p:style>
+        <p:txBody>
+          <a:bodyPr rtlCol="0" anchor="ctr" anchorCtr="1"/>
+          <a:lstStyle/>
+          <a:p>
+            <a:pPr algn="ctr"/>
+            <a:r>
+              <a:rPr lang="en-US" sz="1400" b="1" dirty="0" smtClean="0">
+                <a:solidFill>
+                  <a:schemeClr val="bg1"/>
+                </a:solidFill>
+              </a:rPr>
+              <a:t>7</a:t>
+            </a:r>
+            <a:endParaRPr lang="en-US" sz="1400" b="1" dirty="0">
+              <a:solidFill>
+                <a:schemeClr val="bg1"/>
+              </a:solidFill>
+            </a:endParaRPr>
+          </a:p>
+        </p:txBody>
+      </p:sp>
+      <p:sp>
+        <p:nvSpPr>
+          <p:cNvPr id="57" name="TextBox 56"/>
+          <p:cNvSpPr txBox="1"/>
+          <p:nvPr/>
+        </p:nvSpPr>
+        <p:spPr>
+          <a:xfrm>
+            <a:off x="2641615" y="3691853"/>
+            <a:ext cx="787395" cy="307777"/>
+          </a:xfrm>
+          <a:prstGeom prst="rect">
+            <a:avLst/>
+          </a:prstGeom>
+          <a:noFill/>
+        </p:spPr>
+        <p:txBody>
+          <a:bodyPr wrap="none" rtlCol="0">
+            <a:spAutoFit/>
+          </a:bodyPr>
+          <a:lstStyle/>
+          <a:p>
+            <a:r>
+              <a:rPr lang="en-US" sz="1400" dirty="0" smtClean="0"/>
+              <a:t>MODIFY</a:t>
+            </a:r>
+            <a:endParaRPr lang="en-US" sz="1400" dirty="0"/>
+          </a:p>
+        </p:txBody>
+      </p:sp>
+      <p:sp>
+        <p:nvSpPr>
+          <p:cNvPr id="58" name="Oval 57"/>
+          <p:cNvSpPr/>
+          <p:nvPr/>
+        </p:nvSpPr>
+        <p:spPr>
+          <a:xfrm>
+            <a:off x="3352316" y="5064337"/>
+            <a:ext cx="553779" cy="399222"/>
+          </a:xfrm>
+          <a:prstGeom prst="ellipse">
+            <a:avLst/>
+          </a:prstGeom>
+        </p:spPr>
+        <p:style>
+          <a:lnRef idx="1">
+            <a:schemeClr val="accent1"/>
+          </a:lnRef>
+          <a:fillRef idx="3">
+            <a:schemeClr val="accent1"/>
+          </a:fillRef>
+          <a:effectRef idx="2">
+            <a:schemeClr val="accent1"/>
+          </a:effectRef>
+          <a:fontRef idx="minor">
+            <a:schemeClr val="lt1"/>
+          </a:fontRef>
+        </p:style>
+        <p:txBody>
+          <a:bodyPr rtlCol="0" anchor="ctr" anchorCtr="1"/>
+          <a:lstStyle/>
+          <a:p>
+            <a:pPr algn="ctr"/>
+            <a:r>
+              <a:rPr lang="en-US" sz="1400" b="1" dirty="0" smtClean="0">
+                <a:solidFill>
+                  <a:schemeClr val="bg1"/>
+                </a:solidFill>
+              </a:rPr>
+              <a:t>10</a:t>
+            </a:r>
+            <a:endParaRPr lang="en-US" sz="1400" b="1" dirty="0">
+              <a:solidFill>
+                <a:schemeClr val="bg1"/>
+              </a:solidFill>
+            </a:endParaRPr>
+          </a:p>
+        </p:txBody>
+      </p:sp>
+      <p:sp>
+        <p:nvSpPr>
+          <p:cNvPr id="62" name="TextBox 61"/>
+          <p:cNvSpPr txBox="1"/>
+          <p:nvPr/>
+        </p:nvSpPr>
+        <p:spPr>
+          <a:xfrm>
+            <a:off x="2713730" y="5079793"/>
+            <a:ext cx="646331" cy="307777"/>
+          </a:xfrm>
+          <a:prstGeom prst="rect">
+            <a:avLst/>
+          </a:prstGeom>
+          <a:noFill/>
+        </p:spPr>
+        <p:txBody>
+          <a:bodyPr wrap="none" rtlCol="0">
+            <a:spAutoFit/>
+          </a:bodyPr>
+          <a:lstStyle/>
+          <a:p>
+            <a:r>
+              <a:rPr lang="en-US" sz="1400" dirty="0" smtClean="0"/>
+              <a:t>START</a:t>
+            </a:r>
+            <a:endParaRPr lang="en-US" sz="1400" dirty="0"/>
+          </a:p>
+        </p:txBody>
+      </p:sp>
+      <p:sp>
+        <p:nvSpPr>
+          <p:cNvPr id="63" name="Oval 62"/>
+          <p:cNvSpPr/>
+          <p:nvPr/>
+        </p:nvSpPr>
+        <p:spPr>
+          <a:xfrm>
+            <a:off x="6560472" y="4280949"/>
+            <a:ext cx="319801" cy="326489"/>
+          </a:xfrm>
+          <a:prstGeom prst="ellipse">
+            <a:avLst/>
+          </a:prstGeom>
+        </p:spPr>
+        <p:style>
+          <a:lnRef idx="1">
+            <a:schemeClr val="accent1"/>
+          </a:lnRef>
+          <a:fillRef idx="3">
+            <a:schemeClr val="accent1"/>
+          </a:fillRef>
+          <a:effectRef idx="2">
+            <a:schemeClr val="accent1"/>
+          </a:effectRef>
+          <a:fontRef idx="minor">
+            <a:schemeClr val="lt1"/>
+          </a:fontRef>
+        </p:style>
+        <p:txBody>
+          <a:bodyPr rtlCol="0" anchor="ctr" anchorCtr="1"/>
+          <a:lstStyle/>
+          <a:p>
+            <a:pPr algn="ctr"/>
+            <a:r>
+              <a:rPr lang="en-US" sz="1400" b="1" dirty="0">
+                <a:solidFill>
+                  <a:schemeClr val="bg1"/>
+                </a:solidFill>
+              </a:rPr>
+              <a:t>8</a:t>
+            </a:r>
+          </a:p>
+        </p:txBody>
+      </p:sp>
+      <p:sp>
+        <p:nvSpPr>
+          <p:cNvPr id="64" name="Oval 63"/>
+          <p:cNvSpPr/>
+          <p:nvPr/>
+        </p:nvSpPr>
+        <p:spPr>
+          <a:xfrm>
+            <a:off x="2336178" y="4771920"/>
+            <a:ext cx="319801" cy="326489"/>
+          </a:xfrm>
+          <a:prstGeom prst="ellipse">
+            <a:avLst/>
+          </a:prstGeom>
+        </p:spPr>
+        <p:style>
+          <a:lnRef idx="1">
+            <a:schemeClr val="accent1"/>
+          </a:lnRef>
+          <a:fillRef idx="3">
+            <a:schemeClr val="accent1"/>
+          </a:fillRef>
+          <a:effectRef idx="2">
+            <a:schemeClr val="accent1"/>
+          </a:effectRef>
+          <a:fontRef idx="minor">
+            <a:schemeClr val="lt1"/>
+          </a:fontRef>
+        </p:style>
+        <p:txBody>
+          <a:bodyPr rtlCol="0" anchor="ctr" anchorCtr="1"/>
+          <a:lstStyle/>
+          <a:p>
+            <a:pPr algn="ctr"/>
+            <a:r>
+              <a:rPr lang="en-US" sz="1400" b="1" dirty="0">
+                <a:solidFill>
+                  <a:schemeClr val="bg1"/>
+                </a:solidFill>
+              </a:rPr>
+              <a:t>9</a:t>
+            </a:r>
+          </a:p>
+        </p:txBody>
+      </p:sp>
+      <p:sp>
+        <p:nvSpPr>
+          <p:cNvPr id="65" name="Oval 64"/>
+          <p:cNvSpPr/>
+          <p:nvPr/>
+        </p:nvSpPr>
+        <p:spPr>
+          <a:xfrm>
+            <a:off x="6560472" y="5761861"/>
+            <a:ext cx="553779" cy="399222"/>
+          </a:xfrm>
+          <a:prstGeom prst="ellipse">
+            <a:avLst/>
+          </a:prstGeom>
+        </p:spPr>
+        <p:style>
+          <a:lnRef idx="1">
+            <a:schemeClr val="accent1"/>
+          </a:lnRef>
+          <a:fillRef idx="3">
+            <a:schemeClr val="accent1"/>
+          </a:fillRef>
+          <a:effectRef idx="2">
+            <a:schemeClr val="accent1"/>
+          </a:effectRef>
+          <a:fontRef idx="minor">
+            <a:schemeClr val="lt1"/>
+          </a:fontRef>
+        </p:style>
+        <p:txBody>
+          <a:bodyPr rtlCol="0" anchor="ctr" anchorCtr="1"/>
+          <a:lstStyle/>
+          <a:p>
+            <a:pPr algn="ctr"/>
+            <a:r>
+              <a:rPr lang="en-US" sz="1400" b="1" dirty="0" smtClean="0">
+                <a:solidFill>
+                  <a:schemeClr val="bg1"/>
+                </a:solidFill>
+              </a:rPr>
+              <a:t>11</a:t>
+            </a:r>
+            <a:endParaRPr lang="en-US" sz="1400" b="1" dirty="0">
+              <a:solidFill>
+                <a:schemeClr val="bg1"/>
+              </a:solidFill>
+            </a:endParaRPr>
+          </a:p>
+        </p:txBody>
+      </p:sp>
+      <p:sp>
+        <p:nvSpPr>
+          <p:cNvPr id="68" name="Oval 67"/>
+          <p:cNvSpPr/>
+          <p:nvPr/>
+        </p:nvSpPr>
+        <p:spPr>
+          <a:xfrm>
+            <a:off x="3075426" y="6049583"/>
+            <a:ext cx="553779" cy="399222"/>
+          </a:xfrm>
+          <a:prstGeom prst="ellipse">
+            <a:avLst/>
+          </a:prstGeom>
+        </p:spPr>
+        <p:style>
+          <a:lnRef idx="1">
+            <a:schemeClr val="accent1"/>
+          </a:lnRef>
+          <a:fillRef idx="3">
+            <a:schemeClr val="accent1"/>
+          </a:fillRef>
+          <a:effectRef idx="2">
+            <a:schemeClr val="accent1"/>
+          </a:effectRef>
+          <a:fontRef idx="minor">
+            <a:schemeClr val="lt1"/>
+          </a:fontRef>
+        </p:style>
+        <p:txBody>
+          <a:bodyPr rtlCol="0" anchor="ctr" anchorCtr="1"/>
+          <a:lstStyle/>
+          <a:p>
+            <a:pPr algn="ctr"/>
+            <a:r>
+              <a:rPr lang="en-US" sz="1400" b="1" dirty="0" smtClean="0">
+                <a:solidFill>
+                  <a:schemeClr val="bg1"/>
+                </a:solidFill>
+              </a:rPr>
+              <a:t>12</a:t>
+            </a:r>
+            <a:endParaRPr lang="en-US" sz="1400" b="1" dirty="0">
+              <a:solidFill>
+                <a:schemeClr val="bg1"/>
+              </a:solidFill>
+            </a:endParaRPr>
+          </a:p>
+        </p:txBody>
+      </p:sp>
+    </p:spTree>
+    <p:extLst>
+      <p:ext uri="{BB962C8B-B14F-4D97-AF65-F5344CB8AC3E}">
+        <p14:creationId xmlns:p14="http://schemas.microsoft.com/office/powerpoint/2010/main" val="1466067732"/>
+      </p:ext>
+    </p:extLst>
+  </p:cSld>
+  <p:clrMapOvr>
+    <a:masterClrMapping/>
+  </p:clrMapOvr>
+</p:sld>
+</file>
+
+<file path=ppt/slides/slide6.xml><?xml version="1.0" encoding="utf-8"?>
+<p:sld xmlns:a="http://schemas.openxmlformats.org/drawingml/2006/main" xmlns:r="http://schemas.openxmlformats.org/officeDocument/2006/relationships" xmlns:p="http://schemas.openxmlformats.org/presentationml/2006/main">
+  <p:cSld>
+    <p:spTree>
+      <p:nvGrpSpPr>
+        <p:cNvPr id="1" name=""/>
+        <p:cNvGrpSpPr/>
+        <p:nvPr/>
+      </p:nvGrpSpPr>
+      <p:grpSpPr>
+        <a:xfrm>
+          <a:off x="0" y="0"/>
+          <a:ext cx="0" cy="0"/>
+          <a:chOff x="0" y="0"/>
+          <a:chExt cx="0" cy="0"/>
+        </a:xfrm>
+      </p:grpSpPr>
+      <p:sp>
+        <p:nvSpPr>
+          <p:cNvPr id="4" name="Rounded Rectangle 3"/>
+          <p:cNvSpPr/>
+          <p:nvPr/>
+        </p:nvSpPr>
+        <p:spPr>
+          <a:xfrm>
+            <a:off x="3472117" y="1702426"/>
+            <a:ext cx="787630" cy="534046"/>
+          </a:xfrm>
+          <a:prstGeom prst="roundRect">
+            <a:avLst/>
+          </a:prstGeom>
+          <a:solidFill>
+            <a:srgbClr val="009473"/>
+          </a:solidFill>
+          <a:ln w="6350" cap="flat" cmpd="sng" algn="ctr">
+            <a:noFill/>
+            <a:prstDash val="solid"/>
+            <a:round/>
+            <a:headEnd type="none" w="med" len="med"/>
+            <a:tailEnd type="none" w="med" len="med"/>
+          </a:ln>
+          <a:effectLst>
+            <a:outerShdw blurRad="190500" dist="25400" dir="2700000">
+              <a:srgbClr val="000000">
+                <a:alpha val="43000"/>
+              </a:srgbClr>
+            </a:outerShdw>
+          </a:effectLst>
+        </p:spPr>
+        <p:txBody>
+          <a:bodyPr rtlCol="0" anchor="ctr"/>
+          <a:lstStyle/>
+          <a:p>
+            <a:pPr algn="ctr" defTabSz="914400" fontAlgn="auto">
+              <a:spcBef>
+                <a:spcPts val="0"/>
+              </a:spcBef>
+              <a:spcAft>
+                <a:spcPts val="0"/>
+              </a:spcAft>
+            </a:pPr>
+            <a:r>
+              <a:rPr lang="en-US" sz="1600" kern="0" dirty="0" err="1" smtClean="0">
+                <a:solidFill>
+                  <a:schemeClr val="bg1"/>
+                </a:solidFill>
+                <a:latin typeface="Tahoma"/>
+              </a:rPr>
+              <a:t>Iperf</a:t>
+            </a:r>
+            <a:endParaRPr lang="en-US" sz="1600" kern="0" dirty="0">
+              <a:solidFill>
+                <a:schemeClr val="bg1"/>
+              </a:solidFill>
+              <a:latin typeface="Tahoma"/>
+            </a:endParaRPr>
+          </a:p>
+          <a:p>
+            <a:pPr algn="ctr" defTabSz="914400" fontAlgn="auto">
+              <a:spcBef>
+                <a:spcPts val="0"/>
+              </a:spcBef>
+              <a:spcAft>
+                <a:spcPts val="0"/>
+              </a:spcAft>
+            </a:pPr>
+            <a:r>
+              <a:rPr lang="en-US" sz="1600" kern="0" dirty="0" smtClean="0">
+                <a:solidFill>
+                  <a:schemeClr val="bg1"/>
+                </a:solidFill>
+                <a:latin typeface="Tahoma"/>
+              </a:rPr>
+              <a:t>client</a:t>
+            </a:r>
+            <a:endParaRPr lang="en-US" sz="1600" kern="0" dirty="0">
+              <a:solidFill>
+                <a:schemeClr val="bg1"/>
+              </a:solidFill>
+              <a:latin typeface="Tahoma"/>
+            </a:endParaRPr>
+          </a:p>
+        </p:txBody>
+      </p:sp>
+      <p:sp>
+        <p:nvSpPr>
+          <p:cNvPr id="5" name="Rounded Rectangle 4"/>
+          <p:cNvSpPr/>
+          <p:nvPr/>
+        </p:nvSpPr>
+        <p:spPr>
+          <a:xfrm>
+            <a:off x="5116803" y="3012461"/>
+            <a:ext cx="814504" cy="577666"/>
+          </a:xfrm>
+          <a:prstGeom prst="roundRect">
+            <a:avLst/>
+          </a:prstGeom>
+          <a:solidFill>
+            <a:srgbClr val="E68F00"/>
+          </a:solidFill>
+          <a:ln w="6350" cap="flat" cmpd="sng" algn="ctr">
+            <a:noFill/>
+            <a:prstDash val="solid"/>
+            <a:round/>
+            <a:headEnd type="none" w="med" len="med"/>
+            <a:tailEnd type="none" w="med" len="med"/>
+          </a:ln>
+          <a:effectLst>
+            <a:outerShdw blurRad="190500" dist="25400" dir="2700000">
+              <a:srgbClr val="000000">
+                <a:alpha val="43000"/>
+              </a:srgbClr>
+            </a:outerShdw>
+          </a:effectLst>
+        </p:spPr>
+        <p:txBody>
+          <a:bodyPr rtlCol="0" anchor="b"/>
+          <a:lstStyle/>
+          <a:p>
+            <a:pPr algn="ctr"/>
+            <a:r>
+              <a:rPr lang="en-US" sz="1600" kern="0" dirty="0" err="1" smtClean="0">
+                <a:solidFill>
+                  <a:schemeClr val="bg1"/>
+                </a:solidFill>
+                <a:latin typeface="Tahoma"/>
+              </a:rPr>
+              <a:t>Iperf</a:t>
+            </a:r>
+            <a:endParaRPr lang="en-US" sz="1600" kern="0" dirty="0" smtClean="0">
+              <a:solidFill>
+                <a:schemeClr val="bg1"/>
+              </a:solidFill>
+              <a:latin typeface="Tahoma"/>
+            </a:endParaRPr>
+          </a:p>
+          <a:p>
+            <a:pPr algn="ctr"/>
+            <a:r>
+              <a:rPr lang="en-US" sz="1600" kern="0" dirty="0" smtClean="0">
+                <a:solidFill>
+                  <a:schemeClr val="bg1"/>
+                </a:solidFill>
+                <a:latin typeface="Tahoma"/>
+              </a:rPr>
+              <a:t>server</a:t>
+            </a:r>
+            <a:endParaRPr lang="en-US" sz="1600" kern="0" dirty="0">
+              <a:solidFill>
+                <a:schemeClr val="bg1"/>
+              </a:solidFill>
+              <a:latin typeface="Tahoma"/>
+            </a:endParaRPr>
+          </a:p>
+        </p:txBody>
+      </p:sp>
+      <p:cxnSp>
+        <p:nvCxnSpPr>
+          <p:cNvPr id="6" name="Elbow Connector 21"/>
+          <p:cNvCxnSpPr>
+            <a:stCxn id="5" idx="0"/>
+            <a:endCxn id="4" idx="3"/>
+          </p:cNvCxnSpPr>
+          <p:nvPr/>
+        </p:nvCxnSpPr>
+        <p:spPr>
+          <a:xfrm rot="16200000" flipV="1">
+            <a:off x="4370395" y="1858801"/>
+            <a:ext cx="1043012" cy="1264308"/>
+          </a:xfrm>
+          <a:prstGeom prst="curvedConnector2">
+            <a:avLst/>
+          </a:prstGeom>
+          <a:ln>
+            <a:headEnd type="none" w="med" len="med"/>
+            <a:tailEnd type="triangle" w="med" len="med"/>
+          </a:ln>
+        </p:spPr>
+        <p:style>
+          <a:lnRef idx="2">
+            <a:schemeClr val="accent1"/>
+          </a:lnRef>
+          <a:fillRef idx="0">
+            <a:schemeClr val="accent1"/>
+          </a:fillRef>
+          <a:effectRef idx="1">
+            <a:schemeClr val="accent1"/>
+          </a:effectRef>
+          <a:fontRef idx="minor">
+            <a:schemeClr val="tx1"/>
+          </a:fontRef>
+        </p:style>
+      </p:cxnSp>
+    </p:spTree>
+    <p:extLst>
+      <p:ext uri="{BB962C8B-B14F-4D97-AF65-F5344CB8AC3E}">
+        <p14:creationId xmlns:p14="http://schemas.microsoft.com/office/powerpoint/2010/main" val="511048250"/>
       </p:ext>
     </p:extLst>
   </p:cSld>

</xml_diff>

<commit_message>
added a full example
</commit_message>
<xml_diff>
--- a/docs/images/openbaton-stencils.pptx
+++ b/docs/images/openbaton-stencils.pptx
@@ -9383,7 +9383,7 @@
         </p:nvGrpSpPr>
         <p:grpSpPr>
           <a:xfrm>
-            <a:off x="719811" y="-328889"/>
+            <a:off x="710674" y="-328889"/>
             <a:ext cx="1107618" cy="7053291"/>
             <a:chOff x="719811" y="858819"/>
             <a:chExt cx="1308636" cy="4997605"/>
@@ -9494,7 +9494,7 @@
         </p:nvGrpSpPr>
         <p:grpSpPr>
           <a:xfrm>
-            <a:off x="4131316" y="-392845"/>
+            <a:off x="4122179" y="-392845"/>
             <a:ext cx="1331375" cy="7117247"/>
             <a:chOff x="3502176" y="875106"/>
             <a:chExt cx="1935747" cy="4981318"/>
@@ -9603,7 +9603,7 @@
         </p:nvGrpSpPr>
         <p:grpSpPr>
           <a:xfrm>
-            <a:off x="7455912" y="-392843"/>
+            <a:off x="7446775" y="-392843"/>
             <a:ext cx="1149670" cy="7117245"/>
             <a:chOff x="6669835" y="858819"/>
             <a:chExt cx="1935747" cy="4997605"/>
@@ -9721,7 +9721,7 @@
         </p:nvSpPr>
         <p:spPr>
           <a:xfrm>
-            <a:off x="2519605" y="279373"/>
+            <a:off x="2510468" y="279373"/>
             <a:ext cx="1031415" cy="307777"/>
           </a:xfrm>
           <a:prstGeom prst="rect">
@@ -9751,7 +9751,7 @@
         </p:nvCxnSpPr>
         <p:spPr>
           <a:xfrm>
-            <a:off x="1273620" y="648705"/>
+            <a:off x="1264483" y="648705"/>
             <a:ext cx="3523384" cy="0"/>
           </a:xfrm>
           <a:prstGeom prst="line">
@@ -9782,7 +9782,7 @@
         </p:nvSpPr>
         <p:spPr>
           <a:xfrm>
-            <a:off x="4678559" y="757439"/>
+            <a:off x="4669422" y="757439"/>
             <a:ext cx="236889" cy="490380"/>
           </a:xfrm>
           <a:prstGeom prst="roundRect">
@@ -9831,7 +9831,7 @@
         </p:nvSpPr>
         <p:spPr>
           <a:xfrm>
-            <a:off x="4915448" y="832320"/>
+            <a:off x="4906311" y="832320"/>
             <a:ext cx="928459" cy="276999"/>
           </a:xfrm>
           <a:prstGeom prst="rect">
@@ -9861,7 +9861,7 @@
         </p:nvCxnSpPr>
         <p:spPr>
           <a:xfrm flipH="1">
-            <a:off x="1273620" y="1349303"/>
+            <a:off x="1264483" y="1349303"/>
             <a:ext cx="3523385" cy="0"/>
           </a:xfrm>
           <a:prstGeom prst="line">
@@ -9892,7 +9892,7 @@
         </p:nvSpPr>
         <p:spPr>
           <a:xfrm>
-            <a:off x="2205197" y="982317"/>
+            <a:off x="2196060" y="982317"/>
             <a:ext cx="1660230" cy="307777"/>
           </a:xfrm>
           <a:prstGeom prst="rect">
@@ -9922,7 +9922,7 @@
         </p:nvCxnSpPr>
         <p:spPr>
           <a:xfrm>
-            <a:off x="1273621" y="1550298"/>
+            <a:off x="1264484" y="1550298"/>
             <a:ext cx="3523384" cy="0"/>
           </a:xfrm>
           <a:prstGeom prst="line">
@@ -9953,7 +9953,7 @@
         </p:nvCxnSpPr>
         <p:spPr>
           <a:xfrm flipH="1">
-            <a:off x="1273619" y="1938856"/>
+            <a:off x="1264482" y="1938856"/>
             <a:ext cx="3523385" cy="0"/>
           </a:xfrm>
           <a:prstGeom prst="line">
@@ -9984,7 +9984,7 @@
         </p:nvSpPr>
         <p:spPr>
           <a:xfrm>
-            <a:off x="2091497" y="1590142"/>
+            <a:off x="2082360" y="1590142"/>
             <a:ext cx="1887631" cy="307777"/>
           </a:xfrm>
           <a:prstGeom prst="rect">
@@ -10014,7 +10014,7 @@
         </p:nvCxnSpPr>
         <p:spPr>
           <a:xfrm>
-            <a:off x="1273620" y="2139851"/>
+            <a:off x="1264483" y="2139851"/>
             <a:ext cx="3523384" cy="0"/>
           </a:xfrm>
           <a:prstGeom prst="line">
@@ -10045,7 +10045,7 @@
         </p:nvSpPr>
         <p:spPr>
           <a:xfrm>
-            <a:off x="4678559" y="2289432"/>
+            <a:off x="4669422" y="2289432"/>
             <a:ext cx="236889" cy="1145871"/>
           </a:xfrm>
           <a:prstGeom prst="roundRect">
@@ -10094,7 +10094,7 @@
         </p:nvSpPr>
         <p:spPr>
           <a:xfrm>
-            <a:off x="3906096" y="2642189"/>
+            <a:off x="3896959" y="2642189"/>
             <a:ext cx="854696" cy="276999"/>
           </a:xfrm>
           <a:prstGeom prst="rect">
@@ -10124,7 +10124,7 @@
         </p:nvCxnSpPr>
         <p:spPr>
           <a:xfrm>
-            <a:off x="4915448" y="2442745"/>
+            <a:off x="4906311" y="2442745"/>
             <a:ext cx="3115299" cy="0"/>
           </a:xfrm>
           <a:prstGeom prst="line">
@@ -10155,7 +10155,7 @@
         </p:nvCxnSpPr>
         <p:spPr>
           <a:xfrm flipH="1">
-            <a:off x="4915448" y="3297234"/>
+            <a:off x="4906311" y="3297234"/>
             <a:ext cx="3115300" cy="0"/>
           </a:xfrm>
           <a:prstGeom prst="line">
@@ -10186,7 +10186,7 @@
         </p:nvSpPr>
         <p:spPr>
           <a:xfrm>
-            <a:off x="6325239" y="2631309"/>
+            <a:off x="6316102" y="2631309"/>
             <a:ext cx="86101" cy="86887"/>
           </a:xfrm>
           <a:prstGeom prst="ellipse">
@@ -10233,7 +10233,7 @@
         </p:nvSpPr>
         <p:spPr>
           <a:xfrm>
-            <a:off x="6325239" y="2820253"/>
+            <a:off x="6316102" y="2820253"/>
             <a:ext cx="86101" cy="86887"/>
           </a:xfrm>
           <a:prstGeom prst="ellipse">
@@ -10280,7 +10280,7 @@
         </p:nvSpPr>
         <p:spPr>
           <a:xfrm>
-            <a:off x="6325239" y="3009197"/>
+            <a:off x="6316102" y="3009197"/>
             <a:ext cx="86101" cy="86887"/>
           </a:xfrm>
           <a:prstGeom prst="ellipse">
@@ -10327,7 +10327,7 @@
         </p:nvSpPr>
         <p:spPr>
           <a:xfrm>
-            <a:off x="5343025" y="2119093"/>
+            <a:off x="5333888" y="2119093"/>
             <a:ext cx="2043060" cy="307777"/>
           </a:xfrm>
           <a:prstGeom prst="rect">
@@ -10357,7 +10357,7 @@
         </p:nvCxnSpPr>
         <p:spPr>
           <a:xfrm flipH="1">
-            <a:off x="1273619" y="3566526"/>
+            <a:off x="1264482" y="3566526"/>
             <a:ext cx="3523385" cy="0"/>
           </a:xfrm>
           <a:prstGeom prst="line">
@@ -10388,7 +10388,7 @@
         </p:nvCxnSpPr>
         <p:spPr>
           <a:xfrm>
-            <a:off x="1270691" y="3991547"/>
+            <a:off x="1261554" y="3991547"/>
             <a:ext cx="3523384" cy="0"/>
           </a:xfrm>
           <a:prstGeom prst="line">
@@ -10419,7 +10419,7 @@
         </p:nvSpPr>
         <p:spPr>
           <a:xfrm>
-            <a:off x="4675630" y="4141129"/>
+            <a:off x="4666493" y="4141129"/>
             <a:ext cx="236889" cy="806652"/>
           </a:xfrm>
           <a:prstGeom prst="roundRect">
@@ -10468,7 +10468,7 @@
         </p:nvSpPr>
         <p:spPr>
           <a:xfrm>
-            <a:off x="4116070" y="4442381"/>
+            <a:off x="4106933" y="4442381"/>
             <a:ext cx="633507" cy="276999"/>
           </a:xfrm>
           <a:prstGeom prst="rect">
@@ -10498,7 +10498,7 @@
         </p:nvCxnSpPr>
         <p:spPr>
           <a:xfrm>
-            <a:off x="4915449" y="4221668"/>
+            <a:off x="4906312" y="4221668"/>
             <a:ext cx="3115299" cy="0"/>
           </a:xfrm>
           <a:prstGeom prst="line">
@@ -10529,7 +10529,7 @@
         </p:nvCxnSpPr>
         <p:spPr>
           <a:xfrm flipH="1">
-            <a:off x="4915448" y="4902562"/>
+            <a:off x="4906311" y="4902562"/>
             <a:ext cx="3115300" cy="0"/>
           </a:xfrm>
           <a:prstGeom prst="line">
@@ -10560,7 +10560,7 @@
         </p:nvSpPr>
         <p:spPr>
           <a:xfrm>
-            <a:off x="6323775" y="4532578"/>
+            <a:off x="6314638" y="4532578"/>
             <a:ext cx="86101" cy="86887"/>
           </a:xfrm>
           <a:prstGeom prst="ellipse">
@@ -10607,7 +10607,7 @@
         </p:nvSpPr>
         <p:spPr>
           <a:xfrm>
-            <a:off x="6323775" y="4386982"/>
+            <a:off x="6314638" y="4386982"/>
             <a:ext cx="86101" cy="86887"/>
           </a:xfrm>
           <a:prstGeom prst="ellipse">
@@ -10654,7 +10654,7 @@
         </p:nvSpPr>
         <p:spPr>
           <a:xfrm>
-            <a:off x="6323775" y="4678173"/>
+            <a:off x="6314638" y="4678173"/>
             <a:ext cx="86101" cy="86887"/>
           </a:xfrm>
           <a:prstGeom prst="ellipse">
@@ -10701,7 +10701,7 @@
         </p:nvSpPr>
         <p:spPr>
           <a:xfrm>
-            <a:off x="5632799" y="3894458"/>
+            <a:off x="5623662" y="3894458"/>
             <a:ext cx="1463512" cy="307777"/>
           </a:xfrm>
           <a:prstGeom prst="rect">
@@ -10731,7 +10731,7 @@
         </p:nvCxnSpPr>
         <p:spPr>
           <a:xfrm flipH="1">
-            <a:off x="1270690" y="5052782"/>
+            <a:off x="1261553" y="5052782"/>
             <a:ext cx="3523385" cy="0"/>
           </a:xfrm>
           <a:prstGeom prst="line">
@@ -10762,7 +10762,7 @@
         </p:nvCxnSpPr>
         <p:spPr>
           <a:xfrm>
-            <a:off x="1273621" y="5387570"/>
+            <a:off x="1264484" y="5387570"/>
             <a:ext cx="3523384" cy="0"/>
           </a:xfrm>
           <a:prstGeom prst="line">
@@ -10793,7 +10793,7 @@
         </p:nvSpPr>
         <p:spPr>
           <a:xfrm>
-            <a:off x="4654763" y="5537152"/>
+            <a:off x="4645626" y="5537152"/>
             <a:ext cx="236889" cy="806652"/>
           </a:xfrm>
           <a:prstGeom prst="roundRect">
@@ -10842,7 +10842,7 @@
         </p:nvSpPr>
         <p:spPr>
           <a:xfrm>
-            <a:off x="4223121" y="5884084"/>
+            <a:off x="4213984" y="5884084"/>
             <a:ext cx="479618" cy="276999"/>
           </a:xfrm>
           <a:prstGeom prst="rect">
@@ -10872,7 +10872,7 @@
         </p:nvCxnSpPr>
         <p:spPr>
           <a:xfrm>
-            <a:off x="4894582" y="5617691"/>
+            <a:off x="4885445" y="5617691"/>
             <a:ext cx="3115299" cy="0"/>
           </a:xfrm>
           <a:prstGeom prst="line">
@@ -10903,7 +10903,7 @@
         </p:nvCxnSpPr>
         <p:spPr>
           <a:xfrm flipH="1">
-            <a:off x="4894581" y="6298585"/>
+            <a:off x="4885444" y="6298585"/>
             <a:ext cx="3115300" cy="0"/>
           </a:xfrm>
           <a:prstGeom prst="line">
@@ -10934,7 +10934,7 @@
         </p:nvSpPr>
         <p:spPr>
           <a:xfrm>
-            <a:off x="6357730" y="5928601"/>
+            <a:off x="6348593" y="5928601"/>
             <a:ext cx="86101" cy="86887"/>
           </a:xfrm>
           <a:prstGeom prst="ellipse">
@@ -10981,7 +10981,7 @@
         </p:nvSpPr>
         <p:spPr>
           <a:xfrm>
-            <a:off x="6357730" y="5783005"/>
+            <a:off x="6348593" y="5783005"/>
             <a:ext cx="86101" cy="86887"/>
           </a:xfrm>
           <a:prstGeom prst="ellipse">
@@ -11028,7 +11028,7 @@
         </p:nvSpPr>
         <p:spPr>
           <a:xfrm>
-            <a:off x="6357730" y="6074196"/>
+            <a:off x="6348593" y="6074196"/>
             <a:ext cx="86101" cy="86887"/>
           </a:xfrm>
           <a:prstGeom prst="ellipse">
@@ -11075,7 +11075,7 @@
         </p:nvSpPr>
         <p:spPr>
           <a:xfrm>
-            <a:off x="5632799" y="5290481"/>
+            <a:off x="5623662" y="5290481"/>
             <a:ext cx="1463512" cy="307777"/>
           </a:xfrm>
           <a:prstGeom prst="rect">
@@ -11105,7 +11105,7 @@
         </p:nvCxnSpPr>
         <p:spPr>
           <a:xfrm flipH="1">
-            <a:off x="1273621" y="6448805"/>
+            <a:off x="1264484" y="6448805"/>
             <a:ext cx="3499588" cy="0"/>
           </a:xfrm>
           <a:prstGeom prst="line">
@@ -11136,7 +11136,7 @@
         </p:nvSpPr>
         <p:spPr>
           <a:xfrm>
-            <a:off x="3746195" y="1017008"/>
+            <a:off x="4933683" y="587150"/>
             <a:ext cx="319801" cy="326489"/>
           </a:xfrm>
           <a:prstGeom prst="ellipse">
@@ -11186,7 +11186,7 @@
         </p:nvSpPr>
         <p:spPr>
           <a:xfrm>
-            <a:off x="3542636" y="288979"/>
+            <a:off x="3734513" y="288979"/>
             <a:ext cx="319801" cy="326489"/>
           </a:xfrm>
           <a:prstGeom prst="ellipse">
@@ -11231,7 +11231,7 @@
         </p:nvSpPr>
         <p:spPr>
           <a:xfrm>
-            <a:off x="3805151" y="1612367"/>
+            <a:off x="4188905" y="1603231"/>
             <a:ext cx="319801" cy="326489"/>
           </a:xfrm>
           <a:prstGeom prst="ellipse">
@@ -11258,13 +11258,18 @@
           <a:p>
             <a:pPr algn="ctr"/>
             <a:r>
-              <a:rPr lang="en-US" sz="1400" b="1" dirty="0">
+              <a:rPr lang="en-US" sz="1400" b="1" dirty="0" smtClean="0">
                 <a:solidFill>
                   <a:schemeClr val="bg1"/>
                 </a:solidFill>
               </a:rPr>
-              <a:t>3</a:t>
-            </a:r>
+              <a:t>4</a:t>
+            </a:r>
+            <a:endParaRPr lang="en-US" sz="1400" b="1" dirty="0">
+              <a:solidFill>
+                <a:schemeClr val="bg1"/>
+              </a:solidFill>
+            </a:endParaRPr>
           </a:p>
         </p:txBody>
       </p:sp>
@@ -11276,7 +11281,7 @@
         </p:nvSpPr>
         <p:spPr>
           <a:xfrm>
-            <a:off x="4321423" y="2315700"/>
+            <a:off x="4312286" y="2315700"/>
             <a:ext cx="319801" cy="326489"/>
           </a:xfrm>
           <a:prstGeom prst="ellipse">
@@ -11308,7 +11313,7 @@
                   <a:schemeClr val="bg1"/>
                 </a:solidFill>
               </a:rPr>
-              <a:t>4</a:t>
+              <a:t>5</a:t>
             </a:r>
           </a:p>
         </p:txBody>
@@ -11321,7 +11326,7 @@
         </p:nvSpPr>
         <p:spPr>
           <a:xfrm>
-            <a:off x="6560472" y="2580651"/>
+            <a:off x="6551335" y="2580651"/>
             <a:ext cx="319801" cy="326489"/>
           </a:xfrm>
           <a:prstGeom prst="ellipse">
@@ -11348,18 +11353,13 @@
           <a:p>
             <a:pPr algn="ctr"/>
             <a:r>
-              <a:rPr lang="en-US" sz="1400" b="1" dirty="0" smtClean="0">
+              <a:rPr lang="en-US" sz="1400" b="1" dirty="0">
                 <a:solidFill>
                   <a:schemeClr val="bg1"/>
                 </a:solidFill>
               </a:rPr>
-              <a:t>5</a:t>
-            </a:r>
-            <a:endParaRPr lang="en-US" sz="1400" b="1" dirty="0">
-              <a:solidFill>
-                <a:schemeClr val="bg1"/>
-              </a:solidFill>
-            </a:endParaRPr>
+              <a:t>6</a:t>
+            </a:r>
           </a:p>
         </p:txBody>
       </p:sp>
@@ -11371,7 +11371,7 @@
         </p:nvSpPr>
         <p:spPr>
           <a:xfrm>
-            <a:off x="2594949" y="3272058"/>
+            <a:off x="2585812" y="3272058"/>
             <a:ext cx="319801" cy="326489"/>
           </a:xfrm>
           <a:prstGeom prst="ellipse">
@@ -11403,7 +11403,7 @@
                   <a:schemeClr val="bg1"/>
                 </a:solidFill>
               </a:rPr>
-              <a:t>6</a:t>
+              <a:t>7</a:t>
             </a:r>
           </a:p>
         </p:txBody>
@@ -11416,7 +11416,7 @@
         </p:nvSpPr>
         <p:spPr>
           <a:xfrm>
-            <a:off x="3398983" y="3676397"/>
+            <a:off x="3481216" y="3676397"/>
             <a:ext cx="319801" cy="326489"/>
           </a:xfrm>
           <a:prstGeom prst="ellipse">
@@ -11443,18 +11443,13 @@
           <a:p>
             <a:pPr algn="ctr"/>
             <a:r>
-              <a:rPr lang="en-US" sz="1400" b="1" dirty="0" smtClean="0">
+              <a:rPr lang="en-US" sz="1400" b="1" dirty="0">
                 <a:solidFill>
                   <a:schemeClr val="bg1"/>
                 </a:solidFill>
               </a:rPr>
-              <a:t>7</a:t>
-            </a:r>
-            <a:endParaRPr lang="en-US" sz="1400" b="1" dirty="0">
-              <a:solidFill>
-                <a:schemeClr val="bg1"/>
-              </a:solidFill>
-            </a:endParaRPr>
+              <a:t>8</a:t>
+            </a:r>
           </a:p>
         </p:txBody>
       </p:sp>
@@ -11466,7 +11461,7 @@
         </p:nvSpPr>
         <p:spPr>
           <a:xfrm>
-            <a:off x="2641615" y="3691853"/>
+            <a:off x="2632478" y="3691853"/>
             <a:ext cx="787395" cy="307777"/>
           </a:xfrm>
           <a:prstGeom prst="rect">
@@ -11496,7 +11491,7 @@
         </p:nvSpPr>
         <p:spPr>
           <a:xfrm>
-            <a:off x="3352316" y="5064337"/>
+            <a:off x="2004584" y="4702951"/>
             <a:ext cx="553779" cy="399222"/>
           </a:xfrm>
           <a:prstGeom prst="ellipse">
@@ -11546,7 +11541,7 @@
         </p:nvSpPr>
         <p:spPr>
           <a:xfrm>
-            <a:off x="2713730" y="5079793"/>
+            <a:off x="2704593" y="5079793"/>
             <a:ext cx="646331" cy="307777"/>
           </a:xfrm>
           <a:prstGeom prst="rect">
@@ -11576,7 +11571,7 @@
         </p:nvSpPr>
         <p:spPr>
           <a:xfrm>
-            <a:off x="6560472" y="4280949"/>
+            <a:off x="6551335" y="4280949"/>
             <a:ext cx="319801" cy="326489"/>
           </a:xfrm>
           <a:prstGeom prst="ellipse">
@@ -11603,26 +11598,31 @@
           <a:p>
             <a:pPr algn="ctr"/>
             <a:r>
-              <a:rPr lang="en-US" sz="1400" b="1" dirty="0">
+              <a:rPr lang="en-US" sz="1400" b="1" dirty="0" smtClean="0">
                 <a:solidFill>
                   <a:schemeClr val="bg1"/>
                 </a:solidFill>
               </a:rPr>
-              <a:t>8</a:t>
-            </a:r>
-          </a:p>
-        </p:txBody>
-      </p:sp>
-      <p:sp>
-        <p:nvSpPr>
-          <p:cNvPr id="64" name="Oval 63"/>
+              <a:t>9</a:t>
+            </a:r>
+            <a:endParaRPr lang="en-US" sz="1400" b="1" dirty="0">
+              <a:solidFill>
+                <a:schemeClr val="bg1"/>
+              </a:solidFill>
+            </a:endParaRPr>
+          </a:p>
+        </p:txBody>
+      </p:sp>
+      <p:sp>
+        <p:nvSpPr>
+          <p:cNvPr id="65" name="Oval 64"/>
           <p:cNvSpPr/>
           <p:nvPr/>
         </p:nvSpPr>
         <p:spPr>
           <a:xfrm>
-            <a:off x="2336178" y="4771920"/>
-            <a:ext cx="319801" cy="326489"/>
+            <a:off x="6551335" y="5761861"/>
+            <a:ext cx="553779" cy="399222"/>
           </a:xfrm>
           <a:prstGeom prst="ellipse">
             <a:avLst/>
@@ -11648,25 +11648,30 @@
           <a:p>
             <a:pPr algn="ctr"/>
             <a:r>
-              <a:rPr lang="en-US" sz="1400" b="1" dirty="0">
+              <a:rPr lang="en-US" sz="1400" b="1" dirty="0" smtClean="0">
                 <a:solidFill>
                   <a:schemeClr val="bg1"/>
                 </a:solidFill>
               </a:rPr>
-              <a:t>9</a:t>
-            </a:r>
-          </a:p>
-        </p:txBody>
-      </p:sp>
-      <p:sp>
-        <p:nvSpPr>
-          <p:cNvPr id="65" name="Oval 64"/>
+              <a:t>12</a:t>
+            </a:r>
+            <a:endParaRPr lang="en-US" sz="1400" b="1" dirty="0">
+              <a:solidFill>
+                <a:schemeClr val="bg1"/>
+              </a:solidFill>
+            </a:endParaRPr>
+          </a:p>
+        </p:txBody>
+      </p:sp>
+      <p:sp>
+        <p:nvSpPr>
+          <p:cNvPr id="68" name="Oval 67"/>
           <p:cNvSpPr/>
           <p:nvPr/>
         </p:nvSpPr>
         <p:spPr>
           <a:xfrm>
-            <a:off x="6560472" y="5761861"/>
+            <a:off x="3066289" y="6049583"/>
             <a:ext cx="553779" cy="399222"/>
           </a:xfrm>
           <a:prstGeom prst="ellipse">
@@ -11698,7 +11703,7 @@
                   <a:schemeClr val="bg1"/>
                 </a:solidFill>
               </a:rPr>
-              <a:t>11</a:t>
+              <a:t>13</a:t>
             </a:r>
             <a:endParaRPr lang="en-US" sz="1400" b="1" dirty="0">
               <a:solidFill>
@@ -11710,14 +11715,14 @@
       </p:sp>
       <p:sp>
         <p:nvSpPr>
-          <p:cNvPr id="68" name="Oval 67"/>
+          <p:cNvPr id="75" name="Oval 74"/>
           <p:cNvSpPr/>
           <p:nvPr/>
         </p:nvSpPr>
         <p:spPr>
           <a:xfrm>
-            <a:off x="3075426" y="6049583"/>
-            <a:ext cx="553779" cy="399222"/>
+            <a:off x="4202641" y="963605"/>
+            <a:ext cx="319801" cy="326489"/>
           </a:xfrm>
           <a:prstGeom prst="ellipse">
             <a:avLst/>
@@ -11748,7 +11753,57 @@
                   <a:schemeClr val="bg1"/>
                 </a:solidFill>
               </a:rPr>
-              <a:t>12</a:t>
+              <a:t>3</a:t>
+            </a:r>
+            <a:endParaRPr lang="en-US" sz="1400" b="1" dirty="0">
+              <a:solidFill>
+                <a:schemeClr val="bg1"/>
+              </a:solidFill>
+            </a:endParaRPr>
+          </a:p>
+        </p:txBody>
+      </p:sp>
+      <p:sp>
+        <p:nvSpPr>
+          <p:cNvPr id="77" name="Oval 76"/>
+          <p:cNvSpPr/>
+          <p:nvPr/>
+        </p:nvSpPr>
+        <p:spPr>
+          <a:xfrm>
+            <a:off x="3725338" y="5052782"/>
+            <a:ext cx="553779" cy="399222"/>
+          </a:xfrm>
+          <a:prstGeom prst="ellipse">
+            <a:avLst/>
+          </a:prstGeom>
+        </p:spPr>
+        <p:style>
+          <a:lnRef idx="1">
+            <a:schemeClr val="accent1"/>
+          </a:lnRef>
+          <a:fillRef idx="3">
+            <a:schemeClr val="accent1"/>
+          </a:fillRef>
+          <a:effectRef idx="2">
+            <a:schemeClr val="accent1"/>
+          </a:effectRef>
+          <a:fontRef idx="minor">
+            <a:schemeClr val="lt1"/>
+          </a:fontRef>
+        </p:style>
+        <p:txBody>
+          <a:bodyPr rtlCol="0" anchor="ctr" anchorCtr="1"/>
+          <a:lstStyle/>
+          <a:p>
+            <a:pPr algn="ctr"/>
+            <a:r>
+              <a:rPr lang="en-US" sz="1400" b="1" dirty="0" smtClean="0">
+                <a:solidFill>
+                  <a:schemeClr val="bg1"/>
+                </a:solidFill>
+              </a:rPr>
+              <a:t>11</a:t>
             </a:r>
             <a:endParaRPr lang="en-US" sz="1400" b="1" dirty="0">
               <a:solidFill>

</xml_diff>

<commit_message>
added state diagram page
</commit_message>
<xml_diff>
--- a/docs/images/openbaton-stencils.pptx
+++ b/docs/images/openbaton-stencils.pptx
@@ -11,6 +11,7 @@
     <p:sldId id="259" r:id="rId5"/>
     <p:sldId id="261" r:id="rId6"/>
     <p:sldId id="260" r:id="rId7"/>
+    <p:sldId id="262" r:id="rId8"/>
   </p:sldIdLst>
   <p:sldSz cx="9144000" cy="6858000" type="screen4x3"/>
   <p:notesSz cx="6858000" cy="9144000"/>
@@ -12044,6 +12045,790 @@
     <p:extLst>
       <p:ext uri="{BB962C8B-B14F-4D97-AF65-F5344CB8AC3E}">
         <p14:creationId xmlns:p14="http://schemas.microsoft.com/office/powerpoint/2010/main" val="511048250"/>
+      </p:ext>
+    </p:extLst>
+  </p:cSld>
+  <p:clrMapOvr>
+    <a:masterClrMapping/>
+  </p:clrMapOvr>
+</p:sld>
+</file>
+
+<file path=ppt/slides/slide7.xml><?xml version="1.0" encoding="utf-8"?>
+<p:sld xmlns:a="http://schemas.openxmlformats.org/drawingml/2006/main" xmlns:r="http://schemas.openxmlformats.org/officeDocument/2006/relationships" xmlns:p="http://schemas.openxmlformats.org/presentationml/2006/main">
+  <p:cSld>
+    <p:spTree>
+      <p:nvGrpSpPr>
+        <p:cNvPr id="1" name=""/>
+        <p:cNvGrpSpPr/>
+        <p:nvPr/>
+      </p:nvGrpSpPr>
+      <p:grpSpPr>
+        <a:xfrm>
+          <a:off x="0" y="0"/>
+          <a:ext cx="0" cy="0"/>
+          <a:chOff x="0" y="0"/>
+          <a:chExt cx="0" cy="0"/>
+        </a:xfrm>
+      </p:grpSpPr>
+      <p:sp>
+        <p:nvSpPr>
+          <p:cNvPr id="6" name="Oval 5"/>
+          <p:cNvSpPr/>
+          <p:nvPr/>
+        </p:nvSpPr>
+        <p:spPr>
+          <a:xfrm>
+            <a:off x="453923" y="542105"/>
+            <a:ext cx="1809155" cy="914400"/>
+          </a:xfrm>
+          <a:prstGeom prst="ellipse">
+            <a:avLst/>
+          </a:prstGeom>
+          <a:solidFill>
+            <a:srgbClr val="009473"/>
+          </a:solidFill>
+          <a:ln w="38100" cap="flat" cmpd="dbl" algn="ctr">
+            <a:solidFill>
+              <a:schemeClr val="tx1"/>
+            </a:solidFill>
+            <a:prstDash val="solid"/>
+            <a:round/>
+            <a:headEnd type="none" w="med" len="med"/>
+            <a:tailEnd type="none" w="med" len="med"/>
+          </a:ln>
+          <a:effectLst>
+            <a:outerShdw blurRad="190500" dist="25400" dir="2700000">
+              <a:srgbClr val="000000">
+                <a:alpha val="43000"/>
+              </a:srgbClr>
+            </a:outerShdw>
+          </a:effectLst>
+        </p:spPr>
+        <p:txBody>
+          <a:bodyPr rtlCol="0" anchor="ctr"/>
+          <a:lstStyle/>
+          <a:p>
+            <a:pPr algn="ctr" defTabSz="914400"/>
+            <a:r>
+              <a:rPr lang="en-US" sz="1600" kern="0" dirty="0" smtClean="0">
+                <a:solidFill>
+                  <a:schemeClr val="bg1"/>
+                </a:solidFill>
+                <a:latin typeface="Tahoma"/>
+              </a:rPr>
+              <a:t>NULL</a:t>
+            </a:r>
+            <a:endParaRPr lang="en-US" sz="1600" kern="0" dirty="0">
+              <a:solidFill>
+                <a:schemeClr val="bg1"/>
+              </a:solidFill>
+              <a:latin typeface="Tahoma"/>
+            </a:endParaRPr>
+          </a:p>
+        </p:txBody>
+      </p:sp>
+      <p:sp>
+        <p:nvSpPr>
+          <p:cNvPr id="7" name="Oval 6"/>
+          <p:cNvSpPr/>
+          <p:nvPr/>
+        </p:nvSpPr>
+        <p:spPr>
+          <a:xfrm>
+            <a:off x="3176764" y="1236850"/>
+            <a:ext cx="1809155" cy="914400"/>
+          </a:xfrm>
+          <a:prstGeom prst="ellipse">
+            <a:avLst/>
+          </a:prstGeom>
+          <a:solidFill>
+            <a:srgbClr val="009473"/>
+          </a:solidFill>
+          <a:ln w="6350" cap="flat" cmpd="sng" algn="ctr">
+            <a:noFill/>
+            <a:prstDash val="solid"/>
+            <a:round/>
+            <a:headEnd type="none" w="med" len="med"/>
+            <a:tailEnd type="none" w="med" len="med"/>
+          </a:ln>
+          <a:effectLst>
+            <a:outerShdw blurRad="190500" dist="25400" dir="2700000">
+              <a:srgbClr val="000000">
+                <a:alpha val="43000"/>
+              </a:srgbClr>
+            </a:outerShdw>
+          </a:effectLst>
+        </p:spPr>
+        <p:txBody>
+          <a:bodyPr rtlCol="0" anchor="ctr"/>
+          <a:lstStyle/>
+          <a:p>
+            <a:pPr algn="ctr" defTabSz="914400"/>
+            <a:r>
+              <a:rPr lang="en-US" sz="1400" kern="0" dirty="0" smtClean="0">
+                <a:solidFill>
+                  <a:schemeClr val="bg1"/>
+                </a:solidFill>
+                <a:latin typeface="Tahoma"/>
+              </a:rPr>
+              <a:t>INSTATIATED</a:t>
+            </a:r>
+            <a:endParaRPr lang="en-US" sz="1400" kern="0" dirty="0">
+              <a:solidFill>
+                <a:schemeClr val="bg1"/>
+              </a:solidFill>
+              <a:latin typeface="Tahoma"/>
+            </a:endParaRPr>
+          </a:p>
+        </p:txBody>
+      </p:sp>
+      <p:cxnSp>
+        <p:nvCxnSpPr>
+          <p:cNvPr id="8" name="Elbow Connector 21"/>
+          <p:cNvCxnSpPr>
+            <a:stCxn id="6" idx="6"/>
+            <a:endCxn id="7" idx="2"/>
+          </p:cNvCxnSpPr>
+          <p:nvPr/>
+        </p:nvCxnSpPr>
+        <p:spPr>
+          <a:xfrm>
+            <a:off x="2263078" y="999305"/>
+            <a:ext cx="913686" cy="694745"/>
+          </a:xfrm>
+          <a:prstGeom prst="curvedConnector3">
+            <a:avLst>
+              <a:gd name="adj1" fmla="val 50000"/>
+            </a:avLst>
+          </a:prstGeom>
+          <a:ln>
+            <a:headEnd type="none" w="med" len="med"/>
+            <a:tailEnd type="triangle" w="med" len="med"/>
+          </a:ln>
+        </p:spPr>
+        <p:style>
+          <a:lnRef idx="2">
+            <a:schemeClr val="accent6"/>
+          </a:lnRef>
+          <a:fillRef idx="0">
+            <a:schemeClr val="accent6"/>
+          </a:fillRef>
+          <a:effectRef idx="1">
+            <a:schemeClr val="accent6"/>
+          </a:effectRef>
+          <a:fontRef idx="minor">
+            <a:schemeClr val="tx1"/>
+          </a:fontRef>
+        </p:style>
+      </p:cxnSp>
+      <p:sp>
+        <p:nvSpPr>
+          <p:cNvPr id="19" name="Oval 18"/>
+          <p:cNvSpPr/>
+          <p:nvPr/>
+        </p:nvSpPr>
+        <p:spPr>
+          <a:xfrm>
+            <a:off x="5640833" y="2663214"/>
+            <a:ext cx="1809155" cy="914400"/>
+          </a:xfrm>
+          <a:prstGeom prst="ellipse">
+            <a:avLst/>
+          </a:prstGeom>
+          <a:solidFill>
+            <a:srgbClr val="009473"/>
+          </a:solidFill>
+          <a:ln w="6350" cap="flat" cmpd="sng" algn="ctr">
+            <a:noFill/>
+            <a:prstDash val="solid"/>
+            <a:round/>
+            <a:headEnd type="none" w="med" len="med"/>
+            <a:tailEnd type="none" w="med" len="med"/>
+          </a:ln>
+          <a:effectLst>
+            <a:outerShdw blurRad="190500" dist="25400" dir="2700000">
+              <a:srgbClr val="000000">
+                <a:alpha val="43000"/>
+              </a:srgbClr>
+            </a:outerShdw>
+          </a:effectLst>
+        </p:spPr>
+        <p:txBody>
+          <a:bodyPr rtlCol="0" anchor="ctr"/>
+          <a:lstStyle/>
+          <a:p>
+            <a:pPr algn="ctr" defTabSz="914400"/>
+            <a:r>
+              <a:rPr lang="en-US" sz="1400" kern="0" dirty="0" smtClean="0">
+                <a:solidFill>
+                  <a:schemeClr val="bg1"/>
+                </a:solidFill>
+                <a:latin typeface="Tahoma"/>
+              </a:rPr>
+              <a:t>INACTIVE</a:t>
+            </a:r>
+            <a:endParaRPr lang="en-US" sz="1400" kern="0" dirty="0">
+              <a:solidFill>
+                <a:schemeClr val="bg1"/>
+              </a:solidFill>
+              <a:latin typeface="Tahoma"/>
+            </a:endParaRPr>
+          </a:p>
+        </p:txBody>
+      </p:sp>
+      <p:cxnSp>
+        <p:nvCxnSpPr>
+          <p:cNvPr id="20" name="Elbow Connector 21"/>
+          <p:cNvCxnSpPr>
+            <a:stCxn id="7" idx="6"/>
+            <a:endCxn id="19" idx="0"/>
+          </p:cNvCxnSpPr>
+          <p:nvPr/>
+        </p:nvCxnSpPr>
+        <p:spPr>
+          <a:xfrm>
+            <a:off x="4985919" y="1694050"/>
+            <a:ext cx="1559492" cy="969164"/>
+          </a:xfrm>
+          <a:prstGeom prst="curvedConnector2">
+            <a:avLst/>
+          </a:prstGeom>
+          <a:ln>
+            <a:headEnd type="none" w="med" len="med"/>
+            <a:tailEnd type="triangle" w="med" len="med"/>
+          </a:ln>
+        </p:spPr>
+        <p:style>
+          <a:lnRef idx="2">
+            <a:schemeClr val="accent6"/>
+          </a:lnRef>
+          <a:fillRef idx="0">
+            <a:schemeClr val="accent6"/>
+          </a:fillRef>
+          <a:effectRef idx="1">
+            <a:schemeClr val="accent6"/>
+          </a:effectRef>
+          <a:fontRef idx="minor">
+            <a:schemeClr val="tx1"/>
+          </a:fontRef>
+        </p:style>
+      </p:cxnSp>
+      <p:sp>
+        <p:nvSpPr>
+          <p:cNvPr id="25" name="TextBox 24"/>
+          <p:cNvSpPr txBox="1"/>
+          <p:nvPr/>
+        </p:nvSpPr>
+        <p:spPr>
+          <a:xfrm>
+            <a:off x="2488114" y="893428"/>
+            <a:ext cx="2813428" cy="369332"/>
+          </a:xfrm>
+          <a:prstGeom prst="rect">
+            <a:avLst/>
+          </a:prstGeom>
+          <a:noFill/>
+        </p:spPr>
+        <p:txBody>
+          <a:bodyPr wrap="none" rtlCol="0">
+            <a:spAutoFit/>
+          </a:bodyPr>
+          <a:lstStyle/>
+          <a:p>
+            <a:r>
+              <a:rPr lang="en-US" dirty="0" smtClean="0"/>
+              <a:t>Create VNFR / INSTANTIARE</a:t>
+            </a:r>
+            <a:endParaRPr lang="en-US" dirty="0"/>
+          </a:p>
+        </p:txBody>
+      </p:sp>
+      <p:sp>
+        <p:nvSpPr>
+          <p:cNvPr id="26" name="TextBox 25"/>
+          <p:cNvSpPr txBox="1"/>
+          <p:nvPr/>
+        </p:nvSpPr>
+        <p:spPr>
+          <a:xfrm>
+            <a:off x="5454755" y="1324718"/>
+            <a:ext cx="954107" cy="369332"/>
+          </a:xfrm>
+          <a:prstGeom prst="rect">
+            <a:avLst/>
+          </a:prstGeom>
+          <a:noFill/>
+        </p:spPr>
+        <p:txBody>
+          <a:bodyPr wrap="none" rtlCol="0">
+            <a:spAutoFit/>
+          </a:bodyPr>
+          <a:lstStyle/>
+          <a:p>
+            <a:r>
+              <a:rPr lang="en-US" dirty="0" smtClean="0"/>
+              <a:t>MODIFY</a:t>
+            </a:r>
+            <a:endParaRPr lang="en-US" dirty="0"/>
+          </a:p>
+        </p:txBody>
+      </p:sp>
+      <p:sp>
+        <p:nvSpPr>
+          <p:cNvPr id="27" name="Oval 26"/>
+          <p:cNvSpPr/>
+          <p:nvPr/>
+        </p:nvSpPr>
+        <p:spPr>
+          <a:xfrm>
+            <a:off x="3243969" y="4588073"/>
+            <a:ext cx="1809155" cy="914400"/>
+          </a:xfrm>
+          <a:prstGeom prst="ellipse">
+            <a:avLst/>
+          </a:prstGeom>
+          <a:solidFill>
+            <a:srgbClr val="009473"/>
+          </a:solidFill>
+          <a:ln w="6350" cap="flat" cmpd="sng" algn="ctr">
+            <a:noFill/>
+            <a:prstDash val="solid"/>
+            <a:round/>
+            <a:headEnd type="none" w="med" len="med"/>
+            <a:tailEnd type="none" w="med" len="med"/>
+          </a:ln>
+          <a:effectLst>
+            <a:outerShdw blurRad="190500" dist="25400" dir="2700000">
+              <a:srgbClr val="000000">
+                <a:alpha val="43000"/>
+              </a:srgbClr>
+            </a:outerShdw>
+          </a:effectLst>
+        </p:spPr>
+        <p:txBody>
+          <a:bodyPr rtlCol="0" anchor="ctr"/>
+          <a:lstStyle/>
+          <a:p>
+            <a:pPr algn="ctr" defTabSz="914400"/>
+            <a:r>
+              <a:rPr lang="en-US" sz="1400" kern="0" dirty="0" smtClean="0">
+                <a:solidFill>
+                  <a:schemeClr val="bg1"/>
+                </a:solidFill>
+                <a:latin typeface="Tahoma"/>
+              </a:rPr>
+              <a:t>ACTIVE</a:t>
+            </a:r>
+            <a:endParaRPr lang="en-US" sz="1400" kern="0" dirty="0">
+              <a:solidFill>
+                <a:schemeClr val="bg1"/>
+              </a:solidFill>
+              <a:latin typeface="Tahoma"/>
+            </a:endParaRPr>
+          </a:p>
+        </p:txBody>
+      </p:sp>
+      <p:cxnSp>
+        <p:nvCxnSpPr>
+          <p:cNvPr id="28" name="Elbow Connector 21"/>
+          <p:cNvCxnSpPr>
+            <a:stCxn id="19" idx="4"/>
+            <a:endCxn id="27" idx="6"/>
+          </p:cNvCxnSpPr>
+          <p:nvPr/>
+        </p:nvCxnSpPr>
+        <p:spPr>
+          <a:xfrm rot="5400000">
+            <a:off x="5065439" y="3565300"/>
+            <a:ext cx="1467659" cy="1492287"/>
+          </a:xfrm>
+          <a:prstGeom prst="curvedConnector2">
+            <a:avLst/>
+          </a:prstGeom>
+          <a:ln>
+            <a:headEnd type="none" w="med" len="med"/>
+            <a:tailEnd type="triangle" w="med" len="med"/>
+          </a:ln>
+        </p:spPr>
+        <p:style>
+          <a:lnRef idx="2">
+            <a:schemeClr val="accent6"/>
+          </a:lnRef>
+          <a:fillRef idx="0">
+            <a:schemeClr val="accent6"/>
+          </a:fillRef>
+          <a:effectRef idx="1">
+            <a:schemeClr val="accent6"/>
+          </a:effectRef>
+          <a:fontRef idx="minor">
+            <a:schemeClr val="tx1"/>
+          </a:fontRef>
+        </p:style>
+      </p:cxnSp>
+      <p:sp>
+        <p:nvSpPr>
+          <p:cNvPr id="31" name="TextBox 30"/>
+          <p:cNvSpPr txBox="1"/>
+          <p:nvPr/>
+        </p:nvSpPr>
+        <p:spPr>
+          <a:xfrm>
+            <a:off x="6237618" y="4403407"/>
+            <a:ext cx="774596" cy="369332"/>
+          </a:xfrm>
+          <a:prstGeom prst="rect">
+            <a:avLst/>
+          </a:prstGeom>
+          <a:noFill/>
+        </p:spPr>
+        <p:txBody>
+          <a:bodyPr wrap="none" rtlCol="0">
+            <a:spAutoFit/>
+          </a:bodyPr>
+          <a:lstStyle/>
+          <a:p>
+            <a:r>
+              <a:rPr lang="en-US" dirty="0" smtClean="0"/>
+              <a:t>START</a:t>
+            </a:r>
+            <a:endParaRPr lang="en-US" dirty="0"/>
+          </a:p>
+        </p:txBody>
+      </p:sp>
+      <p:sp>
+        <p:nvSpPr>
+          <p:cNvPr id="32" name="Oval 31"/>
+          <p:cNvSpPr/>
+          <p:nvPr/>
+        </p:nvSpPr>
+        <p:spPr>
+          <a:xfrm>
+            <a:off x="920202" y="3120414"/>
+            <a:ext cx="1809155" cy="914400"/>
+          </a:xfrm>
+          <a:prstGeom prst="ellipse">
+            <a:avLst/>
+          </a:prstGeom>
+          <a:solidFill>
+            <a:srgbClr val="009473"/>
+          </a:solidFill>
+          <a:ln w="6350" cap="flat" cmpd="sng" algn="ctr">
+            <a:noFill/>
+            <a:prstDash val="solid"/>
+            <a:round/>
+            <a:headEnd type="none" w="med" len="med"/>
+            <a:tailEnd type="none" w="med" len="med"/>
+          </a:ln>
+          <a:effectLst>
+            <a:outerShdw blurRad="190500" dist="25400" dir="2700000">
+              <a:srgbClr val="000000">
+                <a:alpha val="43000"/>
+              </a:srgbClr>
+            </a:outerShdw>
+          </a:effectLst>
+        </p:spPr>
+        <p:txBody>
+          <a:bodyPr rtlCol="0" anchor="ctr"/>
+          <a:lstStyle/>
+          <a:p>
+            <a:pPr algn="ctr" defTabSz="914400"/>
+            <a:r>
+              <a:rPr lang="en-US" sz="1400" kern="0" dirty="0" smtClean="0">
+                <a:solidFill>
+                  <a:schemeClr val="bg1"/>
+                </a:solidFill>
+                <a:latin typeface="Tahoma"/>
+              </a:rPr>
+              <a:t>TERMIATED</a:t>
+            </a:r>
+            <a:endParaRPr lang="en-US" sz="1400" kern="0" dirty="0">
+              <a:solidFill>
+                <a:schemeClr val="bg1"/>
+              </a:solidFill>
+              <a:latin typeface="Tahoma"/>
+            </a:endParaRPr>
+          </a:p>
+        </p:txBody>
+      </p:sp>
+      <p:cxnSp>
+        <p:nvCxnSpPr>
+          <p:cNvPr id="33" name="Elbow Connector 21"/>
+          <p:cNvCxnSpPr>
+            <a:stCxn id="27" idx="2"/>
+            <a:endCxn id="32" idx="4"/>
+          </p:cNvCxnSpPr>
+          <p:nvPr/>
+        </p:nvCxnSpPr>
+        <p:spPr>
+          <a:xfrm rot="10800000">
+            <a:off x="1824781" y="4034815"/>
+            <a:ext cx="1419189" cy="1010459"/>
+          </a:xfrm>
+          <a:prstGeom prst="curvedConnector2">
+            <a:avLst/>
+          </a:prstGeom>
+          <a:ln>
+            <a:headEnd type="none" w="med" len="med"/>
+            <a:tailEnd type="triangle" w="med" len="med"/>
+          </a:ln>
+        </p:spPr>
+        <p:style>
+          <a:lnRef idx="2">
+            <a:schemeClr val="accent6"/>
+          </a:lnRef>
+          <a:fillRef idx="0">
+            <a:schemeClr val="accent6"/>
+          </a:fillRef>
+          <a:effectRef idx="1">
+            <a:schemeClr val="accent6"/>
+          </a:effectRef>
+          <a:fontRef idx="minor">
+            <a:schemeClr val="tx1"/>
+          </a:fontRef>
+        </p:style>
+      </p:cxnSp>
+      <p:cxnSp>
+        <p:nvCxnSpPr>
+          <p:cNvPr id="37" name="Elbow Connector 21"/>
+          <p:cNvCxnSpPr>
+            <a:stCxn id="19" idx="2"/>
+            <a:endCxn id="32" idx="6"/>
+          </p:cNvCxnSpPr>
+          <p:nvPr/>
+        </p:nvCxnSpPr>
+        <p:spPr>
+          <a:xfrm rot="10800000" flipV="1">
+            <a:off x="2729357" y="3120414"/>
+            <a:ext cx="2911476" cy="457200"/>
+          </a:xfrm>
+          <a:prstGeom prst="curvedConnector3">
+            <a:avLst>
+              <a:gd name="adj1" fmla="val 50000"/>
+            </a:avLst>
+          </a:prstGeom>
+          <a:ln>
+            <a:headEnd type="none" w="med" len="med"/>
+            <a:tailEnd type="triangle" w="med" len="med"/>
+          </a:ln>
+        </p:spPr>
+        <p:style>
+          <a:lnRef idx="2">
+            <a:schemeClr val="accent6"/>
+          </a:lnRef>
+          <a:fillRef idx="0">
+            <a:schemeClr val="accent6"/>
+          </a:fillRef>
+          <a:effectRef idx="1">
+            <a:schemeClr val="accent6"/>
+          </a:effectRef>
+          <a:fontRef idx="minor">
+            <a:schemeClr val="tx1"/>
+          </a:fontRef>
+        </p:style>
+      </p:cxnSp>
+      <p:cxnSp>
+        <p:nvCxnSpPr>
+          <p:cNvPr id="40" name="Elbow Connector 21"/>
+          <p:cNvCxnSpPr>
+            <a:stCxn id="7" idx="4"/>
+            <a:endCxn id="32" idx="0"/>
+          </p:cNvCxnSpPr>
+          <p:nvPr/>
+        </p:nvCxnSpPr>
+        <p:spPr>
+          <a:xfrm rot="5400000">
+            <a:off x="2468479" y="1507551"/>
+            <a:ext cx="969164" cy="2256562"/>
+          </a:xfrm>
+          <a:prstGeom prst="curvedConnector3">
+            <a:avLst>
+              <a:gd name="adj1" fmla="val 50000"/>
+            </a:avLst>
+          </a:prstGeom>
+          <a:ln>
+            <a:headEnd type="none" w="med" len="med"/>
+            <a:tailEnd type="triangle" w="med" len="med"/>
+          </a:ln>
+        </p:spPr>
+        <p:style>
+          <a:lnRef idx="2">
+            <a:schemeClr val="accent6"/>
+          </a:lnRef>
+          <a:fillRef idx="0">
+            <a:schemeClr val="accent6"/>
+          </a:fillRef>
+          <a:effectRef idx="1">
+            <a:schemeClr val="accent6"/>
+          </a:effectRef>
+          <a:fontRef idx="minor">
+            <a:schemeClr val="tx1"/>
+          </a:fontRef>
+        </p:style>
+      </p:cxnSp>
+      <p:sp>
+        <p:nvSpPr>
+          <p:cNvPr id="45" name="TextBox 44"/>
+          <p:cNvSpPr txBox="1"/>
+          <p:nvPr/>
+        </p:nvSpPr>
+        <p:spPr>
+          <a:xfrm>
+            <a:off x="3243970" y="3481063"/>
+            <a:ext cx="1298477" cy="369332"/>
+          </a:xfrm>
+          <a:prstGeom prst="rect">
+            <a:avLst/>
+          </a:prstGeom>
+          <a:noFill/>
+        </p:spPr>
+        <p:txBody>
+          <a:bodyPr wrap="none" rtlCol="0">
+            <a:spAutoFit/>
+          </a:bodyPr>
+          <a:lstStyle/>
+          <a:p>
+            <a:r>
+              <a:rPr lang="en-US" dirty="0" smtClean="0"/>
+              <a:t>TERMINATE</a:t>
+            </a:r>
+            <a:endParaRPr lang="en-US" dirty="0"/>
+          </a:p>
+        </p:txBody>
+      </p:sp>
+      <p:sp>
+        <p:nvSpPr>
+          <p:cNvPr id="46" name="TextBox 45"/>
+          <p:cNvSpPr txBox="1"/>
+          <p:nvPr/>
+        </p:nvSpPr>
+        <p:spPr>
+          <a:xfrm>
+            <a:off x="1945493" y="4196619"/>
+            <a:ext cx="1298477" cy="369332"/>
+          </a:xfrm>
+          <a:prstGeom prst="rect">
+            <a:avLst/>
+          </a:prstGeom>
+          <a:noFill/>
+        </p:spPr>
+        <p:txBody>
+          <a:bodyPr wrap="none" rtlCol="0">
+            <a:spAutoFit/>
+          </a:bodyPr>
+          <a:lstStyle/>
+          <a:p>
+            <a:r>
+              <a:rPr lang="en-US" dirty="0" smtClean="0"/>
+              <a:t>TERMINATE</a:t>
+            </a:r>
+            <a:endParaRPr lang="en-US" dirty="0"/>
+          </a:p>
+        </p:txBody>
+      </p:sp>
+      <p:sp>
+        <p:nvSpPr>
+          <p:cNvPr id="47" name="TextBox 46"/>
+          <p:cNvSpPr txBox="1"/>
+          <p:nvPr/>
+        </p:nvSpPr>
+        <p:spPr>
+          <a:xfrm>
+            <a:off x="2527525" y="2654177"/>
+            <a:ext cx="1298477" cy="369332"/>
+          </a:xfrm>
+          <a:prstGeom prst="rect">
+            <a:avLst/>
+          </a:prstGeom>
+          <a:noFill/>
+        </p:spPr>
+        <p:txBody>
+          <a:bodyPr wrap="none" rtlCol="0">
+            <a:spAutoFit/>
+          </a:bodyPr>
+          <a:lstStyle/>
+          <a:p>
+            <a:r>
+              <a:rPr lang="en-US" dirty="0" smtClean="0"/>
+              <a:t>TERMINATE</a:t>
+            </a:r>
+            <a:endParaRPr lang="en-US" dirty="0"/>
+          </a:p>
+        </p:txBody>
+      </p:sp>
+      <p:cxnSp>
+        <p:nvCxnSpPr>
+          <p:cNvPr id="48" name="Elbow Connector 21"/>
+          <p:cNvCxnSpPr>
+            <a:stCxn id="7" idx="5"/>
+            <a:endCxn id="27" idx="0"/>
+          </p:cNvCxnSpPr>
+          <p:nvPr/>
+        </p:nvCxnSpPr>
+        <p:spPr>
+          <a:xfrm rot="5400000">
+            <a:off x="3149394" y="3016493"/>
+            <a:ext cx="2570734" cy="572427"/>
+          </a:xfrm>
+          <a:prstGeom prst="curvedConnector3">
+            <a:avLst>
+              <a:gd name="adj1" fmla="val 85540"/>
+            </a:avLst>
+          </a:prstGeom>
+          <a:ln>
+            <a:headEnd type="none" w="med" len="med"/>
+            <a:tailEnd type="triangle" w="med" len="med"/>
+          </a:ln>
+        </p:spPr>
+        <p:style>
+          <a:lnRef idx="2">
+            <a:schemeClr val="accent6"/>
+          </a:lnRef>
+          <a:fillRef idx="0">
+            <a:schemeClr val="accent6"/>
+          </a:fillRef>
+          <a:effectRef idx="1">
+            <a:schemeClr val="accent6"/>
+          </a:effectRef>
+          <a:fontRef idx="minor">
+            <a:schemeClr val="tx1"/>
+          </a:fontRef>
+        </p:style>
+      </p:cxnSp>
+      <p:sp>
+        <p:nvSpPr>
+          <p:cNvPr id="49" name="TextBox 48"/>
+          <p:cNvSpPr txBox="1"/>
+          <p:nvPr/>
+        </p:nvSpPr>
+        <p:spPr>
+          <a:xfrm>
+            <a:off x="4665826" y="2170150"/>
+            <a:ext cx="774596" cy="369332"/>
+          </a:xfrm>
+          <a:prstGeom prst="rect">
+            <a:avLst/>
+          </a:prstGeom>
+          <a:noFill/>
+        </p:spPr>
+        <p:txBody>
+          <a:bodyPr wrap="none" rtlCol="0">
+            <a:spAutoFit/>
+          </a:bodyPr>
+          <a:lstStyle/>
+          <a:p>
+            <a:r>
+              <a:rPr lang="en-US" dirty="0" smtClean="0"/>
+              <a:t>START</a:t>
+            </a:r>
+            <a:endParaRPr lang="en-US" dirty="0"/>
+          </a:p>
+        </p:txBody>
+      </p:sp>
+    </p:spTree>
+    <p:extLst>
+      <p:ext uri="{BB962C8B-B14F-4D97-AF65-F5344CB8AC3E}">
+        <p14:creationId xmlns:p14="http://schemas.microsoft.com/office/powerpoint/2010/main" val="2281999235"/>
       </p:ext>
     </p:extLst>
   </p:cSld>

</xml_diff>

<commit_message>
modified state diagram image into ppt
</commit_message>
<xml_diff>
--- a/docs/images/openbaton-stencils.pptx
+++ b/docs/images/openbaton-stencils.pptx
@@ -12,6 +12,7 @@
     <p:sldId id="261" r:id="rId6"/>
     <p:sldId id="260" r:id="rId7"/>
     <p:sldId id="262" r:id="rId8"/>
+    <p:sldId id="263" r:id="rId9"/>
   </p:sldIdLst>
   <p:sldSz cx="9144000" cy="6858000" type="screen4x3"/>
   <p:notesSz cx="6858000" cy="9144000"/>
@@ -294,7 +295,7 @@
           <a:p>
             <a:fld id="{14A7C45A-EC31-C341-BCBA-1394489C9760}" type="datetimeFigureOut">
               <a:rPr lang="en-US" smtClean="0"/>
-              <a:t>10/10/15</a:t>
+              <a:t>13/10/15</a:t>
             </a:fld>
             <a:endParaRPr lang="en-US"/>
           </a:p>
@@ -464,7 +465,7 @@
           <a:p>
             <a:fld id="{14A7C45A-EC31-C341-BCBA-1394489C9760}" type="datetimeFigureOut">
               <a:rPr lang="en-US" smtClean="0"/>
-              <a:t>10/10/15</a:t>
+              <a:t>13/10/15</a:t>
             </a:fld>
             <a:endParaRPr lang="en-US"/>
           </a:p>
@@ -644,7 +645,7 @@
           <a:p>
             <a:fld id="{14A7C45A-EC31-C341-BCBA-1394489C9760}" type="datetimeFigureOut">
               <a:rPr lang="en-US" smtClean="0"/>
-              <a:t>10/10/15</a:t>
+              <a:t>13/10/15</a:t>
             </a:fld>
             <a:endParaRPr lang="en-US"/>
           </a:p>
@@ -814,7 +815,7 @@
           <a:p>
             <a:fld id="{14A7C45A-EC31-C341-BCBA-1394489C9760}" type="datetimeFigureOut">
               <a:rPr lang="en-US" smtClean="0"/>
-              <a:t>10/10/15</a:t>
+              <a:t>13/10/15</a:t>
             </a:fld>
             <a:endParaRPr lang="en-US"/>
           </a:p>
@@ -1060,7 +1061,7 @@
           <a:p>
             <a:fld id="{14A7C45A-EC31-C341-BCBA-1394489C9760}" type="datetimeFigureOut">
               <a:rPr lang="en-US" smtClean="0"/>
-              <a:t>10/10/15</a:t>
+              <a:t>13/10/15</a:t>
             </a:fld>
             <a:endParaRPr lang="en-US"/>
           </a:p>
@@ -1348,7 +1349,7 @@
           <a:p>
             <a:fld id="{14A7C45A-EC31-C341-BCBA-1394489C9760}" type="datetimeFigureOut">
               <a:rPr lang="en-US" smtClean="0"/>
-              <a:t>10/10/15</a:t>
+              <a:t>13/10/15</a:t>
             </a:fld>
             <a:endParaRPr lang="en-US"/>
           </a:p>
@@ -1770,7 +1771,7 @@
           <a:p>
             <a:fld id="{14A7C45A-EC31-C341-BCBA-1394489C9760}" type="datetimeFigureOut">
               <a:rPr lang="en-US" smtClean="0"/>
-              <a:t>10/10/15</a:t>
+              <a:t>13/10/15</a:t>
             </a:fld>
             <a:endParaRPr lang="en-US"/>
           </a:p>
@@ -1888,7 +1889,7 @@
           <a:p>
             <a:fld id="{14A7C45A-EC31-C341-BCBA-1394489C9760}" type="datetimeFigureOut">
               <a:rPr lang="en-US" smtClean="0"/>
-              <a:t>10/10/15</a:t>
+              <a:t>13/10/15</a:t>
             </a:fld>
             <a:endParaRPr lang="en-US"/>
           </a:p>
@@ -1983,7 +1984,7 @@
           <a:p>
             <a:fld id="{14A7C45A-EC31-C341-BCBA-1394489C9760}" type="datetimeFigureOut">
               <a:rPr lang="en-US" smtClean="0"/>
-              <a:t>10/10/15</a:t>
+              <a:t>13/10/15</a:t>
             </a:fld>
             <a:endParaRPr lang="en-US"/>
           </a:p>
@@ -2260,7 +2261,7 @@
           <a:p>
             <a:fld id="{14A7C45A-EC31-C341-BCBA-1394489C9760}" type="datetimeFigureOut">
               <a:rPr lang="en-US" smtClean="0"/>
-              <a:t>10/10/15</a:t>
+              <a:t>13/10/15</a:t>
             </a:fld>
             <a:endParaRPr lang="en-US"/>
           </a:p>
@@ -2513,7 +2514,7 @@
           <a:p>
             <a:fld id="{14A7C45A-EC31-C341-BCBA-1394489C9760}" type="datetimeFigureOut">
               <a:rPr lang="en-US" smtClean="0"/>
-              <a:t>10/10/15</a:t>
+              <a:t>13/10/15</a:t>
             </a:fld>
             <a:endParaRPr lang="en-US"/>
           </a:p>
@@ -2726,7 +2727,7 @@
           <a:p>
             <a:fld id="{14A7C45A-EC31-C341-BCBA-1394489C9760}" type="datetimeFigureOut">
               <a:rPr lang="en-US" smtClean="0"/>
-              <a:t>10/10/15</a:t>
+              <a:t>13/10/15</a:t>
             </a:fld>
             <a:endParaRPr lang="en-US"/>
           </a:p>
@@ -7811,16 +7812,7 @@
                   </a:solidFill>
                   <a:latin typeface="Tahoma"/>
                 </a:rPr>
-                <a:t>Generic </a:t>
-              </a:r>
-              <a:r>
-                <a:rPr lang="en-US" kern="0" dirty="0" smtClean="0">
-                  <a:solidFill>
-                    <a:schemeClr val="bg1"/>
-                  </a:solidFill>
-                  <a:latin typeface="Tahoma"/>
-                </a:rPr>
-                <a:t>EMS</a:t>
+                <a:t>Generic EMS</a:t>
               </a:r>
               <a:endParaRPr lang="en-US" kern="0" dirty="0">
                 <a:solidFill>
@@ -9654,16 +9646,7 @@
                   </a:solidFill>
                   <a:latin typeface="Tahoma"/>
                 </a:rPr>
-                <a:t>Generic </a:t>
-              </a:r>
-              <a:r>
-                <a:rPr lang="en-US" kern="0" dirty="0" smtClean="0">
-                  <a:solidFill>
-                    <a:schemeClr val="bg1"/>
-                  </a:solidFill>
-                  <a:latin typeface="Tahoma"/>
-                </a:rPr>
-                <a:t>EMS</a:t>
+                <a:t>Generic EMS</a:t>
               </a:r>
               <a:endParaRPr lang="en-US" kern="0" dirty="0">
                 <a:solidFill>
@@ -12071,131 +12054,19 @@
           <a:chExt cx="0" cy="0"/>
         </a:xfrm>
       </p:grpSpPr>
-      <p:sp>
-        <p:nvSpPr>
-          <p:cNvPr id="6" name="Oval 5"/>
-          <p:cNvSpPr/>
-          <p:nvPr/>
-        </p:nvSpPr>
-        <p:spPr>
-          <a:xfrm>
-            <a:off x="453923" y="542105"/>
-            <a:ext cx="1809155" cy="914400"/>
-          </a:xfrm>
-          <a:prstGeom prst="ellipse">
-            <a:avLst/>
-          </a:prstGeom>
-          <a:solidFill>
-            <a:srgbClr val="009473"/>
-          </a:solidFill>
-          <a:ln w="38100" cap="flat" cmpd="dbl" algn="ctr">
-            <a:solidFill>
-              <a:schemeClr val="tx1"/>
-            </a:solidFill>
-            <a:prstDash val="solid"/>
-            <a:round/>
-            <a:headEnd type="none" w="med" len="med"/>
-            <a:tailEnd type="none" w="med" len="med"/>
-          </a:ln>
-          <a:effectLst>
-            <a:outerShdw blurRad="190500" dist="25400" dir="2700000">
-              <a:srgbClr val="000000">
-                <a:alpha val="43000"/>
-              </a:srgbClr>
-            </a:outerShdw>
-          </a:effectLst>
-        </p:spPr>
-        <p:txBody>
-          <a:bodyPr rtlCol="0" anchor="ctr"/>
-          <a:lstStyle/>
-          <a:p>
-            <a:pPr algn="ctr" defTabSz="914400"/>
-            <a:r>
-              <a:rPr lang="en-US" sz="1600" kern="0" dirty="0" smtClean="0">
-                <a:solidFill>
-                  <a:schemeClr val="bg1"/>
-                </a:solidFill>
-                <a:latin typeface="Tahoma"/>
-              </a:rPr>
-              <a:t>NULL</a:t>
-            </a:r>
-            <a:endParaRPr lang="en-US" sz="1600" kern="0" dirty="0">
-              <a:solidFill>
-                <a:schemeClr val="bg1"/>
-              </a:solidFill>
-              <a:latin typeface="Tahoma"/>
-            </a:endParaRPr>
-          </a:p>
-        </p:txBody>
-      </p:sp>
-      <p:sp>
-        <p:nvSpPr>
-          <p:cNvPr id="7" name="Oval 6"/>
-          <p:cNvSpPr/>
-          <p:nvPr/>
-        </p:nvSpPr>
-        <p:spPr>
-          <a:xfrm>
-            <a:off x="3176764" y="1236850"/>
-            <a:ext cx="1809155" cy="914400"/>
-          </a:xfrm>
-          <a:prstGeom prst="ellipse">
-            <a:avLst/>
-          </a:prstGeom>
-          <a:solidFill>
-            <a:srgbClr val="009473"/>
-          </a:solidFill>
-          <a:ln w="6350" cap="flat" cmpd="sng" algn="ctr">
-            <a:noFill/>
-            <a:prstDash val="solid"/>
-            <a:round/>
-            <a:headEnd type="none" w="med" len="med"/>
-            <a:tailEnd type="none" w="med" len="med"/>
-          </a:ln>
-          <a:effectLst>
-            <a:outerShdw blurRad="190500" dist="25400" dir="2700000">
-              <a:srgbClr val="000000">
-                <a:alpha val="43000"/>
-              </a:srgbClr>
-            </a:outerShdw>
-          </a:effectLst>
-        </p:spPr>
-        <p:txBody>
-          <a:bodyPr rtlCol="0" anchor="ctr"/>
-          <a:lstStyle/>
-          <a:p>
-            <a:pPr algn="ctr" defTabSz="914400"/>
-            <a:r>
-              <a:rPr lang="en-US" sz="1400" kern="0" dirty="0" smtClean="0">
-                <a:solidFill>
-                  <a:schemeClr val="bg1"/>
-                </a:solidFill>
-                <a:latin typeface="Tahoma"/>
-              </a:rPr>
-              <a:t>INSTATIATED</a:t>
-            </a:r>
-            <a:endParaRPr lang="en-US" sz="1400" kern="0" dirty="0">
-              <a:solidFill>
-                <a:schemeClr val="bg1"/>
-              </a:solidFill>
-              <a:latin typeface="Tahoma"/>
-            </a:endParaRPr>
-          </a:p>
-        </p:txBody>
-      </p:sp>
       <p:cxnSp>
         <p:nvCxnSpPr>
           <p:cNvPr id="8" name="Elbow Connector 21"/>
           <p:cNvCxnSpPr>
-            <a:stCxn id="6" idx="6"/>
-            <a:endCxn id="7" idx="2"/>
+            <a:stCxn id="6" idx="4"/>
+            <a:endCxn id="7" idx="0"/>
           </p:cNvCxnSpPr>
           <p:nvPr/>
         </p:nvCxnSpPr>
         <p:spPr>
-          <a:xfrm>
-            <a:off x="2263078" y="999305"/>
-            <a:ext cx="913686" cy="694745"/>
+          <a:xfrm rot="5400000">
+            <a:off x="4440430" y="1514662"/>
+            <a:ext cx="766960" cy="17741"/>
           </a:xfrm>
           <a:prstGeom prst="curvedConnector3">
             <a:avLst>
@@ -12222,77 +12093,24 @@
           </a:fontRef>
         </p:style>
       </p:cxnSp>
-      <p:sp>
-        <p:nvSpPr>
-          <p:cNvPr id="19" name="Oval 18"/>
-          <p:cNvSpPr/>
-          <p:nvPr/>
-        </p:nvSpPr>
-        <p:spPr>
-          <a:xfrm>
-            <a:off x="5640833" y="2663214"/>
-            <a:ext cx="1809155" cy="914400"/>
-          </a:xfrm>
-          <a:prstGeom prst="ellipse">
-            <a:avLst/>
-          </a:prstGeom>
-          <a:solidFill>
-            <a:srgbClr val="009473"/>
-          </a:solidFill>
-          <a:ln w="6350" cap="flat" cmpd="sng" algn="ctr">
-            <a:noFill/>
-            <a:prstDash val="solid"/>
-            <a:round/>
-            <a:headEnd type="none" w="med" len="med"/>
-            <a:tailEnd type="none" w="med" len="med"/>
-          </a:ln>
-          <a:effectLst>
-            <a:outerShdw blurRad="190500" dist="25400" dir="2700000">
-              <a:srgbClr val="000000">
-                <a:alpha val="43000"/>
-              </a:srgbClr>
-            </a:outerShdw>
-          </a:effectLst>
-        </p:spPr>
-        <p:txBody>
-          <a:bodyPr rtlCol="0" anchor="ctr"/>
-          <a:lstStyle/>
-          <a:p>
-            <a:pPr algn="ctr" defTabSz="914400"/>
-            <a:r>
-              <a:rPr lang="en-US" sz="1400" kern="0" dirty="0" smtClean="0">
-                <a:solidFill>
-                  <a:schemeClr val="bg1"/>
-                </a:solidFill>
-                <a:latin typeface="Tahoma"/>
-              </a:rPr>
-              <a:t>INACTIVE</a:t>
-            </a:r>
-            <a:endParaRPr lang="en-US" sz="1400" kern="0" dirty="0">
-              <a:solidFill>
-                <a:schemeClr val="bg1"/>
-              </a:solidFill>
-              <a:latin typeface="Tahoma"/>
-            </a:endParaRPr>
-          </a:p>
-        </p:txBody>
-      </p:sp>
       <p:cxnSp>
         <p:nvCxnSpPr>
           <p:cNvPr id="20" name="Elbow Connector 21"/>
           <p:cNvCxnSpPr>
             <a:stCxn id="7" idx="6"/>
-            <a:endCxn id="19" idx="0"/>
+            <a:endCxn id="19" idx="2"/>
           </p:cNvCxnSpPr>
           <p:nvPr/>
         </p:nvCxnSpPr>
         <p:spPr>
-          <a:xfrm>
-            <a:off x="4985919" y="1694050"/>
-            <a:ext cx="1559492" cy="969164"/>
-          </a:xfrm>
-          <a:prstGeom prst="curvedConnector2">
-            <a:avLst/>
+          <a:xfrm flipV="1">
+            <a:off x="5719616" y="1897616"/>
+            <a:ext cx="1335358" cy="466596"/>
+          </a:xfrm>
+          <a:prstGeom prst="curvedConnector3">
+            <a:avLst>
+              <a:gd name="adj1" fmla="val 50000"/>
+            </a:avLst>
           </a:prstGeom>
           <a:ln>
             <a:headEnd type="none" w="med" len="med"/>
@@ -12322,8 +12140,8 @@
         </p:nvSpPr>
         <p:spPr>
           <a:xfrm>
-            <a:off x="2488114" y="893428"/>
-            <a:ext cx="2813428" cy="369332"/>
+            <a:off x="3357408" y="1353015"/>
+            <a:ext cx="1422347" cy="369332"/>
           </a:xfrm>
           <a:prstGeom prst="rect">
             <a:avLst/>
@@ -12338,7 +12156,7 @@
           <a:p>
             <a:r>
               <a:rPr lang="en-US" dirty="0" smtClean="0"/>
-              <a:t>Create VNFR / INSTANTIARE</a:t>
+              <a:t>INSTANTIATE</a:t>
             </a:r>
             <a:endParaRPr lang="en-US" dirty="0"/>
           </a:p>
@@ -12352,7 +12170,7 @@
         </p:nvSpPr>
         <p:spPr>
           <a:xfrm>
-            <a:off x="5454755" y="1324718"/>
+            <a:off x="5670086" y="1722347"/>
             <a:ext cx="954107" cy="369332"/>
           </a:xfrm>
           <a:prstGeom prst="rect">
@@ -12371,61 +12189,6 @@
               <a:t>MODIFY</a:t>
             </a:r>
             <a:endParaRPr lang="en-US" dirty="0"/>
-          </a:p>
-        </p:txBody>
-      </p:sp>
-      <p:sp>
-        <p:nvSpPr>
-          <p:cNvPr id="27" name="Oval 26"/>
-          <p:cNvSpPr/>
-          <p:nvPr/>
-        </p:nvSpPr>
-        <p:spPr>
-          <a:xfrm>
-            <a:off x="3243969" y="4588073"/>
-            <a:ext cx="1809155" cy="914400"/>
-          </a:xfrm>
-          <a:prstGeom prst="ellipse">
-            <a:avLst/>
-          </a:prstGeom>
-          <a:solidFill>
-            <a:srgbClr val="009473"/>
-          </a:solidFill>
-          <a:ln w="6350" cap="flat" cmpd="sng" algn="ctr">
-            <a:noFill/>
-            <a:prstDash val="solid"/>
-            <a:round/>
-            <a:headEnd type="none" w="med" len="med"/>
-            <a:tailEnd type="none" w="med" len="med"/>
-          </a:ln>
-          <a:effectLst>
-            <a:outerShdw blurRad="190500" dist="25400" dir="2700000">
-              <a:srgbClr val="000000">
-                <a:alpha val="43000"/>
-              </a:srgbClr>
-            </a:outerShdw>
-          </a:effectLst>
-        </p:spPr>
-        <p:txBody>
-          <a:bodyPr rtlCol="0" anchor="ctr"/>
-          <a:lstStyle/>
-          <a:p>
-            <a:pPr algn="ctr" defTabSz="914400"/>
-            <a:r>
-              <a:rPr lang="en-US" sz="1400" kern="0" dirty="0" smtClean="0">
-                <a:solidFill>
-                  <a:schemeClr val="bg1"/>
-                </a:solidFill>
-                <a:latin typeface="Tahoma"/>
-              </a:rPr>
-              <a:t>ACTIVE</a:t>
-            </a:r>
-            <a:endParaRPr lang="en-US" sz="1400" kern="0" dirty="0">
-              <a:solidFill>
-                <a:schemeClr val="bg1"/>
-              </a:solidFill>
-              <a:latin typeface="Tahoma"/>
-            </a:endParaRPr>
           </a:p>
         </p:txBody>
       </p:sp>
@@ -12433,15 +12196,15 @@
         <p:nvCxnSpPr>
           <p:cNvPr id="28" name="Elbow Connector 21"/>
           <p:cNvCxnSpPr>
-            <a:stCxn id="19" idx="4"/>
+            <a:stCxn id="19" idx="5"/>
             <a:endCxn id="27" idx="6"/>
           </p:cNvCxnSpPr>
           <p:nvPr/>
         </p:nvCxnSpPr>
         <p:spPr>
           <a:xfrm rot="5400000">
-            <a:off x="5065439" y="3565300"/>
-            <a:ext cx="1467659" cy="1492287"/>
+            <a:off x="5956703" y="2888396"/>
+            <a:ext cx="3309972" cy="1974991"/>
           </a:xfrm>
           <a:prstGeom prst="curvedConnector2">
             <a:avLst/>
@@ -12474,7 +12237,7 @@
         </p:nvSpPr>
         <p:spPr>
           <a:xfrm>
-            <a:off x="6237618" y="4403407"/>
+            <a:off x="4815038" y="4253345"/>
             <a:ext cx="774596" cy="369332"/>
           </a:xfrm>
           <a:prstGeom prst="rect">
@@ -12493,61 +12256,6 @@
               <a:t>START</a:t>
             </a:r>
             <a:endParaRPr lang="en-US" dirty="0"/>
-          </a:p>
-        </p:txBody>
-      </p:sp>
-      <p:sp>
-        <p:nvSpPr>
-          <p:cNvPr id="32" name="Oval 31"/>
-          <p:cNvSpPr/>
-          <p:nvPr/>
-        </p:nvSpPr>
-        <p:spPr>
-          <a:xfrm>
-            <a:off x="920202" y="3120414"/>
-            <a:ext cx="1809155" cy="914400"/>
-          </a:xfrm>
-          <a:prstGeom prst="ellipse">
-            <a:avLst/>
-          </a:prstGeom>
-          <a:solidFill>
-            <a:srgbClr val="009473"/>
-          </a:solidFill>
-          <a:ln w="6350" cap="flat" cmpd="sng" algn="ctr">
-            <a:noFill/>
-            <a:prstDash val="solid"/>
-            <a:round/>
-            <a:headEnd type="none" w="med" len="med"/>
-            <a:tailEnd type="none" w="med" len="med"/>
-          </a:ln>
-          <a:effectLst>
-            <a:outerShdw blurRad="190500" dist="25400" dir="2700000">
-              <a:srgbClr val="000000">
-                <a:alpha val="43000"/>
-              </a:srgbClr>
-            </a:outerShdw>
-          </a:effectLst>
-        </p:spPr>
-        <p:txBody>
-          <a:bodyPr rtlCol="0" anchor="ctr"/>
-          <a:lstStyle/>
-          <a:p>
-            <a:pPr algn="ctr" defTabSz="914400"/>
-            <a:r>
-              <a:rPr lang="en-US" sz="1400" kern="0" dirty="0" smtClean="0">
-                <a:solidFill>
-                  <a:schemeClr val="bg1"/>
-                </a:solidFill>
-                <a:latin typeface="Tahoma"/>
-              </a:rPr>
-              <a:t>TERMIATED</a:t>
-            </a:r>
-            <a:endParaRPr lang="en-US" sz="1400" kern="0" dirty="0">
-              <a:solidFill>
-                <a:schemeClr val="bg1"/>
-              </a:solidFill>
-              <a:latin typeface="Tahoma"/>
-            </a:endParaRPr>
           </a:p>
         </p:txBody>
       </p:sp>
@@ -12555,18 +12263,20 @@
         <p:nvCxnSpPr>
           <p:cNvPr id="33" name="Elbow Connector 21"/>
           <p:cNvCxnSpPr>
-            <a:stCxn id="27" idx="2"/>
+            <a:stCxn id="27" idx="7"/>
             <a:endCxn id="32" idx="4"/>
           </p:cNvCxnSpPr>
           <p:nvPr/>
         </p:nvCxnSpPr>
         <p:spPr>
-          <a:xfrm rot="10800000">
-            <a:off x="1824781" y="4034815"/>
-            <a:ext cx="1419189" cy="1010459"/>
-          </a:xfrm>
-          <a:prstGeom prst="curvedConnector2">
-            <a:avLst/>
+          <a:xfrm rot="5400000" flipH="1" flipV="1">
+            <a:off x="5934963" y="4629607"/>
+            <a:ext cx="1002266" cy="153696"/>
+          </a:xfrm>
+          <a:prstGeom prst="curvedConnector3">
+            <a:avLst>
+              <a:gd name="adj1" fmla="val 50000"/>
+            </a:avLst>
           </a:prstGeom>
           <a:ln>
             <a:headEnd type="none" w="med" len="med"/>
@@ -12592,20 +12302,18 @@
         <p:nvCxnSpPr>
           <p:cNvPr id="37" name="Elbow Connector 21"/>
           <p:cNvCxnSpPr>
-            <a:stCxn id="19" idx="2"/>
+            <a:stCxn id="19" idx="4"/>
             <a:endCxn id="32" idx="6"/>
           </p:cNvCxnSpPr>
           <p:nvPr/>
         </p:nvCxnSpPr>
         <p:spPr>
-          <a:xfrm rot="10800000" flipV="1">
-            <a:off x="2729357" y="3120414"/>
-            <a:ext cx="2911476" cy="457200"/>
-          </a:xfrm>
-          <a:prstGeom prst="curvedConnector3">
-            <a:avLst>
-              <a:gd name="adj1" fmla="val 50000"/>
-            </a:avLst>
+          <a:xfrm rot="5400000">
+            <a:off x="6991884" y="2780454"/>
+            <a:ext cx="1393306" cy="542031"/>
+          </a:xfrm>
+          <a:prstGeom prst="curvedConnector2">
+            <a:avLst/>
           </a:prstGeom>
           <a:ln>
             <a:headEnd type="none" w="med" len="med"/>
@@ -12637,9 +12345,9 @@
           <p:nvPr/>
         </p:nvCxnSpPr>
         <p:spPr>
-          <a:xfrm rot="5400000">
-            <a:off x="2468479" y="1507551"/>
-            <a:ext cx="969164" cy="2256562"/>
+          <a:xfrm rot="16200000" flipH="1">
+            <a:off x="5429236" y="2207214"/>
+            <a:ext cx="469510" cy="1697905"/>
           </a:xfrm>
           <a:prstGeom prst="curvedConnector3">
             <a:avLst>
@@ -12674,7 +12382,7 @@
         </p:nvSpPr>
         <p:spPr>
           <a:xfrm>
-            <a:off x="3243970" y="3481063"/>
+            <a:off x="5640832" y="2722637"/>
             <a:ext cx="1298477" cy="369332"/>
           </a:xfrm>
           <a:prstGeom prst="rect">
@@ -12704,7 +12412,7 @@
         </p:nvSpPr>
         <p:spPr>
           <a:xfrm>
-            <a:off x="1945493" y="4196619"/>
+            <a:off x="6290071" y="4403407"/>
             <a:ext cx="1298477" cy="369332"/>
           </a:xfrm>
           <a:prstGeom prst="rect">
@@ -12734,7 +12442,7 @@
         </p:nvSpPr>
         <p:spPr>
           <a:xfrm>
-            <a:off x="2527525" y="2654177"/>
+            <a:off x="6661076" y="2531702"/>
             <a:ext cx="1298477" cy="369332"/>
           </a:xfrm>
           <a:prstGeom prst="rect">
@@ -12758,21 +12466,21 @@
       </p:sp>
       <p:cxnSp>
         <p:nvCxnSpPr>
-          <p:cNvPr id="48" name="Elbow Connector 21"/>
+          <p:cNvPr id="22" name="Elbow Connector 21"/>
           <p:cNvCxnSpPr>
-            <a:stCxn id="7" idx="5"/>
-            <a:endCxn id="27" idx="0"/>
+            <a:stCxn id="27" idx="1"/>
+            <a:endCxn id="21" idx="4"/>
           </p:cNvCxnSpPr>
           <p:nvPr/>
         </p:nvCxnSpPr>
         <p:spPr>
-          <a:xfrm rot="5400000">
-            <a:off x="3149394" y="3016493"/>
-            <a:ext cx="2570734" cy="572427"/>
+          <a:xfrm rot="16200000" flipV="1">
+            <a:off x="3411546" y="3539150"/>
+            <a:ext cx="1173513" cy="2163363"/>
           </a:xfrm>
           <a:prstGeom prst="curvedConnector3">
             <a:avLst>
-              <a:gd name="adj1" fmla="val 85540"/>
+              <a:gd name="adj1" fmla="val 50000"/>
             </a:avLst>
           </a:prstGeom>
           <a:ln>
@@ -12795,16 +12503,53 @@
           </a:fontRef>
         </p:style>
       </p:cxnSp>
-      <p:sp>
-        <p:nvSpPr>
-          <p:cNvPr id="49" name="TextBox 48"/>
+      <p:cxnSp>
+        <p:nvCxnSpPr>
+          <p:cNvPr id="29" name="Elbow Connector 21"/>
+          <p:cNvCxnSpPr>
+            <a:stCxn id="21" idx="0"/>
+            <a:endCxn id="7" idx="2"/>
+          </p:cNvCxnSpPr>
+          <p:nvPr/>
+        </p:nvCxnSpPr>
+        <p:spPr>
+          <a:xfrm rot="5400000" flipH="1" flipV="1">
+            <a:off x="3035809" y="2245024"/>
+            <a:ext cx="755463" cy="993841"/>
+          </a:xfrm>
+          <a:prstGeom prst="curvedConnector2">
+            <a:avLst/>
+          </a:prstGeom>
+          <a:ln>
+            <a:headEnd type="none" w="med" len="med"/>
+            <a:tailEnd type="triangle" w="med" len="med"/>
+          </a:ln>
+        </p:spPr>
+        <p:style>
+          <a:lnRef idx="2">
+            <a:schemeClr val="accent6"/>
+          </a:lnRef>
+          <a:fillRef idx="0">
+            <a:schemeClr val="accent6"/>
+          </a:fillRef>
+          <a:effectRef idx="1">
+            <a:schemeClr val="accent6"/>
+          </a:effectRef>
+          <a:fontRef idx="minor">
+            <a:schemeClr val="tx1"/>
+          </a:fontRef>
+        </p:style>
+      </p:cxnSp>
+      <p:sp>
+        <p:nvSpPr>
+          <p:cNvPr id="34" name="TextBox 33"/>
           <p:cNvSpPr txBox="1"/>
           <p:nvPr/>
         </p:nvSpPr>
         <p:spPr>
           <a:xfrm>
-            <a:off x="4665826" y="2170150"/>
-            <a:ext cx="774596" cy="369332"/>
+            <a:off x="3457971" y="4229719"/>
+            <a:ext cx="757126" cy="369332"/>
           </a:xfrm>
           <a:prstGeom prst="rect">
             <a:avLst/>
@@ -12819,9 +12564,652 @@
           <a:p>
             <a:r>
               <a:rPr lang="en-US" dirty="0" smtClean="0"/>
+              <a:t>SCALE</a:t>
+            </a:r>
+            <a:endParaRPr lang="en-US" dirty="0"/>
+          </a:p>
+        </p:txBody>
+      </p:sp>
+      <p:sp>
+        <p:nvSpPr>
+          <p:cNvPr id="35" name="TextBox 34"/>
+          <p:cNvSpPr txBox="1"/>
+          <p:nvPr/>
+        </p:nvSpPr>
+        <p:spPr>
+          <a:xfrm>
+            <a:off x="7457079" y="1052184"/>
+            <a:ext cx="902811" cy="369332"/>
+          </a:xfrm>
+          <a:prstGeom prst="rect">
+            <a:avLst/>
+          </a:prstGeom>
+          <a:noFill/>
+        </p:spPr>
+        <p:txBody>
+          <a:bodyPr wrap="none" rtlCol="0">
+            <a:spAutoFit/>
+          </a:bodyPr>
+          <a:lstStyle/>
+          <a:p>
+            <a:r>
+              <a:rPr lang="en-US" dirty="0" smtClean="0"/>
+              <a:t>SCALED</a:t>
+            </a:r>
+            <a:endParaRPr lang="en-US" dirty="0"/>
+          </a:p>
+        </p:txBody>
+      </p:sp>
+      <p:cxnSp>
+        <p:nvCxnSpPr>
+          <p:cNvPr id="51" name="Elbow Connector 21"/>
+          <p:cNvCxnSpPr>
+            <a:stCxn id="7" idx="1"/>
+            <a:endCxn id="50" idx="1"/>
+          </p:cNvCxnSpPr>
+          <p:nvPr/>
+        </p:nvCxnSpPr>
+        <p:spPr>
+          <a:xfrm rot="16200000" flipH="1" flipV="1">
+            <a:off x="1221180" y="2047913"/>
+            <a:ext cx="2961216" cy="2947236"/>
+          </a:xfrm>
+          <a:prstGeom prst="curvedConnector3">
+            <a:avLst>
+              <a:gd name="adj1" fmla="val -12242"/>
+            </a:avLst>
+          </a:prstGeom>
+          <a:ln>
+            <a:headEnd type="none" w="med" len="med"/>
+            <a:tailEnd type="triangle" w="med" len="med"/>
+          </a:ln>
+        </p:spPr>
+        <p:style>
+          <a:lnRef idx="2">
+            <a:schemeClr val="accent6"/>
+          </a:lnRef>
+          <a:fillRef idx="0">
+            <a:schemeClr val="accent6"/>
+          </a:fillRef>
+          <a:effectRef idx="1">
+            <a:schemeClr val="accent6"/>
+          </a:effectRef>
+          <a:fontRef idx="minor">
+            <a:schemeClr val="tx1"/>
+          </a:fontRef>
+        </p:style>
+      </p:cxnSp>
+      <p:cxnSp>
+        <p:nvCxnSpPr>
+          <p:cNvPr id="54" name="Elbow Connector 21"/>
+          <p:cNvCxnSpPr>
+            <a:stCxn id="27" idx="2"/>
+            <a:endCxn id="50" idx="6"/>
+          </p:cNvCxnSpPr>
+          <p:nvPr/>
+        </p:nvCxnSpPr>
+        <p:spPr>
+          <a:xfrm rot="10800000">
+            <a:off x="2772380" y="5325429"/>
+            <a:ext cx="2042658" cy="205449"/>
+          </a:xfrm>
+          <a:prstGeom prst="curvedConnector3">
+            <a:avLst>
+              <a:gd name="adj1" fmla="val 50000"/>
+            </a:avLst>
+          </a:prstGeom>
+          <a:ln>
+            <a:headEnd type="none" w="med" len="med"/>
+            <a:tailEnd type="triangle" w="med" len="med"/>
+          </a:ln>
+        </p:spPr>
+        <p:style>
+          <a:lnRef idx="2">
+            <a:schemeClr val="accent6"/>
+          </a:lnRef>
+          <a:fillRef idx="0">
+            <a:schemeClr val="accent6"/>
+          </a:fillRef>
+          <a:effectRef idx="1">
+            <a:schemeClr val="accent6"/>
+          </a:effectRef>
+          <a:fontRef idx="minor">
+            <a:schemeClr val="tx1"/>
+          </a:fontRef>
+        </p:style>
+      </p:cxnSp>
+      <p:cxnSp>
+        <p:nvCxnSpPr>
+          <p:cNvPr id="61" name="Elbow Connector 21"/>
+          <p:cNvCxnSpPr>
+            <a:stCxn id="7" idx="3"/>
+            <a:endCxn id="27" idx="0"/>
+          </p:cNvCxnSpPr>
+          <p:nvPr/>
+        </p:nvCxnSpPr>
+        <p:spPr>
+          <a:xfrm rot="16200000" flipH="1">
+            <a:off x="3754423" y="3108484"/>
+            <a:ext cx="2386176" cy="1544210"/>
+          </a:xfrm>
+          <a:prstGeom prst="curvedConnector3">
+            <a:avLst>
+              <a:gd name="adj1" fmla="val 50000"/>
+            </a:avLst>
+          </a:prstGeom>
+          <a:ln>
+            <a:headEnd type="none" w="med" len="med"/>
+            <a:tailEnd type="triangle" w="med" len="med"/>
+          </a:ln>
+        </p:spPr>
+        <p:style>
+          <a:lnRef idx="2">
+            <a:schemeClr val="accent6"/>
+          </a:lnRef>
+          <a:fillRef idx="0">
+            <a:schemeClr val="accent6"/>
+          </a:fillRef>
+          <a:effectRef idx="1">
+            <a:schemeClr val="accent6"/>
+          </a:effectRef>
+          <a:fontRef idx="minor">
+            <a:schemeClr val="tx1"/>
+          </a:fontRef>
+        </p:style>
+      </p:cxnSp>
+      <p:cxnSp>
+        <p:nvCxnSpPr>
+          <p:cNvPr id="66" name="Elbow Connector 21"/>
+          <p:cNvCxnSpPr>
+            <a:stCxn id="21" idx="3"/>
+            <a:endCxn id="50" idx="7"/>
+          </p:cNvCxnSpPr>
+          <p:nvPr/>
+        </p:nvCxnSpPr>
+        <p:spPr>
+          <a:xfrm rot="16200000" flipH="1">
+            <a:off x="1841224" y="4335927"/>
+            <a:ext cx="1101975" cy="230448"/>
+          </a:xfrm>
+          <a:prstGeom prst="curvedConnector3">
+            <a:avLst>
+              <a:gd name="adj1" fmla="val 50000"/>
+            </a:avLst>
+          </a:prstGeom>
+          <a:ln>
+            <a:headEnd type="none" w="med" len="med"/>
+            <a:tailEnd type="triangle" w="med" len="med"/>
+          </a:ln>
+        </p:spPr>
+        <p:style>
+          <a:lnRef idx="2">
+            <a:schemeClr val="accent6"/>
+          </a:lnRef>
+          <a:fillRef idx="0">
+            <a:schemeClr val="accent6"/>
+          </a:fillRef>
+          <a:effectRef idx="1">
+            <a:schemeClr val="accent6"/>
+          </a:effectRef>
+          <a:fontRef idx="minor">
+            <a:schemeClr val="tx1"/>
+          </a:fontRef>
+        </p:style>
+      </p:cxnSp>
+      <p:cxnSp>
+        <p:nvCxnSpPr>
+          <p:cNvPr id="70" name="Elbow Connector 21"/>
+          <p:cNvCxnSpPr>
+            <a:stCxn id="19" idx="6"/>
+            <a:endCxn id="50" idx="5"/>
+          </p:cNvCxnSpPr>
+          <p:nvPr/>
+        </p:nvCxnSpPr>
+        <p:spPr>
+          <a:xfrm flipH="1">
+            <a:off x="2507435" y="1897616"/>
+            <a:ext cx="6356694" cy="3751101"/>
+          </a:xfrm>
+          <a:prstGeom prst="curvedConnector4">
+            <a:avLst>
+              <a:gd name="adj1" fmla="val -3596"/>
+              <a:gd name="adj2" fmla="val 109664"/>
+            </a:avLst>
+          </a:prstGeom>
+          <a:ln>
+            <a:headEnd type="none" w="med" len="med"/>
+            <a:tailEnd type="triangle" w="med" len="med"/>
+          </a:ln>
+        </p:spPr>
+        <p:style>
+          <a:lnRef idx="2">
+            <a:schemeClr val="accent6"/>
+          </a:lnRef>
+          <a:fillRef idx="0">
+            <a:schemeClr val="accent6"/>
+          </a:fillRef>
+          <a:effectRef idx="1">
+            <a:schemeClr val="accent6"/>
+          </a:effectRef>
+          <a:fontRef idx="minor">
+            <a:schemeClr val="tx1"/>
+          </a:fontRef>
+        </p:style>
+      </p:cxnSp>
+      <p:sp>
+        <p:nvSpPr>
+          <p:cNvPr id="208" name="TextBox 207"/>
+          <p:cNvSpPr txBox="1"/>
+          <p:nvPr/>
+        </p:nvSpPr>
+        <p:spPr>
+          <a:xfrm>
+            <a:off x="7972592" y="4403407"/>
+            <a:ext cx="774596" cy="369332"/>
+          </a:xfrm>
+          <a:prstGeom prst="rect">
+            <a:avLst/>
+          </a:prstGeom>
+          <a:noFill/>
+        </p:spPr>
+        <p:txBody>
+          <a:bodyPr wrap="none" rtlCol="0">
+            <a:spAutoFit/>
+          </a:bodyPr>
+          <a:lstStyle/>
+          <a:p>
+            <a:r>
+              <a:rPr lang="en-US" dirty="0" smtClean="0"/>
               <a:t>START</a:t>
             </a:r>
             <a:endParaRPr lang="en-US" dirty="0"/>
+          </a:p>
+        </p:txBody>
+      </p:sp>
+      <p:sp>
+        <p:nvSpPr>
+          <p:cNvPr id="6" name="Oval 5"/>
+          <p:cNvSpPr/>
+          <p:nvPr/>
+        </p:nvSpPr>
+        <p:spPr>
+          <a:xfrm>
+            <a:off x="3928202" y="225652"/>
+            <a:ext cx="1809155" cy="914400"/>
+          </a:xfrm>
+          <a:prstGeom prst="ellipse">
+            <a:avLst/>
+          </a:prstGeom>
+          <a:solidFill>
+            <a:srgbClr val="009473"/>
+          </a:solidFill>
+          <a:ln w="38100" cap="flat" cmpd="dbl" algn="ctr">
+            <a:solidFill>
+              <a:schemeClr val="tx1"/>
+            </a:solidFill>
+            <a:prstDash val="solid"/>
+            <a:round/>
+            <a:headEnd type="none" w="med" len="med"/>
+            <a:tailEnd type="none" w="med" len="med"/>
+          </a:ln>
+          <a:effectLst>
+            <a:outerShdw blurRad="190500" dist="25400" dir="2700000">
+              <a:srgbClr val="000000">
+                <a:alpha val="43000"/>
+              </a:srgbClr>
+            </a:outerShdw>
+          </a:effectLst>
+        </p:spPr>
+        <p:txBody>
+          <a:bodyPr rtlCol="0" anchor="ctr"/>
+          <a:lstStyle/>
+          <a:p>
+            <a:pPr algn="ctr" defTabSz="914400"/>
+            <a:r>
+              <a:rPr lang="en-US" sz="1600" kern="0" dirty="0" smtClean="0">
+                <a:solidFill>
+                  <a:schemeClr val="bg1"/>
+                </a:solidFill>
+                <a:latin typeface="Tahoma"/>
+              </a:rPr>
+              <a:t>NULL</a:t>
+            </a:r>
+            <a:endParaRPr lang="en-US" sz="1600" kern="0" dirty="0">
+              <a:solidFill>
+                <a:schemeClr val="bg1"/>
+              </a:solidFill>
+              <a:latin typeface="Tahoma"/>
+            </a:endParaRPr>
+          </a:p>
+        </p:txBody>
+      </p:sp>
+      <p:sp>
+        <p:nvSpPr>
+          <p:cNvPr id="32" name="Oval 31"/>
+          <p:cNvSpPr/>
+          <p:nvPr/>
+        </p:nvSpPr>
+        <p:spPr>
+          <a:xfrm>
+            <a:off x="5608366" y="3290922"/>
+            <a:ext cx="1809155" cy="914400"/>
+          </a:xfrm>
+          <a:prstGeom prst="ellipse">
+            <a:avLst/>
+          </a:prstGeom>
+          <a:solidFill>
+            <a:srgbClr val="009473"/>
+          </a:solidFill>
+          <a:ln w="6350" cap="flat" cmpd="sng" algn="ctr">
+            <a:noFill/>
+            <a:prstDash val="solid"/>
+            <a:round/>
+            <a:headEnd type="none" w="med" len="med"/>
+            <a:tailEnd type="none" w="med" len="med"/>
+          </a:ln>
+          <a:effectLst>
+            <a:outerShdw blurRad="190500" dist="25400" dir="2700000">
+              <a:srgbClr val="000000">
+                <a:alpha val="43000"/>
+              </a:srgbClr>
+            </a:outerShdw>
+          </a:effectLst>
+        </p:spPr>
+        <p:txBody>
+          <a:bodyPr rtlCol="0" anchor="ctr"/>
+          <a:lstStyle/>
+          <a:p>
+            <a:pPr algn="ctr" defTabSz="914400"/>
+            <a:r>
+              <a:rPr lang="en-US" sz="1400" kern="0" dirty="0" smtClean="0">
+                <a:solidFill>
+                  <a:schemeClr val="bg1"/>
+                </a:solidFill>
+                <a:latin typeface="Tahoma"/>
+              </a:rPr>
+              <a:t>TERMIATED</a:t>
+            </a:r>
+            <a:endParaRPr lang="en-US" sz="1400" kern="0" dirty="0">
+              <a:solidFill>
+                <a:schemeClr val="bg1"/>
+              </a:solidFill>
+              <a:latin typeface="Tahoma"/>
+            </a:endParaRPr>
+          </a:p>
+        </p:txBody>
+      </p:sp>
+      <p:sp>
+        <p:nvSpPr>
+          <p:cNvPr id="21" name="Oval 20"/>
+          <p:cNvSpPr/>
+          <p:nvPr/>
+        </p:nvSpPr>
+        <p:spPr>
+          <a:xfrm>
+            <a:off x="2012042" y="3119675"/>
+            <a:ext cx="1809155" cy="914400"/>
+          </a:xfrm>
+          <a:prstGeom prst="ellipse">
+            <a:avLst/>
+          </a:prstGeom>
+          <a:solidFill>
+            <a:srgbClr val="009473"/>
+          </a:solidFill>
+          <a:ln w="6350" cap="flat" cmpd="sng" algn="ctr">
+            <a:noFill/>
+            <a:prstDash val="solid"/>
+            <a:round/>
+            <a:headEnd type="none" w="med" len="med"/>
+            <a:tailEnd type="none" w="med" len="med"/>
+          </a:ln>
+          <a:effectLst>
+            <a:outerShdw blurRad="190500" dist="25400" dir="2700000">
+              <a:srgbClr val="000000">
+                <a:alpha val="43000"/>
+              </a:srgbClr>
+            </a:outerShdw>
+          </a:effectLst>
+        </p:spPr>
+        <p:txBody>
+          <a:bodyPr rtlCol="0" anchor="ctr"/>
+          <a:lstStyle/>
+          <a:p>
+            <a:pPr algn="ctr" defTabSz="914400"/>
+            <a:r>
+              <a:rPr lang="en-US" sz="1400" kern="0" dirty="0" smtClean="0">
+                <a:solidFill>
+                  <a:schemeClr val="bg1"/>
+                </a:solidFill>
+                <a:latin typeface="Tahoma"/>
+              </a:rPr>
+              <a:t>SCALING</a:t>
+            </a:r>
+            <a:endParaRPr lang="en-US" sz="1400" kern="0" dirty="0">
+              <a:solidFill>
+                <a:schemeClr val="bg1"/>
+              </a:solidFill>
+              <a:latin typeface="Tahoma"/>
+            </a:endParaRPr>
+          </a:p>
+        </p:txBody>
+      </p:sp>
+      <p:sp>
+        <p:nvSpPr>
+          <p:cNvPr id="27" name="Oval 26"/>
+          <p:cNvSpPr/>
+          <p:nvPr/>
+        </p:nvSpPr>
+        <p:spPr>
+          <a:xfrm>
+            <a:off x="4815038" y="5073677"/>
+            <a:ext cx="1809155" cy="914400"/>
+          </a:xfrm>
+          <a:prstGeom prst="ellipse">
+            <a:avLst/>
+          </a:prstGeom>
+          <a:solidFill>
+            <a:srgbClr val="009473"/>
+          </a:solidFill>
+          <a:ln w="6350" cap="flat" cmpd="sng" algn="ctr">
+            <a:noFill/>
+            <a:prstDash val="solid"/>
+            <a:round/>
+            <a:headEnd type="none" w="med" len="med"/>
+            <a:tailEnd type="none" w="med" len="med"/>
+          </a:ln>
+          <a:effectLst>
+            <a:outerShdw blurRad="190500" dist="25400" dir="2700000">
+              <a:srgbClr val="000000">
+                <a:alpha val="43000"/>
+              </a:srgbClr>
+            </a:outerShdw>
+          </a:effectLst>
+        </p:spPr>
+        <p:txBody>
+          <a:bodyPr rtlCol="0" anchor="ctr"/>
+          <a:lstStyle/>
+          <a:p>
+            <a:pPr algn="ctr" defTabSz="914400"/>
+            <a:r>
+              <a:rPr lang="en-US" sz="1400" kern="0" dirty="0" smtClean="0">
+                <a:solidFill>
+                  <a:schemeClr val="bg1"/>
+                </a:solidFill>
+                <a:latin typeface="Tahoma"/>
+              </a:rPr>
+              <a:t>ACTIVE</a:t>
+            </a:r>
+            <a:endParaRPr lang="en-US" sz="1400" kern="0" dirty="0">
+              <a:solidFill>
+                <a:schemeClr val="bg1"/>
+              </a:solidFill>
+              <a:latin typeface="Tahoma"/>
+            </a:endParaRPr>
+          </a:p>
+        </p:txBody>
+      </p:sp>
+      <p:sp>
+        <p:nvSpPr>
+          <p:cNvPr id="50" name="Oval 49"/>
+          <p:cNvSpPr/>
+          <p:nvPr/>
+        </p:nvSpPr>
+        <p:spPr>
+          <a:xfrm>
+            <a:off x="963225" y="4868228"/>
+            <a:ext cx="1809155" cy="914400"/>
+          </a:xfrm>
+          <a:prstGeom prst="ellipse">
+            <a:avLst/>
+          </a:prstGeom>
+          <a:solidFill>
+            <a:srgbClr val="009473"/>
+          </a:solidFill>
+          <a:ln w="6350" cap="flat" cmpd="sng" algn="ctr">
+            <a:noFill/>
+            <a:prstDash val="solid"/>
+            <a:round/>
+            <a:headEnd type="none" w="med" len="med"/>
+            <a:tailEnd type="none" w="med" len="med"/>
+          </a:ln>
+          <a:effectLst>
+            <a:outerShdw blurRad="190500" dist="25400" dir="2700000">
+              <a:srgbClr val="000000">
+                <a:alpha val="43000"/>
+              </a:srgbClr>
+            </a:outerShdw>
+          </a:effectLst>
+        </p:spPr>
+        <p:txBody>
+          <a:bodyPr rtlCol="0" anchor="ctr"/>
+          <a:lstStyle/>
+          <a:p>
+            <a:pPr algn="ctr" defTabSz="914400"/>
+            <a:r>
+              <a:rPr lang="en-US" sz="1400" kern="0" dirty="0" smtClean="0">
+                <a:solidFill>
+                  <a:schemeClr val="bg1"/>
+                </a:solidFill>
+                <a:latin typeface="Tahoma"/>
+              </a:rPr>
+              <a:t>ERROR</a:t>
+            </a:r>
+            <a:endParaRPr lang="en-US" sz="1400" kern="0" dirty="0">
+              <a:solidFill>
+                <a:schemeClr val="bg1"/>
+              </a:solidFill>
+              <a:latin typeface="Tahoma"/>
+            </a:endParaRPr>
+          </a:p>
+        </p:txBody>
+      </p:sp>
+      <p:sp>
+        <p:nvSpPr>
+          <p:cNvPr id="19" name="Oval 18"/>
+          <p:cNvSpPr/>
+          <p:nvPr/>
+        </p:nvSpPr>
+        <p:spPr>
+          <a:xfrm>
+            <a:off x="7054974" y="1440416"/>
+            <a:ext cx="1809155" cy="914400"/>
+          </a:xfrm>
+          <a:prstGeom prst="ellipse">
+            <a:avLst/>
+          </a:prstGeom>
+          <a:solidFill>
+            <a:srgbClr val="009473"/>
+          </a:solidFill>
+          <a:ln w="6350" cap="flat" cmpd="sng" algn="ctr">
+            <a:noFill/>
+            <a:prstDash val="solid"/>
+            <a:round/>
+            <a:headEnd type="none" w="med" len="med"/>
+            <a:tailEnd type="none" w="med" len="med"/>
+          </a:ln>
+          <a:effectLst>
+            <a:outerShdw blurRad="190500" dist="25400" dir="2700000">
+              <a:srgbClr val="000000">
+                <a:alpha val="43000"/>
+              </a:srgbClr>
+            </a:outerShdw>
+          </a:effectLst>
+        </p:spPr>
+        <p:txBody>
+          <a:bodyPr rtlCol="0" anchor="ctr"/>
+          <a:lstStyle/>
+          <a:p>
+            <a:pPr algn="ctr" defTabSz="914400"/>
+            <a:r>
+              <a:rPr lang="en-US" sz="1400" kern="0" dirty="0" smtClean="0">
+                <a:solidFill>
+                  <a:schemeClr val="bg1"/>
+                </a:solidFill>
+                <a:latin typeface="Tahoma"/>
+              </a:rPr>
+              <a:t>INACTIVE</a:t>
+            </a:r>
+            <a:endParaRPr lang="en-US" sz="1400" kern="0" dirty="0">
+              <a:solidFill>
+                <a:schemeClr val="bg1"/>
+              </a:solidFill>
+              <a:latin typeface="Tahoma"/>
+            </a:endParaRPr>
+          </a:p>
+        </p:txBody>
+      </p:sp>
+      <p:sp>
+        <p:nvSpPr>
+          <p:cNvPr id="7" name="Oval 6"/>
+          <p:cNvSpPr/>
+          <p:nvPr/>
+        </p:nvSpPr>
+        <p:spPr>
+          <a:xfrm>
+            <a:off x="3910461" y="1907012"/>
+            <a:ext cx="1809155" cy="914400"/>
+          </a:xfrm>
+          <a:prstGeom prst="ellipse">
+            <a:avLst/>
+          </a:prstGeom>
+          <a:solidFill>
+            <a:srgbClr val="009473"/>
+          </a:solidFill>
+          <a:ln w="6350" cap="flat" cmpd="sng" algn="ctr">
+            <a:noFill/>
+            <a:prstDash val="solid"/>
+            <a:round/>
+            <a:headEnd type="none" w="med" len="med"/>
+            <a:tailEnd type="none" w="med" len="med"/>
+          </a:ln>
+          <a:effectLst>
+            <a:outerShdw blurRad="190500" dist="25400" dir="2700000">
+              <a:srgbClr val="000000">
+                <a:alpha val="43000"/>
+              </a:srgbClr>
+            </a:outerShdw>
+          </a:effectLst>
+        </p:spPr>
+        <p:txBody>
+          <a:bodyPr rtlCol="0" anchor="ctr"/>
+          <a:lstStyle/>
+          <a:p>
+            <a:pPr algn="ctr" defTabSz="914400"/>
+            <a:r>
+              <a:rPr lang="en-US" sz="1400" kern="0" dirty="0" smtClean="0">
+                <a:solidFill>
+                  <a:schemeClr val="bg1"/>
+                </a:solidFill>
+                <a:latin typeface="Tahoma"/>
+              </a:rPr>
+              <a:t>INSTATIATED</a:t>
+            </a:r>
+            <a:endParaRPr lang="en-US" sz="1400" kern="0" dirty="0">
+              <a:solidFill>
+                <a:schemeClr val="bg1"/>
+              </a:solidFill>
+              <a:latin typeface="Tahoma"/>
+            </a:endParaRPr>
           </a:p>
         </p:txBody>
       </p:sp>
@@ -12829,6 +13217,36 @@
     <p:extLst>
       <p:ext uri="{BB962C8B-B14F-4D97-AF65-F5344CB8AC3E}">
         <p14:creationId xmlns:p14="http://schemas.microsoft.com/office/powerpoint/2010/main" val="2281999235"/>
+      </p:ext>
+    </p:extLst>
+  </p:cSld>
+  <p:clrMapOvr>
+    <a:masterClrMapping/>
+  </p:clrMapOvr>
+</p:sld>
+</file>
+
+<file path=ppt/slides/slide8.xml><?xml version="1.0" encoding="utf-8"?>
+<p:sld xmlns:a="http://schemas.openxmlformats.org/drawingml/2006/main" xmlns:r="http://schemas.openxmlformats.org/officeDocument/2006/relationships" xmlns:p="http://schemas.openxmlformats.org/presentationml/2006/main">
+  <p:cSld>
+    <p:spTree>
+      <p:nvGrpSpPr>
+        <p:cNvPr id="1" name=""/>
+        <p:cNvGrpSpPr/>
+        <p:nvPr/>
+      </p:nvGrpSpPr>
+      <p:grpSpPr>
+        <a:xfrm>
+          <a:off x="0" y="0"/>
+          <a:ext cx="0" cy="0"/>
+          <a:chOff x="0" y="0"/>
+          <a:chExt cx="0" cy="0"/>
+        </a:xfrm>
+      </p:grpSpPr>
+    </p:spTree>
+    <p:extLst>
+      <p:ext uri="{BB962C8B-B14F-4D97-AF65-F5344CB8AC3E}">
+        <p14:creationId xmlns:p14="http://schemas.microsoft.com/office/powerpoint/2010/main" val="1389600416"/>
       </p:ext>
     </p:extLst>
   </p:cSld>

</xml_diff>

<commit_message>
updated pictures and stencils
</commit_message>
<xml_diff>
--- a/docs/images/openbaton-stencils.pptx
+++ b/docs/images/openbaton-stencils.pptx
@@ -12605,18 +12605,18 @@
           <p:cNvPr id="51" name="Elbow Connector 21"/>
           <p:cNvCxnSpPr>
             <a:stCxn id="7" idx="1"/>
-            <a:endCxn id="50" idx="1"/>
+            <a:endCxn id="50" idx="0"/>
           </p:cNvCxnSpPr>
           <p:nvPr/>
         </p:nvCxnSpPr>
         <p:spPr>
           <a:xfrm rot="16200000" flipH="1" flipV="1">
-            <a:off x="1221180" y="2047913"/>
-            <a:ext cx="2961216" cy="2947236"/>
+            <a:off x="1607952" y="2300773"/>
+            <a:ext cx="2827305" cy="2307603"/>
           </a:xfrm>
           <a:prstGeom prst="curvedConnector3">
             <a:avLst>
-              <a:gd name="adj1" fmla="val -12242"/>
+              <a:gd name="adj1" fmla="val -12822"/>
             </a:avLst>
           </a:prstGeom>
           <a:ln>
@@ -12828,6 +12828,373 @@
       </p:sp>
       <p:sp>
         <p:nvSpPr>
+          <p:cNvPr id="32" name="Oval 31"/>
+          <p:cNvSpPr/>
+          <p:nvPr/>
+        </p:nvSpPr>
+        <p:spPr>
+          <a:xfrm>
+            <a:off x="5608366" y="3290922"/>
+            <a:ext cx="1809155" cy="914400"/>
+          </a:xfrm>
+          <a:prstGeom prst="ellipse">
+            <a:avLst/>
+          </a:prstGeom>
+          <a:solidFill>
+            <a:srgbClr val="009473"/>
+          </a:solidFill>
+          <a:ln w="6350" cap="flat" cmpd="sng" algn="ctr">
+            <a:noFill/>
+            <a:prstDash val="solid"/>
+            <a:round/>
+            <a:headEnd type="none" w="med" len="med"/>
+            <a:tailEnd type="none" w="med" len="med"/>
+          </a:ln>
+          <a:effectLst>
+            <a:outerShdw blurRad="190500" dist="25400" dir="2700000">
+              <a:srgbClr val="000000">
+                <a:alpha val="43000"/>
+              </a:srgbClr>
+            </a:outerShdw>
+          </a:effectLst>
+        </p:spPr>
+        <p:txBody>
+          <a:bodyPr rtlCol="0" anchor="ctr"/>
+          <a:lstStyle/>
+          <a:p>
+            <a:pPr algn="ctr" defTabSz="914400"/>
+            <a:r>
+              <a:rPr lang="en-US" sz="1400" kern="0" dirty="0" smtClean="0">
+                <a:solidFill>
+                  <a:schemeClr val="bg1"/>
+                </a:solidFill>
+                <a:latin typeface="Tahoma"/>
+              </a:rPr>
+              <a:t>TERMIATED</a:t>
+            </a:r>
+            <a:endParaRPr lang="en-US" sz="1400" kern="0" dirty="0">
+              <a:solidFill>
+                <a:schemeClr val="bg1"/>
+              </a:solidFill>
+              <a:latin typeface="Tahoma"/>
+            </a:endParaRPr>
+          </a:p>
+        </p:txBody>
+      </p:sp>
+      <p:sp>
+        <p:nvSpPr>
+          <p:cNvPr id="21" name="Oval 20"/>
+          <p:cNvSpPr/>
+          <p:nvPr/>
+        </p:nvSpPr>
+        <p:spPr>
+          <a:xfrm>
+            <a:off x="2012042" y="3119675"/>
+            <a:ext cx="1809155" cy="914400"/>
+          </a:xfrm>
+          <a:prstGeom prst="ellipse">
+            <a:avLst/>
+          </a:prstGeom>
+          <a:solidFill>
+            <a:srgbClr val="009473"/>
+          </a:solidFill>
+          <a:ln w="6350" cap="flat" cmpd="sng" algn="ctr">
+            <a:noFill/>
+            <a:prstDash val="solid"/>
+            <a:round/>
+            <a:headEnd type="none" w="med" len="med"/>
+            <a:tailEnd type="none" w="med" len="med"/>
+          </a:ln>
+          <a:effectLst>
+            <a:outerShdw blurRad="190500" dist="25400" dir="2700000">
+              <a:srgbClr val="000000">
+                <a:alpha val="43000"/>
+              </a:srgbClr>
+            </a:outerShdw>
+          </a:effectLst>
+        </p:spPr>
+        <p:txBody>
+          <a:bodyPr rtlCol="0" anchor="ctr"/>
+          <a:lstStyle/>
+          <a:p>
+            <a:pPr algn="ctr" defTabSz="914400"/>
+            <a:r>
+              <a:rPr lang="en-US" sz="1400" kern="0" dirty="0" smtClean="0">
+                <a:solidFill>
+                  <a:schemeClr val="bg1"/>
+                </a:solidFill>
+                <a:latin typeface="Tahoma"/>
+              </a:rPr>
+              <a:t>SCALING</a:t>
+            </a:r>
+            <a:endParaRPr lang="en-US" sz="1400" kern="0" dirty="0">
+              <a:solidFill>
+                <a:schemeClr val="bg1"/>
+              </a:solidFill>
+              <a:latin typeface="Tahoma"/>
+            </a:endParaRPr>
+          </a:p>
+        </p:txBody>
+      </p:sp>
+      <p:sp>
+        <p:nvSpPr>
+          <p:cNvPr id="27" name="Oval 26"/>
+          <p:cNvSpPr/>
+          <p:nvPr/>
+        </p:nvSpPr>
+        <p:spPr>
+          <a:xfrm>
+            <a:off x="4815038" y="5073677"/>
+            <a:ext cx="1809155" cy="914400"/>
+          </a:xfrm>
+          <a:prstGeom prst="ellipse">
+            <a:avLst/>
+          </a:prstGeom>
+          <a:solidFill>
+            <a:srgbClr val="009473"/>
+          </a:solidFill>
+          <a:ln w="6350" cap="flat" cmpd="sng" algn="ctr">
+            <a:noFill/>
+            <a:prstDash val="solid"/>
+            <a:round/>
+            <a:headEnd type="none" w="med" len="med"/>
+            <a:tailEnd type="none" w="med" len="med"/>
+          </a:ln>
+          <a:effectLst>
+            <a:outerShdw blurRad="190500" dist="25400" dir="2700000">
+              <a:srgbClr val="000000">
+                <a:alpha val="43000"/>
+              </a:srgbClr>
+            </a:outerShdw>
+          </a:effectLst>
+        </p:spPr>
+        <p:txBody>
+          <a:bodyPr rtlCol="0" anchor="ctr"/>
+          <a:lstStyle/>
+          <a:p>
+            <a:pPr algn="ctr" defTabSz="914400"/>
+            <a:r>
+              <a:rPr lang="en-US" sz="1400" kern="0" dirty="0" smtClean="0">
+                <a:solidFill>
+                  <a:schemeClr val="bg1"/>
+                </a:solidFill>
+                <a:latin typeface="Tahoma"/>
+              </a:rPr>
+              <a:t>ACTIVE</a:t>
+            </a:r>
+            <a:endParaRPr lang="en-US" sz="1400" kern="0" dirty="0">
+              <a:solidFill>
+                <a:schemeClr val="bg1"/>
+              </a:solidFill>
+              <a:latin typeface="Tahoma"/>
+            </a:endParaRPr>
+          </a:p>
+        </p:txBody>
+      </p:sp>
+      <p:sp>
+        <p:nvSpPr>
+          <p:cNvPr id="50" name="Oval 49"/>
+          <p:cNvSpPr/>
+          <p:nvPr/>
+        </p:nvSpPr>
+        <p:spPr>
+          <a:xfrm>
+            <a:off x="963225" y="4868228"/>
+            <a:ext cx="1809155" cy="914400"/>
+          </a:xfrm>
+          <a:prstGeom prst="ellipse">
+            <a:avLst/>
+          </a:prstGeom>
+          <a:solidFill>
+            <a:srgbClr val="009473"/>
+          </a:solidFill>
+          <a:ln w="6350" cap="flat" cmpd="sng" algn="ctr">
+            <a:noFill/>
+            <a:prstDash val="solid"/>
+            <a:round/>
+            <a:headEnd type="none" w="med" len="med"/>
+            <a:tailEnd type="none" w="med" len="med"/>
+          </a:ln>
+          <a:effectLst>
+            <a:outerShdw blurRad="190500" dist="25400" dir="2700000">
+              <a:srgbClr val="000000">
+                <a:alpha val="43000"/>
+              </a:srgbClr>
+            </a:outerShdw>
+          </a:effectLst>
+        </p:spPr>
+        <p:txBody>
+          <a:bodyPr rtlCol="0" anchor="ctr"/>
+          <a:lstStyle/>
+          <a:p>
+            <a:pPr algn="ctr" defTabSz="914400"/>
+            <a:r>
+              <a:rPr lang="en-US" sz="1400" kern="0" dirty="0" smtClean="0">
+                <a:solidFill>
+                  <a:schemeClr val="bg1"/>
+                </a:solidFill>
+                <a:latin typeface="Tahoma"/>
+              </a:rPr>
+              <a:t>ERROR</a:t>
+            </a:r>
+            <a:endParaRPr lang="en-US" sz="1400" kern="0" dirty="0">
+              <a:solidFill>
+                <a:schemeClr val="bg1"/>
+              </a:solidFill>
+              <a:latin typeface="Tahoma"/>
+            </a:endParaRPr>
+          </a:p>
+        </p:txBody>
+      </p:sp>
+      <p:sp>
+        <p:nvSpPr>
+          <p:cNvPr id="19" name="Oval 18"/>
+          <p:cNvSpPr/>
+          <p:nvPr/>
+        </p:nvSpPr>
+        <p:spPr>
+          <a:xfrm>
+            <a:off x="7054974" y="1440416"/>
+            <a:ext cx="1809155" cy="914400"/>
+          </a:xfrm>
+          <a:prstGeom prst="ellipse">
+            <a:avLst/>
+          </a:prstGeom>
+          <a:solidFill>
+            <a:srgbClr val="009473"/>
+          </a:solidFill>
+          <a:ln w="6350" cap="flat" cmpd="sng" algn="ctr">
+            <a:noFill/>
+            <a:prstDash val="solid"/>
+            <a:round/>
+            <a:headEnd type="none" w="med" len="med"/>
+            <a:tailEnd type="none" w="med" len="med"/>
+          </a:ln>
+          <a:effectLst>
+            <a:outerShdw blurRad="190500" dist="25400" dir="2700000">
+              <a:srgbClr val="000000">
+                <a:alpha val="43000"/>
+              </a:srgbClr>
+            </a:outerShdw>
+          </a:effectLst>
+        </p:spPr>
+        <p:txBody>
+          <a:bodyPr rtlCol="0" anchor="ctr"/>
+          <a:lstStyle/>
+          <a:p>
+            <a:pPr algn="ctr" defTabSz="914400"/>
+            <a:r>
+              <a:rPr lang="en-US" sz="1400" kern="0" dirty="0" smtClean="0">
+                <a:solidFill>
+                  <a:schemeClr val="bg1"/>
+                </a:solidFill>
+                <a:latin typeface="Tahoma"/>
+              </a:rPr>
+              <a:t>INACTIVE</a:t>
+            </a:r>
+            <a:endParaRPr lang="en-US" sz="1400" kern="0" dirty="0">
+              <a:solidFill>
+                <a:schemeClr val="bg1"/>
+              </a:solidFill>
+              <a:latin typeface="Tahoma"/>
+            </a:endParaRPr>
+          </a:p>
+        </p:txBody>
+      </p:sp>
+      <p:sp>
+        <p:nvSpPr>
+          <p:cNvPr id="7" name="Oval 6"/>
+          <p:cNvSpPr/>
+          <p:nvPr/>
+        </p:nvSpPr>
+        <p:spPr>
+          <a:xfrm>
+            <a:off x="3910461" y="1907012"/>
+            <a:ext cx="1809155" cy="914400"/>
+          </a:xfrm>
+          <a:prstGeom prst="ellipse">
+            <a:avLst/>
+          </a:prstGeom>
+          <a:solidFill>
+            <a:srgbClr val="009473"/>
+          </a:solidFill>
+          <a:ln w="6350" cap="flat" cmpd="sng" algn="ctr">
+            <a:noFill/>
+            <a:prstDash val="solid"/>
+            <a:round/>
+            <a:headEnd type="none" w="med" len="med"/>
+            <a:tailEnd type="none" w="med" len="med"/>
+          </a:ln>
+          <a:effectLst>
+            <a:outerShdw blurRad="190500" dist="25400" dir="2700000">
+              <a:srgbClr val="000000">
+                <a:alpha val="43000"/>
+              </a:srgbClr>
+            </a:outerShdw>
+          </a:effectLst>
+        </p:spPr>
+        <p:txBody>
+          <a:bodyPr rtlCol="0" anchor="ctr"/>
+          <a:lstStyle/>
+          <a:p>
+            <a:pPr algn="ctr" defTabSz="914400"/>
+            <a:r>
+              <a:rPr lang="en-US" sz="1400" kern="0" dirty="0" smtClean="0">
+                <a:solidFill>
+                  <a:schemeClr val="bg1"/>
+                </a:solidFill>
+                <a:latin typeface="Tahoma"/>
+              </a:rPr>
+              <a:t>INSTATIATED</a:t>
+            </a:r>
+            <a:endParaRPr lang="en-US" sz="1400" kern="0" dirty="0">
+              <a:solidFill>
+                <a:schemeClr val="bg1"/>
+              </a:solidFill>
+              <a:latin typeface="Tahoma"/>
+            </a:endParaRPr>
+          </a:p>
+        </p:txBody>
+      </p:sp>
+      <p:cxnSp>
+        <p:nvCxnSpPr>
+          <p:cNvPr id="219" name="Elbow Connector 21"/>
+          <p:cNvCxnSpPr>
+            <a:stCxn id="6" idx="2"/>
+            <a:endCxn id="50" idx="1"/>
+          </p:cNvCxnSpPr>
+          <p:nvPr/>
+        </p:nvCxnSpPr>
+        <p:spPr>
+          <a:xfrm rot="10800000" flipV="1">
+            <a:off x="1228170" y="682851"/>
+            <a:ext cx="2700032" cy="4319287"/>
+          </a:xfrm>
+          <a:prstGeom prst="curvedConnector2">
+            <a:avLst/>
+          </a:prstGeom>
+          <a:ln>
+            <a:headEnd type="none" w="med" len="med"/>
+            <a:tailEnd type="triangle" w="med" len="med"/>
+          </a:ln>
+        </p:spPr>
+        <p:style>
+          <a:lnRef idx="2">
+            <a:schemeClr val="accent6"/>
+          </a:lnRef>
+          <a:fillRef idx="0">
+            <a:schemeClr val="accent6"/>
+          </a:fillRef>
+          <a:effectRef idx="1">
+            <a:schemeClr val="accent6"/>
+          </a:effectRef>
+          <a:fontRef idx="minor">
+            <a:schemeClr val="tx1"/>
+          </a:fontRef>
+        </p:style>
+      </p:cxnSp>
+      <p:sp>
+        <p:nvSpPr>
           <p:cNvPr id="6" name="Oval 5"/>
           <p:cNvSpPr/>
           <p:nvPr/>
@@ -12875,336 +13242,6 @@
               <a:t>NULL</a:t>
             </a:r>
             <a:endParaRPr lang="en-US" sz="1600" kern="0" dirty="0">
-              <a:solidFill>
-                <a:schemeClr val="bg1"/>
-              </a:solidFill>
-              <a:latin typeface="Tahoma"/>
-            </a:endParaRPr>
-          </a:p>
-        </p:txBody>
-      </p:sp>
-      <p:sp>
-        <p:nvSpPr>
-          <p:cNvPr id="32" name="Oval 31"/>
-          <p:cNvSpPr/>
-          <p:nvPr/>
-        </p:nvSpPr>
-        <p:spPr>
-          <a:xfrm>
-            <a:off x="5608366" y="3290922"/>
-            <a:ext cx="1809155" cy="914400"/>
-          </a:xfrm>
-          <a:prstGeom prst="ellipse">
-            <a:avLst/>
-          </a:prstGeom>
-          <a:solidFill>
-            <a:srgbClr val="009473"/>
-          </a:solidFill>
-          <a:ln w="6350" cap="flat" cmpd="sng" algn="ctr">
-            <a:noFill/>
-            <a:prstDash val="solid"/>
-            <a:round/>
-            <a:headEnd type="none" w="med" len="med"/>
-            <a:tailEnd type="none" w="med" len="med"/>
-          </a:ln>
-          <a:effectLst>
-            <a:outerShdw blurRad="190500" dist="25400" dir="2700000">
-              <a:srgbClr val="000000">
-                <a:alpha val="43000"/>
-              </a:srgbClr>
-            </a:outerShdw>
-          </a:effectLst>
-        </p:spPr>
-        <p:txBody>
-          <a:bodyPr rtlCol="0" anchor="ctr"/>
-          <a:lstStyle/>
-          <a:p>
-            <a:pPr algn="ctr" defTabSz="914400"/>
-            <a:r>
-              <a:rPr lang="en-US" sz="1400" kern="0" dirty="0" smtClean="0">
-                <a:solidFill>
-                  <a:schemeClr val="bg1"/>
-                </a:solidFill>
-                <a:latin typeface="Tahoma"/>
-              </a:rPr>
-              <a:t>TERMIATED</a:t>
-            </a:r>
-            <a:endParaRPr lang="en-US" sz="1400" kern="0" dirty="0">
-              <a:solidFill>
-                <a:schemeClr val="bg1"/>
-              </a:solidFill>
-              <a:latin typeface="Tahoma"/>
-            </a:endParaRPr>
-          </a:p>
-        </p:txBody>
-      </p:sp>
-      <p:sp>
-        <p:nvSpPr>
-          <p:cNvPr id="21" name="Oval 20"/>
-          <p:cNvSpPr/>
-          <p:nvPr/>
-        </p:nvSpPr>
-        <p:spPr>
-          <a:xfrm>
-            <a:off x="2012042" y="3119675"/>
-            <a:ext cx="1809155" cy="914400"/>
-          </a:xfrm>
-          <a:prstGeom prst="ellipse">
-            <a:avLst/>
-          </a:prstGeom>
-          <a:solidFill>
-            <a:srgbClr val="009473"/>
-          </a:solidFill>
-          <a:ln w="6350" cap="flat" cmpd="sng" algn="ctr">
-            <a:noFill/>
-            <a:prstDash val="solid"/>
-            <a:round/>
-            <a:headEnd type="none" w="med" len="med"/>
-            <a:tailEnd type="none" w="med" len="med"/>
-          </a:ln>
-          <a:effectLst>
-            <a:outerShdw blurRad="190500" dist="25400" dir="2700000">
-              <a:srgbClr val="000000">
-                <a:alpha val="43000"/>
-              </a:srgbClr>
-            </a:outerShdw>
-          </a:effectLst>
-        </p:spPr>
-        <p:txBody>
-          <a:bodyPr rtlCol="0" anchor="ctr"/>
-          <a:lstStyle/>
-          <a:p>
-            <a:pPr algn="ctr" defTabSz="914400"/>
-            <a:r>
-              <a:rPr lang="en-US" sz="1400" kern="0" dirty="0" smtClean="0">
-                <a:solidFill>
-                  <a:schemeClr val="bg1"/>
-                </a:solidFill>
-                <a:latin typeface="Tahoma"/>
-              </a:rPr>
-              <a:t>SCALING</a:t>
-            </a:r>
-            <a:endParaRPr lang="en-US" sz="1400" kern="0" dirty="0">
-              <a:solidFill>
-                <a:schemeClr val="bg1"/>
-              </a:solidFill>
-              <a:latin typeface="Tahoma"/>
-            </a:endParaRPr>
-          </a:p>
-        </p:txBody>
-      </p:sp>
-      <p:sp>
-        <p:nvSpPr>
-          <p:cNvPr id="27" name="Oval 26"/>
-          <p:cNvSpPr/>
-          <p:nvPr/>
-        </p:nvSpPr>
-        <p:spPr>
-          <a:xfrm>
-            <a:off x="4815038" y="5073677"/>
-            <a:ext cx="1809155" cy="914400"/>
-          </a:xfrm>
-          <a:prstGeom prst="ellipse">
-            <a:avLst/>
-          </a:prstGeom>
-          <a:solidFill>
-            <a:srgbClr val="009473"/>
-          </a:solidFill>
-          <a:ln w="6350" cap="flat" cmpd="sng" algn="ctr">
-            <a:noFill/>
-            <a:prstDash val="solid"/>
-            <a:round/>
-            <a:headEnd type="none" w="med" len="med"/>
-            <a:tailEnd type="none" w="med" len="med"/>
-          </a:ln>
-          <a:effectLst>
-            <a:outerShdw blurRad="190500" dist="25400" dir="2700000">
-              <a:srgbClr val="000000">
-                <a:alpha val="43000"/>
-              </a:srgbClr>
-            </a:outerShdw>
-          </a:effectLst>
-        </p:spPr>
-        <p:txBody>
-          <a:bodyPr rtlCol="0" anchor="ctr"/>
-          <a:lstStyle/>
-          <a:p>
-            <a:pPr algn="ctr" defTabSz="914400"/>
-            <a:r>
-              <a:rPr lang="en-US" sz="1400" kern="0" dirty="0" smtClean="0">
-                <a:solidFill>
-                  <a:schemeClr val="bg1"/>
-                </a:solidFill>
-                <a:latin typeface="Tahoma"/>
-              </a:rPr>
-              <a:t>ACTIVE</a:t>
-            </a:r>
-            <a:endParaRPr lang="en-US" sz="1400" kern="0" dirty="0">
-              <a:solidFill>
-                <a:schemeClr val="bg1"/>
-              </a:solidFill>
-              <a:latin typeface="Tahoma"/>
-            </a:endParaRPr>
-          </a:p>
-        </p:txBody>
-      </p:sp>
-      <p:sp>
-        <p:nvSpPr>
-          <p:cNvPr id="50" name="Oval 49"/>
-          <p:cNvSpPr/>
-          <p:nvPr/>
-        </p:nvSpPr>
-        <p:spPr>
-          <a:xfrm>
-            <a:off x="963225" y="4868228"/>
-            <a:ext cx="1809155" cy="914400"/>
-          </a:xfrm>
-          <a:prstGeom prst="ellipse">
-            <a:avLst/>
-          </a:prstGeom>
-          <a:solidFill>
-            <a:srgbClr val="009473"/>
-          </a:solidFill>
-          <a:ln w="6350" cap="flat" cmpd="sng" algn="ctr">
-            <a:noFill/>
-            <a:prstDash val="solid"/>
-            <a:round/>
-            <a:headEnd type="none" w="med" len="med"/>
-            <a:tailEnd type="none" w="med" len="med"/>
-          </a:ln>
-          <a:effectLst>
-            <a:outerShdw blurRad="190500" dist="25400" dir="2700000">
-              <a:srgbClr val="000000">
-                <a:alpha val="43000"/>
-              </a:srgbClr>
-            </a:outerShdw>
-          </a:effectLst>
-        </p:spPr>
-        <p:txBody>
-          <a:bodyPr rtlCol="0" anchor="ctr"/>
-          <a:lstStyle/>
-          <a:p>
-            <a:pPr algn="ctr" defTabSz="914400"/>
-            <a:r>
-              <a:rPr lang="en-US" sz="1400" kern="0" dirty="0" smtClean="0">
-                <a:solidFill>
-                  <a:schemeClr val="bg1"/>
-                </a:solidFill>
-                <a:latin typeface="Tahoma"/>
-              </a:rPr>
-              <a:t>ERROR</a:t>
-            </a:r>
-            <a:endParaRPr lang="en-US" sz="1400" kern="0" dirty="0">
-              <a:solidFill>
-                <a:schemeClr val="bg1"/>
-              </a:solidFill>
-              <a:latin typeface="Tahoma"/>
-            </a:endParaRPr>
-          </a:p>
-        </p:txBody>
-      </p:sp>
-      <p:sp>
-        <p:nvSpPr>
-          <p:cNvPr id="19" name="Oval 18"/>
-          <p:cNvSpPr/>
-          <p:nvPr/>
-        </p:nvSpPr>
-        <p:spPr>
-          <a:xfrm>
-            <a:off x="7054974" y="1440416"/>
-            <a:ext cx="1809155" cy="914400"/>
-          </a:xfrm>
-          <a:prstGeom prst="ellipse">
-            <a:avLst/>
-          </a:prstGeom>
-          <a:solidFill>
-            <a:srgbClr val="009473"/>
-          </a:solidFill>
-          <a:ln w="6350" cap="flat" cmpd="sng" algn="ctr">
-            <a:noFill/>
-            <a:prstDash val="solid"/>
-            <a:round/>
-            <a:headEnd type="none" w="med" len="med"/>
-            <a:tailEnd type="none" w="med" len="med"/>
-          </a:ln>
-          <a:effectLst>
-            <a:outerShdw blurRad="190500" dist="25400" dir="2700000">
-              <a:srgbClr val="000000">
-                <a:alpha val="43000"/>
-              </a:srgbClr>
-            </a:outerShdw>
-          </a:effectLst>
-        </p:spPr>
-        <p:txBody>
-          <a:bodyPr rtlCol="0" anchor="ctr"/>
-          <a:lstStyle/>
-          <a:p>
-            <a:pPr algn="ctr" defTabSz="914400"/>
-            <a:r>
-              <a:rPr lang="en-US" sz="1400" kern="0" dirty="0" smtClean="0">
-                <a:solidFill>
-                  <a:schemeClr val="bg1"/>
-                </a:solidFill>
-                <a:latin typeface="Tahoma"/>
-              </a:rPr>
-              <a:t>INACTIVE</a:t>
-            </a:r>
-            <a:endParaRPr lang="en-US" sz="1400" kern="0" dirty="0">
-              <a:solidFill>
-                <a:schemeClr val="bg1"/>
-              </a:solidFill>
-              <a:latin typeface="Tahoma"/>
-            </a:endParaRPr>
-          </a:p>
-        </p:txBody>
-      </p:sp>
-      <p:sp>
-        <p:nvSpPr>
-          <p:cNvPr id="7" name="Oval 6"/>
-          <p:cNvSpPr/>
-          <p:nvPr/>
-        </p:nvSpPr>
-        <p:spPr>
-          <a:xfrm>
-            <a:off x="3910461" y="1907012"/>
-            <a:ext cx="1809155" cy="914400"/>
-          </a:xfrm>
-          <a:prstGeom prst="ellipse">
-            <a:avLst/>
-          </a:prstGeom>
-          <a:solidFill>
-            <a:srgbClr val="009473"/>
-          </a:solidFill>
-          <a:ln w="6350" cap="flat" cmpd="sng" algn="ctr">
-            <a:noFill/>
-            <a:prstDash val="solid"/>
-            <a:round/>
-            <a:headEnd type="none" w="med" len="med"/>
-            <a:tailEnd type="none" w="med" len="med"/>
-          </a:ln>
-          <a:effectLst>
-            <a:outerShdw blurRad="190500" dist="25400" dir="2700000">
-              <a:srgbClr val="000000">
-                <a:alpha val="43000"/>
-              </a:srgbClr>
-            </a:outerShdw>
-          </a:effectLst>
-        </p:spPr>
-        <p:txBody>
-          <a:bodyPr rtlCol="0" anchor="ctr"/>
-          <a:lstStyle/>
-          <a:p>
-            <a:pPr algn="ctr" defTabSz="914400"/>
-            <a:r>
-              <a:rPr lang="en-US" sz="1400" kern="0" dirty="0" smtClean="0">
-                <a:solidFill>
-                  <a:schemeClr val="bg1"/>
-                </a:solidFill>
-                <a:latin typeface="Tahoma"/>
-              </a:rPr>
-              <a:t>INSTATIATED</a:t>
-            </a:r>
-            <a:endParaRPr lang="en-US" sz="1400" kern="0" dirty="0">
               <a:solidFill>
                 <a:schemeClr val="bg1"/>
               </a:solidFill>

</xml_diff>

<commit_message>
updated documentation with several fixes: * removed images not used * updated styles with the one from Tatjana * updated image names: from now on PLEASE use only page-name-image-name and AVOID imageName, image_Name PLEASE * fixed minor issues everywhere
</commit_message>
<xml_diff>
--- a/docs/images/openbaton-stencils.pptx
+++ b/docs/images/openbaton-stencils.pptx
@@ -13,6 +13,7 @@
     <p:sldId id="260" r:id="rId7"/>
     <p:sldId id="262" r:id="rId8"/>
     <p:sldId id="263" r:id="rId9"/>
+    <p:sldId id="264" r:id="rId10"/>
   </p:sldIdLst>
   <p:sldSz cx="9144000" cy="6858000" type="screen4x3"/>
   <p:notesSz cx="6858000" cy="9144000"/>
@@ -295,7 +296,7 @@
           <a:p>
             <a:fld id="{14A7C45A-EC31-C341-BCBA-1394489C9760}" type="datetimeFigureOut">
               <a:rPr lang="en-US" smtClean="0"/>
-              <a:t>13/10/15</a:t>
+              <a:t>21/10/15</a:t>
             </a:fld>
             <a:endParaRPr lang="en-US"/>
           </a:p>
@@ -465,7 +466,7 @@
           <a:p>
             <a:fld id="{14A7C45A-EC31-C341-BCBA-1394489C9760}" type="datetimeFigureOut">
               <a:rPr lang="en-US" smtClean="0"/>
-              <a:t>13/10/15</a:t>
+              <a:t>21/10/15</a:t>
             </a:fld>
             <a:endParaRPr lang="en-US"/>
           </a:p>
@@ -645,7 +646,7 @@
           <a:p>
             <a:fld id="{14A7C45A-EC31-C341-BCBA-1394489C9760}" type="datetimeFigureOut">
               <a:rPr lang="en-US" smtClean="0"/>
-              <a:t>13/10/15</a:t>
+              <a:t>21/10/15</a:t>
             </a:fld>
             <a:endParaRPr lang="en-US"/>
           </a:p>
@@ -815,7 +816,7 @@
           <a:p>
             <a:fld id="{14A7C45A-EC31-C341-BCBA-1394489C9760}" type="datetimeFigureOut">
               <a:rPr lang="en-US" smtClean="0"/>
-              <a:t>13/10/15</a:t>
+              <a:t>21/10/15</a:t>
             </a:fld>
             <a:endParaRPr lang="en-US"/>
           </a:p>
@@ -1061,7 +1062,7 @@
           <a:p>
             <a:fld id="{14A7C45A-EC31-C341-BCBA-1394489C9760}" type="datetimeFigureOut">
               <a:rPr lang="en-US" smtClean="0"/>
-              <a:t>13/10/15</a:t>
+              <a:t>21/10/15</a:t>
             </a:fld>
             <a:endParaRPr lang="en-US"/>
           </a:p>
@@ -1349,7 +1350,7 @@
           <a:p>
             <a:fld id="{14A7C45A-EC31-C341-BCBA-1394489C9760}" type="datetimeFigureOut">
               <a:rPr lang="en-US" smtClean="0"/>
-              <a:t>13/10/15</a:t>
+              <a:t>21/10/15</a:t>
             </a:fld>
             <a:endParaRPr lang="en-US"/>
           </a:p>
@@ -1771,7 +1772,7 @@
           <a:p>
             <a:fld id="{14A7C45A-EC31-C341-BCBA-1394489C9760}" type="datetimeFigureOut">
               <a:rPr lang="en-US" smtClean="0"/>
-              <a:t>13/10/15</a:t>
+              <a:t>21/10/15</a:t>
             </a:fld>
             <a:endParaRPr lang="en-US"/>
           </a:p>
@@ -1889,7 +1890,7 @@
           <a:p>
             <a:fld id="{14A7C45A-EC31-C341-BCBA-1394489C9760}" type="datetimeFigureOut">
               <a:rPr lang="en-US" smtClean="0"/>
-              <a:t>13/10/15</a:t>
+              <a:t>21/10/15</a:t>
             </a:fld>
             <a:endParaRPr lang="en-US"/>
           </a:p>
@@ -1984,7 +1985,7 @@
           <a:p>
             <a:fld id="{14A7C45A-EC31-C341-BCBA-1394489C9760}" type="datetimeFigureOut">
               <a:rPr lang="en-US" smtClean="0"/>
-              <a:t>13/10/15</a:t>
+              <a:t>21/10/15</a:t>
             </a:fld>
             <a:endParaRPr lang="en-US"/>
           </a:p>
@@ -2261,7 +2262,7 @@
           <a:p>
             <a:fld id="{14A7C45A-EC31-C341-BCBA-1394489C9760}" type="datetimeFigureOut">
               <a:rPr lang="en-US" smtClean="0"/>
-              <a:t>13/10/15</a:t>
+              <a:t>21/10/15</a:t>
             </a:fld>
             <a:endParaRPr lang="en-US"/>
           </a:p>
@@ -2514,7 +2515,7 @@
           <a:p>
             <a:fld id="{14A7C45A-EC31-C341-BCBA-1394489C9760}" type="datetimeFigureOut">
               <a:rPr lang="en-US" smtClean="0"/>
-              <a:t>13/10/15</a:t>
+              <a:t>21/10/15</a:t>
             </a:fld>
             <a:endParaRPr lang="en-US"/>
           </a:p>
@@ -2727,7 +2728,7 @@
           <a:p>
             <a:fld id="{14A7C45A-EC31-C341-BCBA-1394489C9760}" type="datetimeFigureOut">
               <a:rPr lang="en-US" smtClean="0"/>
-              <a:t>13/10/15</a:t>
+              <a:t>21/10/15</a:t>
             </a:fld>
             <a:endParaRPr lang="en-US"/>
           </a:p>
@@ -13280,10 +13281,1551 @@
           <a:chExt cx="0" cy="0"/>
         </a:xfrm>
       </p:grpSpPr>
+      <p:sp>
+        <p:nvSpPr>
+          <p:cNvPr id="28" name="Rounded Rectangle 27"/>
+          <p:cNvSpPr/>
+          <p:nvPr/>
+        </p:nvSpPr>
+        <p:spPr>
+          <a:xfrm>
+            <a:off x="3057123" y="780708"/>
+            <a:ext cx="2162611" cy="2213164"/>
+          </a:xfrm>
+          <a:prstGeom prst="roundRect">
+            <a:avLst>
+              <a:gd name="adj" fmla="val 5149"/>
+            </a:avLst>
+          </a:prstGeom>
+          <a:solidFill>
+            <a:srgbClr val="DCDDDE"/>
+          </a:solidFill>
+          <a:ln w="6350" cap="flat" cmpd="sng" algn="ctr">
+            <a:noFill/>
+            <a:prstDash val="solid"/>
+            <a:round/>
+            <a:headEnd type="none" w="med" len="med"/>
+            <a:tailEnd type="none" w="med" len="med"/>
+          </a:ln>
+          <a:effectLst>
+            <a:outerShdw blurRad="190500" dist="25400" dir="2700000">
+              <a:srgbClr val="000000">
+                <a:alpha val="43000"/>
+              </a:srgbClr>
+            </a:outerShdw>
+          </a:effectLst>
+        </p:spPr>
+        <p:txBody>
+          <a:bodyPr rtlCol="0" anchor="b"/>
+          <a:lstStyle/>
+          <a:p>
+            <a:pPr algn="ctr" fontAlgn="base">
+              <a:spcBef>
+                <a:spcPct val="0"/>
+              </a:spcBef>
+              <a:spcAft>
+                <a:spcPct val="0"/>
+              </a:spcAft>
+            </a:pPr>
+            <a:r>
+              <a:rPr lang="en-US" sz="1400" kern="0" dirty="0" smtClean="0">
+                <a:solidFill>
+                  <a:prstClr val="black">
+                    <a:lumMod val="85000"/>
+                    <a:lumOff val="15000"/>
+                  </a:prstClr>
+                </a:solidFill>
+                <a:latin typeface="Tahoma"/>
+                <a:ea typeface="ＭＳ Ｐゴシック" pitchFamily="46" charset="-128"/>
+              </a:rPr>
+              <a:t>JMS Queues</a:t>
+            </a:r>
+            <a:endParaRPr lang="en-US" sz="1400" kern="0" dirty="0">
+              <a:solidFill>
+                <a:prstClr val="black">
+                  <a:lumMod val="85000"/>
+                  <a:lumOff val="15000"/>
+                </a:prstClr>
+              </a:solidFill>
+              <a:latin typeface="Tahoma"/>
+              <a:ea typeface="ＭＳ Ｐゴシック" pitchFamily="46" charset="-128"/>
+            </a:endParaRPr>
+          </a:p>
+        </p:txBody>
+      </p:sp>
+      <p:grpSp>
+        <p:nvGrpSpPr>
+          <p:cNvPr id="11" name="Group 10"/>
+          <p:cNvGrpSpPr/>
+          <p:nvPr/>
+        </p:nvGrpSpPr>
+        <p:grpSpPr>
+          <a:xfrm>
+            <a:off x="764897" y="1111394"/>
+            <a:ext cx="1620510" cy="1049808"/>
+            <a:chOff x="6842942" y="1914255"/>
+            <a:chExt cx="1620510" cy="1049808"/>
+          </a:xfrm>
+        </p:grpSpPr>
+        <p:sp>
+          <p:nvSpPr>
+            <p:cNvPr id="3" name="Rounded Rectangle 2"/>
+            <p:cNvSpPr/>
+            <p:nvPr/>
+          </p:nvSpPr>
+          <p:spPr>
+            <a:xfrm>
+              <a:off x="6842942" y="1914255"/>
+              <a:ext cx="1620510" cy="1049808"/>
+            </a:xfrm>
+            <a:prstGeom prst="roundRect">
+              <a:avLst/>
+            </a:prstGeom>
+            <a:solidFill>
+              <a:srgbClr val="E68F00"/>
+            </a:solidFill>
+            <a:ln w="6350" cap="flat" cmpd="sng" algn="ctr">
+              <a:noFill/>
+              <a:prstDash val="solid"/>
+              <a:round/>
+              <a:headEnd type="none" w="med" len="med"/>
+              <a:tailEnd type="none" w="med" len="med"/>
+            </a:ln>
+            <a:effectLst>
+              <a:outerShdw blurRad="190500" dist="25400" dir="2700000">
+                <a:srgbClr val="000000">
+                  <a:alpha val="43000"/>
+                </a:srgbClr>
+              </a:outerShdw>
+            </a:effectLst>
+          </p:spPr>
+          <p:txBody>
+            <a:bodyPr rtlCol="0" anchor="b"/>
+            <a:lstStyle/>
+            <a:p>
+              <a:pPr algn="ctr" defTabSz="914400" fontAlgn="auto">
+                <a:spcBef>
+                  <a:spcPts val="0"/>
+                </a:spcBef>
+                <a:spcAft>
+                  <a:spcPts val="0"/>
+                </a:spcAft>
+              </a:pPr>
+              <a:r>
+                <a:rPr lang="en-US" kern="0" dirty="0">
+                  <a:solidFill>
+                    <a:schemeClr val="bg1"/>
+                  </a:solidFill>
+                  <a:latin typeface="Tahoma"/>
+                  <a:ea typeface="+mn-ea"/>
+                </a:rPr>
+                <a:t>NFVO</a:t>
+              </a:r>
+            </a:p>
+          </p:txBody>
+        </p:sp>
+        <p:pic>
+          <p:nvPicPr>
+            <p:cNvPr id="4" name="Picture 3"/>
+            <p:cNvPicPr>
+              <a:picLocks noChangeAspect="1"/>
+            </p:cNvPicPr>
+            <p:nvPr/>
+          </p:nvPicPr>
+          <p:blipFill>
+            <a:blip r:embed="rId2">
+              <a:extLst>
+                <a:ext uri="{28A0092B-C50C-407E-A947-70E740481C1C}">
+                  <a14:useLocalDpi xmlns:a14="http://schemas.microsoft.com/office/drawing/2010/main" val="0"/>
+                </a:ext>
+              </a:extLst>
+            </a:blip>
+            <a:stretch>
+              <a:fillRect/>
+            </a:stretch>
+          </p:blipFill>
+          <p:spPr>
+            <a:xfrm>
+              <a:off x="7083079" y="2161202"/>
+              <a:ext cx="1174462" cy="250992"/>
+            </a:xfrm>
+            <a:prstGeom prst="rect">
+              <a:avLst/>
+            </a:prstGeom>
+          </p:spPr>
+        </p:pic>
+      </p:grpSp>
+      <p:sp>
+        <p:nvSpPr>
+          <p:cNvPr id="9" name="Can 8"/>
+          <p:cNvSpPr/>
+          <p:nvPr/>
+        </p:nvSpPr>
+        <p:spPr>
+          <a:xfrm rot="16200000" flipH="1">
+            <a:off x="3971916" y="633378"/>
+            <a:ext cx="383252" cy="1594223"/>
+          </a:xfrm>
+          <a:prstGeom prst="can">
+            <a:avLst/>
+          </a:prstGeom>
+          <a:solidFill>
+            <a:schemeClr val="bg1"/>
+          </a:solidFill>
+          <a:ln w="6350" cap="flat" cmpd="sng" algn="ctr">
+            <a:solidFill>
+              <a:schemeClr val="tx1">
+                <a:lumMod val="65000"/>
+                <a:lumOff val="35000"/>
+              </a:schemeClr>
+            </a:solidFill>
+            <a:prstDash val="solid"/>
+            <a:round/>
+            <a:headEnd type="none" w="med" len="med"/>
+            <a:tailEnd type="none" w="med" len="med"/>
+          </a:ln>
+          <a:effectLst>
+            <a:outerShdw blurRad="190500" dist="25400" dir="2700000">
+              <a:srgbClr val="000000">
+                <a:alpha val="43000"/>
+              </a:srgbClr>
+            </a:outerShdw>
+          </a:effectLst>
+        </p:spPr>
+        <p:txBody>
+          <a:bodyPr rtlCol="0" anchor="ctr"/>
+          <a:lstStyle/>
+          <a:p>
+            <a:pPr marL="0" marR="0" indent="0" algn="ctr" defTabSz="914400" eaLnBrk="1" fontAlgn="auto" latinLnBrk="0" hangingPunct="1">
+              <a:lnSpc>
+                <a:spcPct val="100000"/>
+              </a:lnSpc>
+              <a:spcBef>
+                <a:spcPts val="0"/>
+              </a:spcBef>
+              <a:spcAft>
+                <a:spcPts val="0"/>
+              </a:spcAft>
+              <a:buClrTx/>
+              <a:buSzTx/>
+              <a:buFontTx/>
+              <a:buNone/>
+              <a:tabLst/>
+            </a:pPr>
+            <a:endParaRPr kumimoji="0" lang="en-US" sz="1800" b="0" i="0" u="none" strike="noStrike" kern="0" cap="none" spc="0" normalizeH="0" baseline="0" noProof="0">
+              <a:ln>
+                <a:noFill/>
+              </a:ln>
+              <a:solidFill>
+                <a:sysClr val="window" lastClr="FFFFFF"/>
+              </a:solidFill>
+              <a:effectLst/>
+              <a:uLnTx/>
+              <a:uFillTx/>
+              <a:latin typeface="Tahoma"/>
+              <a:ea typeface="+mn-ea"/>
+              <a:cs typeface="+mn-cs"/>
+            </a:endParaRPr>
+          </a:p>
+        </p:txBody>
+      </p:sp>
+      <p:cxnSp>
+        <p:nvCxnSpPr>
+          <p:cNvPr id="10" name="Elbow Connector 21"/>
+          <p:cNvCxnSpPr>
+            <a:stCxn id="9" idx="3"/>
+            <a:endCxn id="15" idx="1"/>
+          </p:cNvCxnSpPr>
+          <p:nvPr/>
+        </p:nvCxnSpPr>
+        <p:spPr>
+          <a:xfrm>
+            <a:off x="4960654" y="1430490"/>
+            <a:ext cx="980709" cy="275073"/>
+          </a:xfrm>
+          <a:prstGeom prst="straightConnector1">
+            <a:avLst/>
+          </a:prstGeom>
+          <a:ln w="57150">
+            <a:solidFill>
+              <a:srgbClr val="E68F00"/>
+            </a:solidFill>
+            <a:headEnd type="none" w="med" len="med"/>
+            <a:tailEnd type="triangle" w="med" len="med"/>
+          </a:ln>
+        </p:spPr>
+        <p:style>
+          <a:lnRef idx="2">
+            <a:schemeClr val="accent4"/>
+          </a:lnRef>
+          <a:fillRef idx="1">
+            <a:schemeClr val="lt1"/>
+          </a:fillRef>
+          <a:effectRef idx="0">
+            <a:schemeClr val="accent4"/>
+          </a:effectRef>
+          <a:fontRef idx="minor">
+            <a:schemeClr val="dk1"/>
+          </a:fontRef>
+        </p:style>
+      </p:cxnSp>
+      <p:sp>
+        <p:nvSpPr>
+          <p:cNvPr id="15" name="Rounded Rectangle 14"/>
+          <p:cNvSpPr/>
+          <p:nvPr/>
+        </p:nvSpPr>
+        <p:spPr>
+          <a:xfrm>
+            <a:off x="5941363" y="1357984"/>
+            <a:ext cx="1935747" cy="695158"/>
+          </a:xfrm>
+          <a:prstGeom prst="roundRect">
+            <a:avLst/>
+          </a:prstGeom>
+          <a:solidFill>
+            <a:srgbClr val="E68F00"/>
+          </a:solidFill>
+          <a:ln w="6350" cap="flat" cmpd="sng" algn="ctr">
+            <a:noFill/>
+            <a:prstDash val="solid"/>
+            <a:round/>
+            <a:headEnd type="none" w="med" len="med"/>
+            <a:tailEnd type="none" w="med" len="med"/>
+          </a:ln>
+          <a:effectLst>
+            <a:outerShdw blurRad="190500" dist="25400" dir="2700000">
+              <a:srgbClr val="000000">
+                <a:alpha val="43000"/>
+              </a:srgbClr>
+            </a:outerShdw>
+          </a:effectLst>
+        </p:spPr>
+        <p:txBody>
+          <a:bodyPr rtlCol="0" anchor="b"/>
+          <a:lstStyle/>
+          <a:p>
+            <a:pPr algn="ctr"/>
+            <a:r>
+              <a:rPr lang="en-US" kern="0" dirty="0" smtClean="0">
+                <a:solidFill>
+                  <a:schemeClr val="bg1"/>
+                </a:solidFill>
+                <a:latin typeface="Tahoma"/>
+              </a:rPr>
+              <a:t>Generic VNFM</a:t>
+            </a:r>
+            <a:endParaRPr lang="en-US" kern="0" dirty="0">
+              <a:solidFill>
+                <a:schemeClr val="bg1"/>
+              </a:solidFill>
+              <a:latin typeface="Tahoma"/>
+            </a:endParaRPr>
+          </a:p>
+        </p:txBody>
+      </p:sp>
+      <p:sp>
+        <p:nvSpPr>
+          <p:cNvPr id="16" name="Can 15"/>
+          <p:cNvSpPr/>
+          <p:nvPr/>
+        </p:nvSpPr>
+        <p:spPr>
+          <a:xfrm rot="5400000">
+            <a:off x="3971915" y="1281805"/>
+            <a:ext cx="383252" cy="1594223"/>
+          </a:xfrm>
+          <a:prstGeom prst="can">
+            <a:avLst/>
+          </a:prstGeom>
+          <a:solidFill>
+            <a:schemeClr val="bg1"/>
+          </a:solidFill>
+          <a:ln w="6350" cap="flat" cmpd="sng" algn="ctr">
+            <a:solidFill>
+              <a:schemeClr val="tx1">
+                <a:lumMod val="65000"/>
+                <a:lumOff val="35000"/>
+              </a:schemeClr>
+            </a:solidFill>
+            <a:prstDash val="solid"/>
+            <a:round/>
+            <a:headEnd type="none" w="med" len="med"/>
+            <a:tailEnd type="none" w="med" len="med"/>
+          </a:ln>
+          <a:effectLst>
+            <a:outerShdw blurRad="190500" dist="25400" dir="2700000">
+              <a:srgbClr val="000000">
+                <a:alpha val="43000"/>
+              </a:srgbClr>
+            </a:outerShdw>
+          </a:effectLst>
+        </p:spPr>
+        <p:txBody>
+          <a:bodyPr rtlCol="0" anchor="ctr"/>
+          <a:lstStyle/>
+          <a:p>
+            <a:pPr marL="0" marR="0" indent="0" algn="ctr" defTabSz="914400" eaLnBrk="1" fontAlgn="auto" latinLnBrk="0" hangingPunct="1">
+              <a:lnSpc>
+                <a:spcPct val="100000"/>
+              </a:lnSpc>
+              <a:spcBef>
+                <a:spcPts val="0"/>
+              </a:spcBef>
+              <a:spcAft>
+                <a:spcPts val="0"/>
+              </a:spcAft>
+              <a:buClrTx/>
+              <a:buSzTx/>
+              <a:buFontTx/>
+              <a:buNone/>
+              <a:tabLst/>
+            </a:pPr>
+            <a:endParaRPr kumimoji="0" lang="en-US" sz="1800" b="0" i="0" u="none" strike="noStrike" kern="0" cap="none" spc="0" normalizeH="0" baseline="0" noProof="0">
+              <a:ln>
+                <a:noFill/>
+              </a:ln>
+              <a:solidFill>
+                <a:sysClr val="window" lastClr="FFFFFF"/>
+              </a:solidFill>
+              <a:effectLst/>
+              <a:uLnTx/>
+              <a:uFillTx/>
+              <a:latin typeface="Tahoma"/>
+              <a:ea typeface="+mn-ea"/>
+              <a:cs typeface="+mn-cs"/>
+            </a:endParaRPr>
+          </a:p>
+        </p:txBody>
+      </p:sp>
+      <p:cxnSp>
+        <p:nvCxnSpPr>
+          <p:cNvPr id="19" name="Elbow Connector 21"/>
+          <p:cNvCxnSpPr>
+            <a:stCxn id="3" idx="3"/>
+          </p:cNvCxnSpPr>
+          <p:nvPr/>
+        </p:nvCxnSpPr>
+        <p:spPr>
+          <a:xfrm flipV="1">
+            <a:off x="2385407" y="1430490"/>
+            <a:ext cx="981022" cy="205808"/>
+          </a:xfrm>
+          <a:prstGeom prst="straightConnector1">
+            <a:avLst/>
+          </a:prstGeom>
+          <a:ln w="57150">
+            <a:solidFill>
+              <a:srgbClr val="E68F00"/>
+            </a:solidFill>
+            <a:headEnd type="none" w="med" len="med"/>
+            <a:tailEnd type="triangle" w="med" len="med"/>
+          </a:ln>
+        </p:spPr>
+        <p:style>
+          <a:lnRef idx="2">
+            <a:schemeClr val="accent4"/>
+          </a:lnRef>
+          <a:fillRef idx="1">
+            <a:schemeClr val="lt1"/>
+          </a:fillRef>
+          <a:effectRef idx="0">
+            <a:schemeClr val="accent4"/>
+          </a:effectRef>
+          <a:fontRef idx="minor">
+            <a:schemeClr val="dk1"/>
+          </a:fontRef>
+        </p:style>
+      </p:cxnSp>
+      <p:cxnSp>
+        <p:nvCxnSpPr>
+          <p:cNvPr id="22" name="Elbow Connector 21"/>
+          <p:cNvCxnSpPr>
+            <a:stCxn id="16" idx="3"/>
+            <a:endCxn id="3" idx="3"/>
+          </p:cNvCxnSpPr>
+          <p:nvPr/>
+        </p:nvCxnSpPr>
+        <p:spPr>
+          <a:xfrm flipH="1" flipV="1">
+            <a:off x="2385407" y="1636298"/>
+            <a:ext cx="981023" cy="442619"/>
+          </a:xfrm>
+          <a:prstGeom prst="straightConnector1">
+            <a:avLst/>
+          </a:prstGeom>
+          <a:ln w="57150">
+            <a:solidFill>
+              <a:srgbClr val="E68F00"/>
+            </a:solidFill>
+            <a:headEnd type="none" w="med" len="med"/>
+            <a:tailEnd type="triangle" w="med" len="med"/>
+          </a:ln>
+        </p:spPr>
+        <p:style>
+          <a:lnRef idx="2">
+            <a:schemeClr val="accent4"/>
+          </a:lnRef>
+          <a:fillRef idx="1">
+            <a:schemeClr val="lt1"/>
+          </a:fillRef>
+          <a:effectRef idx="0">
+            <a:schemeClr val="accent4"/>
+          </a:effectRef>
+          <a:fontRef idx="minor">
+            <a:schemeClr val="dk1"/>
+          </a:fontRef>
+        </p:style>
+      </p:cxnSp>
+      <p:cxnSp>
+        <p:nvCxnSpPr>
+          <p:cNvPr id="25" name="Elbow Connector 21"/>
+          <p:cNvCxnSpPr>
+            <a:stCxn id="15" idx="1"/>
+            <a:endCxn id="16" idx="1"/>
+          </p:cNvCxnSpPr>
+          <p:nvPr/>
+        </p:nvCxnSpPr>
+        <p:spPr>
+          <a:xfrm flipH="1">
+            <a:off x="4960653" y="1705563"/>
+            <a:ext cx="980710" cy="373354"/>
+          </a:xfrm>
+          <a:prstGeom prst="straightConnector1">
+            <a:avLst/>
+          </a:prstGeom>
+          <a:ln w="57150">
+            <a:solidFill>
+              <a:srgbClr val="E68F00"/>
+            </a:solidFill>
+            <a:headEnd type="none" w="med" len="med"/>
+            <a:tailEnd type="triangle" w="med" len="med"/>
+          </a:ln>
+        </p:spPr>
+        <p:style>
+          <a:lnRef idx="2">
+            <a:schemeClr val="accent4"/>
+          </a:lnRef>
+          <a:fillRef idx="1">
+            <a:schemeClr val="lt1"/>
+          </a:fillRef>
+          <a:effectRef idx="0">
+            <a:schemeClr val="accent4"/>
+          </a:effectRef>
+          <a:fontRef idx="minor">
+            <a:schemeClr val="dk1"/>
+          </a:fontRef>
+        </p:style>
+      </p:cxnSp>
     </p:spTree>
     <p:extLst>
       <p:ext uri="{BB962C8B-B14F-4D97-AF65-F5344CB8AC3E}">
         <p14:creationId xmlns:p14="http://schemas.microsoft.com/office/powerpoint/2010/main" val="1389600416"/>
+      </p:ext>
+    </p:extLst>
+  </p:cSld>
+  <p:clrMapOvr>
+    <a:masterClrMapping/>
+  </p:clrMapOvr>
+</p:sld>
+</file>
+
+<file path=ppt/slides/slide9.xml><?xml version="1.0" encoding="utf-8"?>
+<p:sld xmlns:a="http://schemas.openxmlformats.org/drawingml/2006/main" xmlns:r="http://schemas.openxmlformats.org/officeDocument/2006/relationships" xmlns:p="http://schemas.openxmlformats.org/presentationml/2006/main">
+  <p:cSld>
+    <p:spTree>
+      <p:nvGrpSpPr>
+        <p:cNvPr id="1" name=""/>
+        <p:cNvGrpSpPr/>
+        <p:nvPr/>
+      </p:nvGrpSpPr>
+      <p:grpSpPr>
+        <a:xfrm>
+          <a:off x="0" y="0"/>
+          <a:ext cx="0" cy="0"/>
+          <a:chOff x="0" y="0"/>
+          <a:chExt cx="0" cy="0"/>
+        </a:xfrm>
+      </p:grpSpPr>
+      <p:sp>
+        <p:nvSpPr>
+          <p:cNvPr id="28" name="Rounded Rectangle 27"/>
+          <p:cNvSpPr/>
+          <p:nvPr/>
+        </p:nvSpPr>
+        <p:spPr>
+          <a:xfrm>
+            <a:off x="3879347" y="1398968"/>
+            <a:ext cx="2162611" cy="4072078"/>
+          </a:xfrm>
+          <a:prstGeom prst="roundRect">
+            <a:avLst>
+              <a:gd name="adj" fmla="val 5149"/>
+            </a:avLst>
+          </a:prstGeom>
+          <a:solidFill>
+            <a:srgbClr val="DCDDDE"/>
+          </a:solidFill>
+          <a:ln w="6350" cap="flat" cmpd="sng" algn="ctr">
+            <a:noFill/>
+            <a:prstDash val="solid"/>
+            <a:round/>
+            <a:headEnd type="none" w="med" len="med"/>
+            <a:tailEnd type="none" w="med" len="med"/>
+          </a:ln>
+          <a:effectLst>
+            <a:outerShdw blurRad="190500" dist="25400" dir="2700000">
+              <a:srgbClr val="000000">
+                <a:alpha val="43000"/>
+              </a:srgbClr>
+            </a:outerShdw>
+          </a:effectLst>
+        </p:spPr>
+        <p:txBody>
+          <a:bodyPr rtlCol="0" anchor="b"/>
+          <a:lstStyle/>
+          <a:p>
+            <a:pPr algn="ctr" fontAlgn="base">
+              <a:spcBef>
+                <a:spcPct val="0"/>
+              </a:spcBef>
+              <a:spcAft>
+                <a:spcPct val="0"/>
+              </a:spcAft>
+            </a:pPr>
+            <a:r>
+              <a:rPr lang="en-US" sz="1400" kern="0" dirty="0" smtClean="0">
+                <a:solidFill>
+                  <a:prstClr val="black">
+                    <a:lumMod val="85000"/>
+                    <a:lumOff val="15000"/>
+                  </a:prstClr>
+                </a:solidFill>
+                <a:latin typeface="Tahoma"/>
+                <a:ea typeface="ＭＳ Ｐゴシック" pitchFamily="46" charset="-128"/>
+              </a:rPr>
+              <a:t>JMS Queues</a:t>
+            </a:r>
+            <a:endParaRPr lang="en-US" sz="1400" kern="0" dirty="0">
+              <a:solidFill>
+                <a:prstClr val="black">
+                  <a:lumMod val="85000"/>
+                  <a:lumOff val="15000"/>
+                </a:prstClr>
+              </a:solidFill>
+              <a:latin typeface="Tahoma"/>
+              <a:ea typeface="ＭＳ Ｐゴシック" pitchFamily="46" charset="-128"/>
+            </a:endParaRPr>
+          </a:p>
+        </p:txBody>
+      </p:sp>
+      <p:sp>
+        <p:nvSpPr>
+          <p:cNvPr id="15" name="Rounded Rectangle 14"/>
+          <p:cNvSpPr/>
+          <p:nvPr/>
+        </p:nvSpPr>
+        <p:spPr>
+          <a:xfrm>
+            <a:off x="6863811" y="2812687"/>
+            <a:ext cx="1935747" cy="695158"/>
+          </a:xfrm>
+          <a:prstGeom prst="roundRect">
+            <a:avLst/>
+          </a:prstGeom>
+          <a:solidFill>
+            <a:srgbClr val="E68F00"/>
+          </a:solidFill>
+          <a:ln w="6350" cap="flat" cmpd="sng" algn="ctr">
+            <a:noFill/>
+            <a:prstDash val="solid"/>
+            <a:round/>
+            <a:headEnd type="none" w="med" len="med"/>
+            <a:tailEnd type="none" w="med" len="med"/>
+          </a:ln>
+          <a:effectLst>
+            <a:outerShdw blurRad="190500" dist="25400" dir="2700000">
+              <a:srgbClr val="000000">
+                <a:alpha val="43000"/>
+              </a:srgbClr>
+            </a:outerShdw>
+          </a:effectLst>
+        </p:spPr>
+        <p:txBody>
+          <a:bodyPr rtlCol="0" anchor="b"/>
+          <a:lstStyle/>
+          <a:p>
+            <a:pPr algn="ctr"/>
+            <a:r>
+              <a:rPr lang="en-US" kern="0" dirty="0" smtClean="0">
+                <a:solidFill>
+                  <a:schemeClr val="bg1"/>
+                </a:solidFill>
+                <a:latin typeface="Tahoma"/>
+              </a:rPr>
+              <a:t>Generic VNFM</a:t>
+            </a:r>
+            <a:endParaRPr lang="en-US" kern="0" dirty="0">
+              <a:solidFill>
+                <a:schemeClr val="bg1"/>
+              </a:solidFill>
+              <a:latin typeface="Tahoma"/>
+            </a:endParaRPr>
+          </a:p>
+        </p:txBody>
+      </p:sp>
+      <p:sp>
+        <p:nvSpPr>
+          <p:cNvPr id="16" name="Can 15"/>
+          <p:cNvSpPr/>
+          <p:nvPr/>
+        </p:nvSpPr>
+        <p:spPr>
+          <a:xfrm rot="5400000">
+            <a:off x="4674973" y="1316614"/>
+            <a:ext cx="383252" cy="1594223"/>
+          </a:xfrm>
+          <a:prstGeom prst="can">
+            <a:avLst/>
+          </a:prstGeom>
+          <a:solidFill>
+            <a:schemeClr val="bg1"/>
+          </a:solidFill>
+          <a:ln w="6350" cap="flat" cmpd="sng" algn="ctr">
+            <a:solidFill>
+              <a:schemeClr val="tx1">
+                <a:lumMod val="65000"/>
+                <a:lumOff val="35000"/>
+              </a:schemeClr>
+            </a:solidFill>
+            <a:prstDash val="solid"/>
+            <a:round/>
+            <a:headEnd type="none" w="med" len="med"/>
+            <a:tailEnd type="none" w="med" len="med"/>
+          </a:ln>
+          <a:effectLst>
+            <a:outerShdw blurRad="190500" dist="25400" dir="2700000">
+              <a:srgbClr val="000000">
+                <a:alpha val="43000"/>
+              </a:srgbClr>
+            </a:outerShdw>
+          </a:effectLst>
+        </p:spPr>
+        <p:txBody>
+          <a:bodyPr vert="vert270" rtlCol="0" anchor="ctr"/>
+          <a:lstStyle/>
+          <a:p>
+            <a:pPr marL="0" marR="0" indent="0" algn="ctr" defTabSz="914400" eaLnBrk="1" fontAlgn="auto" latinLnBrk="0" hangingPunct="1">
+              <a:lnSpc>
+                <a:spcPct val="100000"/>
+              </a:lnSpc>
+              <a:spcBef>
+                <a:spcPts val="0"/>
+              </a:spcBef>
+              <a:spcAft>
+                <a:spcPts val="0"/>
+              </a:spcAft>
+              <a:buClrTx/>
+              <a:buSzTx/>
+              <a:buFontTx/>
+              <a:buNone/>
+              <a:tabLst/>
+            </a:pPr>
+            <a:r>
+              <a:rPr kumimoji="0" lang="en-US" sz="1800" b="0" i="0" u="none" strike="noStrike" kern="0" cap="none" spc="0" normalizeH="0" baseline="0" noProof="0" dirty="0" smtClean="0">
+                <a:ln>
+                  <a:noFill/>
+                </a:ln>
+                <a:solidFill>
+                  <a:srgbClr val="000000"/>
+                </a:solidFill>
+                <a:effectLst/>
+                <a:uLnTx/>
+                <a:uFillTx/>
+                <a:latin typeface="Tahoma"/>
+                <a:ea typeface="+mn-ea"/>
+                <a:cs typeface="+mn-cs"/>
+              </a:rPr>
+              <a:t>vm-id1</a:t>
+            </a:r>
+            <a:endParaRPr kumimoji="0" lang="en-US" sz="1800" b="0" i="0" u="none" strike="noStrike" kern="0" cap="none" spc="0" normalizeH="0" baseline="0" noProof="0" dirty="0">
+              <a:ln>
+                <a:noFill/>
+              </a:ln>
+              <a:solidFill>
+                <a:srgbClr val="000000"/>
+              </a:solidFill>
+              <a:effectLst/>
+              <a:uLnTx/>
+              <a:uFillTx/>
+              <a:latin typeface="Tahoma"/>
+              <a:ea typeface="+mn-ea"/>
+              <a:cs typeface="+mn-cs"/>
+            </a:endParaRPr>
+          </a:p>
+        </p:txBody>
+      </p:sp>
+      <p:cxnSp>
+        <p:nvCxnSpPr>
+          <p:cNvPr id="25" name="Elbow Connector 21"/>
+          <p:cNvCxnSpPr>
+            <a:stCxn id="15" idx="1"/>
+            <a:endCxn id="16" idx="1"/>
+          </p:cNvCxnSpPr>
+          <p:nvPr/>
+        </p:nvCxnSpPr>
+        <p:spPr>
+          <a:xfrm flipH="1" flipV="1">
+            <a:off x="5663711" y="2113726"/>
+            <a:ext cx="1200100" cy="1046540"/>
+          </a:xfrm>
+          <a:prstGeom prst="straightConnector1">
+            <a:avLst/>
+          </a:prstGeom>
+          <a:ln w="57150">
+            <a:solidFill>
+              <a:srgbClr val="E68F00"/>
+            </a:solidFill>
+            <a:headEnd type="triangle" w="med" len="med"/>
+            <a:tailEnd type="triangle" w="med" len="med"/>
+          </a:ln>
+        </p:spPr>
+        <p:style>
+          <a:lnRef idx="2">
+            <a:schemeClr val="accent4"/>
+          </a:lnRef>
+          <a:fillRef idx="1">
+            <a:schemeClr val="lt1"/>
+          </a:fillRef>
+          <a:effectRef idx="0">
+            <a:schemeClr val="accent4"/>
+          </a:effectRef>
+          <a:fontRef idx="minor">
+            <a:schemeClr val="dk1"/>
+          </a:fontRef>
+        </p:style>
+      </p:cxnSp>
+      <p:sp>
+        <p:nvSpPr>
+          <p:cNvPr id="14" name="Rounded Rectangle 13"/>
+          <p:cNvSpPr/>
+          <p:nvPr/>
+        </p:nvSpPr>
+        <p:spPr>
+          <a:xfrm>
+            <a:off x="238132" y="800497"/>
+            <a:ext cx="2970985" cy="5119100"/>
+          </a:xfrm>
+          <a:prstGeom prst="roundRect">
+            <a:avLst>
+              <a:gd name="adj" fmla="val 5758"/>
+            </a:avLst>
+          </a:prstGeom>
+          <a:solidFill>
+            <a:srgbClr val="009473">
+              <a:alpha val="35000"/>
+            </a:srgbClr>
+          </a:solidFill>
+          <a:ln w="6350" cap="flat" cmpd="sng" algn="ctr">
+            <a:noFill/>
+            <a:prstDash val="solid"/>
+            <a:round/>
+            <a:headEnd type="none" w="med" len="med"/>
+            <a:tailEnd type="none" w="med" len="med"/>
+          </a:ln>
+          <a:effectLst>
+            <a:outerShdw blurRad="190500" dist="25400" dir="2700000">
+              <a:srgbClr val="000000">
+                <a:alpha val="43000"/>
+              </a:srgbClr>
+            </a:outerShdw>
+          </a:effectLst>
+        </p:spPr>
+        <p:txBody>
+          <a:bodyPr rtlCol="0" anchor="b"/>
+          <a:lstStyle/>
+          <a:p>
+            <a:pPr algn="ctr" defTabSz="914400" fontAlgn="auto">
+              <a:spcBef>
+                <a:spcPts val="0"/>
+              </a:spcBef>
+              <a:spcAft>
+                <a:spcPts val="0"/>
+              </a:spcAft>
+            </a:pPr>
+            <a:r>
+              <a:rPr lang="en-US" kern="0" dirty="0" smtClean="0">
+                <a:solidFill>
+                  <a:schemeClr val="bg1"/>
+                </a:solidFill>
+                <a:latin typeface="Tahoma"/>
+                <a:ea typeface="+mn-ea"/>
+              </a:rPr>
+              <a:t>VNFR</a:t>
+            </a:r>
+            <a:endParaRPr lang="en-US" kern="0" dirty="0">
+              <a:solidFill>
+                <a:schemeClr val="bg1"/>
+              </a:solidFill>
+              <a:latin typeface="Tahoma"/>
+              <a:ea typeface="+mn-ea"/>
+            </a:endParaRPr>
+          </a:p>
+        </p:txBody>
+      </p:sp>
+      <p:grpSp>
+        <p:nvGrpSpPr>
+          <p:cNvPr id="39" name="Group 38"/>
+          <p:cNvGrpSpPr/>
+          <p:nvPr/>
+        </p:nvGrpSpPr>
+        <p:grpSpPr>
+          <a:xfrm>
+            <a:off x="689750" y="1166784"/>
+            <a:ext cx="1952385" cy="1749370"/>
+            <a:chOff x="735109" y="1006304"/>
+            <a:chExt cx="1952385" cy="1749370"/>
+          </a:xfrm>
+        </p:grpSpPr>
+        <p:sp>
+          <p:nvSpPr>
+            <p:cNvPr id="37" name="Rounded Rectangle 36"/>
+            <p:cNvSpPr/>
+            <p:nvPr/>
+          </p:nvSpPr>
+          <p:spPr>
+            <a:xfrm>
+              <a:off x="735109" y="1006304"/>
+              <a:ext cx="1952385" cy="1749370"/>
+            </a:xfrm>
+            <a:prstGeom prst="roundRect">
+              <a:avLst>
+                <a:gd name="adj" fmla="val 9537"/>
+              </a:avLst>
+            </a:prstGeom>
+            <a:solidFill>
+              <a:srgbClr val="009473"/>
+            </a:solidFill>
+            <a:ln w="6350" cap="flat" cmpd="sng" algn="ctr">
+              <a:noFill/>
+              <a:prstDash val="solid"/>
+              <a:round/>
+              <a:headEnd type="none" w="med" len="med"/>
+              <a:tailEnd type="none" w="med" len="med"/>
+            </a:ln>
+            <a:effectLst>
+              <a:outerShdw blurRad="190500" dist="25400" dir="2700000">
+                <a:srgbClr val="000000">
+                  <a:alpha val="43000"/>
+                </a:srgbClr>
+              </a:outerShdw>
+            </a:effectLst>
+          </p:spPr>
+          <p:txBody>
+            <a:bodyPr rtlCol="0" anchor="b"/>
+            <a:lstStyle/>
+            <a:p>
+              <a:pPr algn="ctr" defTabSz="914400" fontAlgn="auto">
+                <a:spcBef>
+                  <a:spcPts val="0"/>
+                </a:spcBef>
+                <a:spcAft>
+                  <a:spcPts val="0"/>
+                </a:spcAft>
+              </a:pPr>
+              <a:r>
+                <a:rPr lang="en-US" sz="1600" kern="0" dirty="0" smtClean="0">
+                  <a:solidFill>
+                    <a:schemeClr val="bg1"/>
+                  </a:solidFill>
+                  <a:latin typeface="Tahoma"/>
+                </a:rPr>
+                <a:t>VNFC-1</a:t>
+              </a:r>
+            </a:p>
+            <a:p>
+              <a:pPr algn="ctr" defTabSz="914400" fontAlgn="auto">
+                <a:spcBef>
+                  <a:spcPts val="0"/>
+                </a:spcBef>
+                <a:spcAft>
+                  <a:spcPts val="0"/>
+                </a:spcAft>
+              </a:pPr>
+              <a:endParaRPr lang="en-US" sz="1600" kern="0" dirty="0">
+                <a:solidFill>
+                  <a:schemeClr val="bg1"/>
+                </a:solidFill>
+                <a:latin typeface="Tahoma"/>
+              </a:endParaRPr>
+            </a:p>
+            <a:p>
+              <a:pPr algn="ctr" defTabSz="914400" fontAlgn="auto">
+                <a:spcBef>
+                  <a:spcPts val="0"/>
+                </a:spcBef>
+                <a:spcAft>
+                  <a:spcPts val="0"/>
+                </a:spcAft>
+              </a:pPr>
+              <a:endParaRPr lang="en-US" sz="1600" kern="0" dirty="0" smtClean="0">
+                <a:solidFill>
+                  <a:schemeClr val="bg1"/>
+                </a:solidFill>
+                <a:latin typeface="Tahoma"/>
+              </a:endParaRPr>
+            </a:p>
+            <a:p>
+              <a:pPr algn="ctr" defTabSz="914400" fontAlgn="auto">
+                <a:spcBef>
+                  <a:spcPts val="0"/>
+                </a:spcBef>
+                <a:spcAft>
+                  <a:spcPts val="0"/>
+                </a:spcAft>
+              </a:pPr>
+              <a:endParaRPr lang="en-US" sz="1600" kern="0" dirty="0">
+                <a:solidFill>
+                  <a:schemeClr val="bg1"/>
+                </a:solidFill>
+                <a:latin typeface="Tahoma"/>
+              </a:endParaRPr>
+            </a:p>
+            <a:p>
+              <a:pPr algn="ctr" defTabSz="914400" fontAlgn="auto">
+                <a:spcBef>
+                  <a:spcPts val="0"/>
+                </a:spcBef>
+                <a:spcAft>
+                  <a:spcPts val="0"/>
+                </a:spcAft>
+              </a:pPr>
+              <a:endParaRPr lang="en-US" sz="1600" kern="0" dirty="0" smtClean="0">
+                <a:solidFill>
+                  <a:schemeClr val="bg1"/>
+                </a:solidFill>
+                <a:latin typeface="Tahoma"/>
+              </a:endParaRPr>
+            </a:p>
+            <a:p>
+              <a:pPr algn="ctr" defTabSz="914400" fontAlgn="auto">
+                <a:spcBef>
+                  <a:spcPts val="0"/>
+                </a:spcBef>
+                <a:spcAft>
+                  <a:spcPts val="0"/>
+                </a:spcAft>
+              </a:pPr>
+              <a:r>
+                <a:rPr lang="en-US" sz="1600" kern="0" dirty="0" smtClean="0">
+                  <a:solidFill>
+                    <a:schemeClr val="bg1"/>
+                  </a:solidFill>
+                  <a:latin typeface="Tahoma"/>
+                </a:rPr>
+                <a:t>VM-id1</a:t>
+              </a:r>
+              <a:endParaRPr lang="en-US" sz="1600" kern="0" dirty="0">
+                <a:solidFill>
+                  <a:schemeClr val="bg1"/>
+                </a:solidFill>
+                <a:latin typeface="Tahoma"/>
+              </a:endParaRPr>
+            </a:p>
+          </p:txBody>
+        </p:sp>
+        <p:sp>
+          <p:nvSpPr>
+            <p:cNvPr id="38" name="Rounded Rectangle 37"/>
+            <p:cNvSpPr/>
+            <p:nvPr/>
+          </p:nvSpPr>
+          <p:spPr>
+            <a:xfrm>
+              <a:off x="735109" y="1600070"/>
+              <a:ext cx="1952385" cy="695158"/>
+            </a:xfrm>
+            <a:prstGeom prst="roundRect">
+              <a:avLst>
+                <a:gd name="adj" fmla="val 0"/>
+              </a:avLst>
+            </a:prstGeom>
+            <a:solidFill>
+              <a:srgbClr val="E68F00"/>
+            </a:solidFill>
+            <a:ln w="6350" cap="flat" cmpd="sng" algn="ctr">
+              <a:noFill/>
+              <a:prstDash val="solid"/>
+              <a:round/>
+              <a:headEnd type="none" w="med" len="med"/>
+              <a:tailEnd type="none" w="med" len="med"/>
+            </a:ln>
+            <a:effectLst>
+              <a:outerShdw blurRad="190500" dist="25400" dir="2700000">
+                <a:srgbClr val="000000">
+                  <a:alpha val="43000"/>
+                </a:srgbClr>
+              </a:outerShdw>
+            </a:effectLst>
+          </p:spPr>
+          <p:txBody>
+            <a:bodyPr rtlCol="0" anchor="ctr"/>
+            <a:lstStyle/>
+            <a:p>
+              <a:pPr algn="ctr"/>
+              <a:r>
+                <a:rPr lang="en-US" kern="0" dirty="0" smtClean="0">
+                  <a:solidFill>
+                    <a:schemeClr val="bg1"/>
+                  </a:solidFill>
+                  <a:latin typeface="Tahoma"/>
+                </a:rPr>
+                <a:t>EMS</a:t>
+              </a:r>
+              <a:endParaRPr lang="en-US" kern="0" dirty="0">
+                <a:solidFill>
+                  <a:schemeClr val="bg1"/>
+                </a:solidFill>
+                <a:latin typeface="Tahoma"/>
+              </a:endParaRPr>
+            </a:p>
+          </p:txBody>
+        </p:sp>
+      </p:grpSp>
+      <p:grpSp>
+        <p:nvGrpSpPr>
+          <p:cNvPr id="40" name="Group 39"/>
+          <p:cNvGrpSpPr/>
+          <p:nvPr/>
+        </p:nvGrpSpPr>
+        <p:grpSpPr>
+          <a:xfrm>
+            <a:off x="689750" y="3428465"/>
+            <a:ext cx="1952385" cy="1749370"/>
+            <a:chOff x="735109" y="1006304"/>
+            <a:chExt cx="1952385" cy="1749370"/>
+          </a:xfrm>
+        </p:grpSpPr>
+        <p:sp>
+          <p:nvSpPr>
+            <p:cNvPr id="41" name="Rounded Rectangle 40"/>
+            <p:cNvSpPr/>
+            <p:nvPr/>
+          </p:nvSpPr>
+          <p:spPr>
+            <a:xfrm>
+              <a:off x="735109" y="1006304"/>
+              <a:ext cx="1952385" cy="1749370"/>
+            </a:xfrm>
+            <a:prstGeom prst="roundRect">
+              <a:avLst>
+                <a:gd name="adj" fmla="val 9537"/>
+              </a:avLst>
+            </a:prstGeom>
+            <a:solidFill>
+              <a:srgbClr val="009473"/>
+            </a:solidFill>
+            <a:ln w="6350" cap="flat" cmpd="sng" algn="ctr">
+              <a:noFill/>
+              <a:prstDash val="solid"/>
+              <a:round/>
+              <a:headEnd type="none" w="med" len="med"/>
+              <a:tailEnd type="none" w="med" len="med"/>
+            </a:ln>
+            <a:effectLst>
+              <a:outerShdw blurRad="190500" dist="25400" dir="2700000">
+                <a:srgbClr val="000000">
+                  <a:alpha val="43000"/>
+                </a:srgbClr>
+              </a:outerShdw>
+            </a:effectLst>
+          </p:spPr>
+          <p:txBody>
+            <a:bodyPr rtlCol="0" anchor="b"/>
+            <a:lstStyle/>
+            <a:p>
+              <a:pPr algn="ctr" defTabSz="914400" fontAlgn="auto">
+                <a:spcBef>
+                  <a:spcPts val="0"/>
+                </a:spcBef>
+                <a:spcAft>
+                  <a:spcPts val="0"/>
+                </a:spcAft>
+              </a:pPr>
+              <a:r>
+                <a:rPr lang="en-US" sz="1600" kern="0" dirty="0" smtClean="0">
+                  <a:solidFill>
+                    <a:schemeClr val="bg1"/>
+                  </a:solidFill>
+                  <a:latin typeface="Tahoma"/>
+                </a:rPr>
+                <a:t>VNFC-2</a:t>
+              </a:r>
+            </a:p>
+            <a:p>
+              <a:pPr algn="ctr" defTabSz="914400" fontAlgn="auto">
+                <a:spcBef>
+                  <a:spcPts val="0"/>
+                </a:spcBef>
+                <a:spcAft>
+                  <a:spcPts val="0"/>
+                </a:spcAft>
+              </a:pPr>
+              <a:endParaRPr lang="en-US" sz="1600" kern="0" dirty="0">
+                <a:solidFill>
+                  <a:schemeClr val="bg1"/>
+                </a:solidFill>
+                <a:latin typeface="Tahoma"/>
+              </a:endParaRPr>
+            </a:p>
+            <a:p>
+              <a:pPr algn="ctr" defTabSz="914400" fontAlgn="auto">
+                <a:spcBef>
+                  <a:spcPts val="0"/>
+                </a:spcBef>
+                <a:spcAft>
+                  <a:spcPts val="0"/>
+                </a:spcAft>
+              </a:pPr>
+              <a:endParaRPr lang="en-US" sz="1600" kern="0" dirty="0" smtClean="0">
+                <a:solidFill>
+                  <a:schemeClr val="bg1"/>
+                </a:solidFill>
+                <a:latin typeface="Tahoma"/>
+              </a:endParaRPr>
+            </a:p>
+            <a:p>
+              <a:pPr algn="ctr" defTabSz="914400" fontAlgn="auto">
+                <a:spcBef>
+                  <a:spcPts val="0"/>
+                </a:spcBef>
+                <a:spcAft>
+                  <a:spcPts val="0"/>
+                </a:spcAft>
+              </a:pPr>
+              <a:endParaRPr lang="en-US" sz="1600" kern="0" dirty="0">
+                <a:solidFill>
+                  <a:schemeClr val="bg1"/>
+                </a:solidFill>
+                <a:latin typeface="Tahoma"/>
+              </a:endParaRPr>
+            </a:p>
+            <a:p>
+              <a:pPr algn="ctr" defTabSz="914400" fontAlgn="auto">
+                <a:spcBef>
+                  <a:spcPts val="0"/>
+                </a:spcBef>
+                <a:spcAft>
+                  <a:spcPts val="0"/>
+                </a:spcAft>
+              </a:pPr>
+              <a:endParaRPr lang="en-US" sz="1600" kern="0" dirty="0" smtClean="0">
+                <a:solidFill>
+                  <a:schemeClr val="bg1"/>
+                </a:solidFill>
+                <a:latin typeface="Tahoma"/>
+              </a:endParaRPr>
+            </a:p>
+            <a:p>
+              <a:pPr algn="ctr" defTabSz="914400" fontAlgn="auto">
+                <a:spcBef>
+                  <a:spcPts val="0"/>
+                </a:spcBef>
+                <a:spcAft>
+                  <a:spcPts val="0"/>
+                </a:spcAft>
+              </a:pPr>
+              <a:r>
+                <a:rPr lang="en-US" sz="1600" kern="0" dirty="0" smtClean="0">
+                  <a:solidFill>
+                    <a:schemeClr val="bg1"/>
+                  </a:solidFill>
+                  <a:latin typeface="Tahoma"/>
+                </a:rPr>
+                <a:t>VM-id2</a:t>
+              </a:r>
+              <a:endParaRPr lang="en-US" sz="1600" kern="0" dirty="0">
+                <a:solidFill>
+                  <a:schemeClr val="bg1"/>
+                </a:solidFill>
+                <a:latin typeface="Tahoma"/>
+              </a:endParaRPr>
+            </a:p>
+          </p:txBody>
+        </p:sp>
+        <p:sp>
+          <p:nvSpPr>
+            <p:cNvPr id="42" name="Rounded Rectangle 41"/>
+            <p:cNvSpPr/>
+            <p:nvPr/>
+          </p:nvSpPr>
+          <p:spPr>
+            <a:xfrm>
+              <a:off x="735109" y="1600070"/>
+              <a:ext cx="1952385" cy="695158"/>
+            </a:xfrm>
+            <a:prstGeom prst="roundRect">
+              <a:avLst>
+                <a:gd name="adj" fmla="val 0"/>
+              </a:avLst>
+            </a:prstGeom>
+            <a:solidFill>
+              <a:srgbClr val="E68F00"/>
+            </a:solidFill>
+            <a:ln w="6350" cap="flat" cmpd="sng" algn="ctr">
+              <a:noFill/>
+              <a:prstDash val="solid"/>
+              <a:round/>
+              <a:headEnd type="none" w="med" len="med"/>
+              <a:tailEnd type="none" w="med" len="med"/>
+            </a:ln>
+            <a:effectLst>
+              <a:outerShdw blurRad="190500" dist="25400" dir="2700000">
+                <a:srgbClr val="000000">
+                  <a:alpha val="43000"/>
+                </a:srgbClr>
+              </a:outerShdw>
+            </a:effectLst>
+          </p:spPr>
+          <p:txBody>
+            <a:bodyPr rtlCol="0" anchor="ctr"/>
+            <a:lstStyle/>
+            <a:p>
+              <a:pPr algn="ctr"/>
+              <a:r>
+                <a:rPr lang="en-US" kern="0" dirty="0" smtClean="0">
+                  <a:solidFill>
+                    <a:schemeClr val="bg1"/>
+                  </a:solidFill>
+                  <a:latin typeface="Tahoma"/>
+                </a:rPr>
+                <a:t>EMS</a:t>
+              </a:r>
+              <a:endParaRPr lang="en-US" kern="0" dirty="0">
+                <a:solidFill>
+                  <a:schemeClr val="bg1"/>
+                </a:solidFill>
+                <a:latin typeface="Tahoma"/>
+              </a:endParaRPr>
+            </a:p>
+          </p:txBody>
+        </p:sp>
+      </p:grpSp>
+      <p:cxnSp>
+        <p:nvCxnSpPr>
+          <p:cNvPr id="44" name="Elbow Connector 21"/>
+          <p:cNvCxnSpPr>
+            <a:stCxn id="16" idx="3"/>
+            <a:endCxn id="38" idx="3"/>
+          </p:cNvCxnSpPr>
+          <p:nvPr/>
+        </p:nvCxnSpPr>
+        <p:spPr>
+          <a:xfrm flipH="1" flipV="1">
+            <a:off x="2642135" y="2108129"/>
+            <a:ext cx="1427353" cy="5597"/>
+          </a:xfrm>
+          <a:prstGeom prst="straightConnector1">
+            <a:avLst/>
+          </a:prstGeom>
+          <a:ln w="57150">
+            <a:solidFill>
+              <a:srgbClr val="E68F00"/>
+            </a:solidFill>
+            <a:headEnd type="triangle" w="med" len="med"/>
+            <a:tailEnd type="triangle" w="med" len="med"/>
+          </a:ln>
+        </p:spPr>
+        <p:style>
+          <a:lnRef idx="2">
+            <a:schemeClr val="accent4"/>
+          </a:lnRef>
+          <a:fillRef idx="1">
+            <a:schemeClr val="lt1"/>
+          </a:fillRef>
+          <a:effectRef idx="0">
+            <a:schemeClr val="accent4"/>
+          </a:effectRef>
+          <a:fontRef idx="minor">
+            <a:schemeClr val="dk1"/>
+          </a:fontRef>
+        </p:style>
+      </p:cxnSp>
+      <p:sp>
+        <p:nvSpPr>
+          <p:cNvPr id="47" name="Can 46"/>
+          <p:cNvSpPr/>
+          <p:nvPr/>
+        </p:nvSpPr>
+        <p:spPr>
+          <a:xfrm rot="5400000">
+            <a:off x="4674972" y="3589636"/>
+            <a:ext cx="383252" cy="1594223"/>
+          </a:xfrm>
+          <a:prstGeom prst="can">
+            <a:avLst/>
+          </a:prstGeom>
+          <a:solidFill>
+            <a:schemeClr val="bg1"/>
+          </a:solidFill>
+          <a:ln w="6350" cap="flat" cmpd="sng" algn="ctr">
+            <a:solidFill>
+              <a:schemeClr val="tx1">
+                <a:lumMod val="65000"/>
+                <a:lumOff val="35000"/>
+              </a:schemeClr>
+            </a:solidFill>
+            <a:prstDash val="solid"/>
+            <a:round/>
+            <a:headEnd type="none" w="med" len="med"/>
+            <a:tailEnd type="none" w="med" len="med"/>
+          </a:ln>
+          <a:effectLst>
+            <a:outerShdw blurRad="190500" dist="25400" dir="2700000">
+              <a:srgbClr val="000000">
+                <a:alpha val="43000"/>
+              </a:srgbClr>
+            </a:outerShdw>
+          </a:effectLst>
+        </p:spPr>
+        <p:txBody>
+          <a:bodyPr vert="vert270" rtlCol="0" anchor="ctr"/>
+          <a:lstStyle/>
+          <a:p>
+            <a:pPr marL="0" marR="0" indent="0" algn="ctr" defTabSz="914400" eaLnBrk="1" fontAlgn="auto" latinLnBrk="0" hangingPunct="1">
+              <a:lnSpc>
+                <a:spcPct val="100000"/>
+              </a:lnSpc>
+              <a:spcBef>
+                <a:spcPts val="0"/>
+              </a:spcBef>
+              <a:spcAft>
+                <a:spcPts val="0"/>
+              </a:spcAft>
+              <a:buClrTx/>
+              <a:buSzTx/>
+              <a:buFontTx/>
+              <a:buNone/>
+              <a:tabLst/>
+            </a:pPr>
+            <a:r>
+              <a:rPr kumimoji="0" lang="en-US" sz="1800" b="0" i="0" u="none" strike="noStrike" kern="0" cap="none" spc="0" normalizeH="0" baseline="0" noProof="0" dirty="0" smtClean="0">
+                <a:ln>
+                  <a:noFill/>
+                </a:ln>
+                <a:solidFill>
+                  <a:srgbClr val="000000"/>
+                </a:solidFill>
+                <a:effectLst/>
+                <a:uLnTx/>
+                <a:uFillTx/>
+                <a:latin typeface="Tahoma"/>
+                <a:ea typeface="+mn-ea"/>
+                <a:cs typeface="+mn-cs"/>
+              </a:rPr>
+              <a:t>vm-id2</a:t>
+            </a:r>
+            <a:endParaRPr kumimoji="0" lang="en-US" sz="1800" b="0" i="0" u="none" strike="noStrike" kern="0" cap="none" spc="0" normalizeH="0" baseline="0" noProof="0" dirty="0">
+              <a:ln>
+                <a:noFill/>
+              </a:ln>
+              <a:solidFill>
+                <a:srgbClr val="000000"/>
+              </a:solidFill>
+              <a:effectLst/>
+              <a:uLnTx/>
+              <a:uFillTx/>
+              <a:latin typeface="Tahoma"/>
+              <a:ea typeface="+mn-ea"/>
+              <a:cs typeface="+mn-cs"/>
+            </a:endParaRPr>
+          </a:p>
+        </p:txBody>
+      </p:sp>
+      <p:cxnSp>
+        <p:nvCxnSpPr>
+          <p:cNvPr id="48" name="Elbow Connector 21"/>
+          <p:cNvCxnSpPr>
+            <a:stCxn id="15" idx="1"/>
+            <a:endCxn id="47" idx="1"/>
+          </p:cNvCxnSpPr>
+          <p:nvPr/>
+        </p:nvCxnSpPr>
+        <p:spPr>
+          <a:xfrm flipH="1">
+            <a:off x="5663710" y="3160266"/>
+            <a:ext cx="1200101" cy="1226482"/>
+          </a:xfrm>
+          <a:prstGeom prst="straightConnector1">
+            <a:avLst/>
+          </a:prstGeom>
+          <a:ln w="57150">
+            <a:solidFill>
+              <a:srgbClr val="E68F00"/>
+            </a:solidFill>
+            <a:headEnd type="triangle" w="med" len="med"/>
+            <a:tailEnd type="triangle" w="med" len="med"/>
+          </a:ln>
+        </p:spPr>
+        <p:style>
+          <a:lnRef idx="2">
+            <a:schemeClr val="accent4"/>
+          </a:lnRef>
+          <a:fillRef idx="1">
+            <a:schemeClr val="lt1"/>
+          </a:fillRef>
+          <a:effectRef idx="0">
+            <a:schemeClr val="accent4"/>
+          </a:effectRef>
+          <a:fontRef idx="minor">
+            <a:schemeClr val="dk1"/>
+          </a:fontRef>
+        </p:style>
+      </p:cxnSp>
+      <p:cxnSp>
+        <p:nvCxnSpPr>
+          <p:cNvPr id="51" name="Elbow Connector 21"/>
+          <p:cNvCxnSpPr>
+            <a:stCxn id="47" idx="3"/>
+            <a:endCxn id="42" idx="3"/>
+          </p:cNvCxnSpPr>
+          <p:nvPr/>
+        </p:nvCxnSpPr>
+        <p:spPr>
+          <a:xfrm flipH="1" flipV="1">
+            <a:off x="2642135" y="4369810"/>
+            <a:ext cx="1427352" cy="16938"/>
+          </a:xfrm>
+          <a:prstGeom prst="straightConnector1">
+            <a:avLst/>
+          </a:prstGeom>
+          <a:ln w="57150">
+            <a:solidFill>
+              <a:srgbClr val="E68F00"/>
+            </a:solidFill>
+            <a:headEnd type="triangle" w="med" len="med"/>
+            <a:tailEnd type="triangle" w="med" len="med"/>
+          </a:ln>
+        </p:spPr>
+        <p:style>
+          <a:lnRef idx="2">
+            <a:schemeClr val="accent4"/>
+          </a:lnRef>
+          <a:fillRef idx="1">
+            <a:schemeClr val="lt1"/>
+          </a:fillRef>
+          <a:effectRef idx="0">
+            <a:schemeClr val="accent4"/>
+          </a:effectRef>
+          <a:fontRef idx="minor">
+            <a:schemeClr val="dk1"/>
+          </a:fontRef>
+        </p:style>
+      </p:cxnSp>
+    </p:spTree>
+    <p:extLst>
+      <p:ext uri="{BB962C8B-B14F-4D97-AF65-F5344CB8AC3E}">
+        <p14:creationId xmlns:p14="http://schemas.microsoft.com/office/powerpoint/2010/main" val="3785833991"/>
       </p:ext>
     </p:extLst>
   </p:cSld>

</xml_diff>

<commit_message>
Fix: fix images with RabbitMQ
</commit_message>
<xml_diff>
--- a/docs/images/openbaton-stencils.pptx
+++ b/docs/images/openbaton-stencils.pptx
@@ -112,6 +112,22 @@
       </a:defRPr>
     </a:lvl9pPr>
   </p:defaultTextStyle>
+  <p:extLst>
+    <p:ext uri="{EFAFB233-063F-42B5-8137-9DF3F51BA10A}">
+      <p15:sldGuideLst xmlns:p15="http://schemas.microsoft.com/office/powerpoint/2012/main">
+        <p15:guide id="1" orient="horz" pos="2160">
+          <p15:clr>
+            <a:srgbClr val="A4A3A4"/>
+          </p15:clr>
+        </p15:guide>
+        <p15:guide id="2" pos="2880">
+          <p15:clr>
+            <a:srgbClr val="A4A3A4"/>
+          </p15:clr>
+        </p15:guide>
+      </p15:sldGuideLst>
+    </p:ext>
+  </p:extLst>
 </p:presentation>
 </file>
 
@@ -296,7 +312,7 @@
           <a:p>
             <a:fld id="{14A7C45A-EC31-C341-BCBA-1394489C9760}" type="datetimeFigureOut">
               <a:rPr lang="en-US" smtClean="0"/>
-              <a:t>21/10/15</a:t>
+              <a:t>7/14/16</a:t>
             </a:fld>
             <a:endParaRPr lang="en-US"/>
           </a:p>
@@ -466,7 +482,7 @@
           <a:p>
             <a:fld id="{14A7C45A-EC31-C341-BCBA-1394489C9760}" type="datetimeFigureOut">
               <a:rPr lang="en-US" smtClean="0"/>
-              <a:t>21/10/15</a:t>
+              <a:t>7/14/16</a:t>
             </a:fld>
             <a:endParaRPr lang="en-US"/>
           </a:p>
@@ -646,7 +662,7 @@
           <a:p>
             <a:fld id="{14A7C45A-EC31-C341-BCBA-1394489C9760}" type="datetimeFigureOut">
               <a:rPr lang="en-US" smtClean="0"/>
-              <a:t>21/10/15</a:t>
+              <a:t>7/14/16</a:t>
             </a:fld>
             <a:endParaRPr lang="en-US"/>
           </a:p>
@@ -816,7 +832,7 @@
           <a:p>
             <a:fld id="{14A7C45A-EC31-C341-BCBA-1394489C9760}" type="datetimeFigureOut">
               <a:rPr lang="en-US" smtClean="0"/>
-              <a:t>21/10/15</a:t>
+              <a:t>7/14/16</a:t>
             </a:fld>
             <a:endParaRPr lang="en-US"/>
           </a:p>
@@ -1062,7 +1078,7 @@
           <a:p>
             <a:fld id="{14A7C45A-EC31-C341-BCBA-1394489C9760}" type="datetimeFigureOut">
               <a:rPr lang="en-US" smtClean="0"/>
-              <a:t>21/10/15</a:t>
+              <a:t>7/14/16</a:t>
             </a:fld>
             <a:endParaRPr lang="en-US"/>
           </a:p>
@@ -1350,7 +1366,7 @@
           <a:p>
             <a:fld id="{14A7C45A-EC31-C341-BCBA-1394489C9760}" type="datetimeFigureOut">
               <a:rPr lang="en-US" smtClean="0"/>
-              <a:t>21/10/15</a:t>
+              <a:t>7/14/16</a:t>
             </a:fld>
             <a:endParaRPr lang="en-US"/>
           </a:p>
@@ -1772,7 +1788,7 @@
           <a:p>
             <a:fld id="{14A7C45A-EC31-C341-BCBA-1394489C9760}" type="datetimeFigureOut">
               <a:rPr lang="en-US" smtClean="0"/>
-              <a:t>21/10/15</a:t>
+              <a:t>7/14/16</a:t>
             </a:fld>
             <a:endParaRPr lang="en-US"/>
           </a:p>
@@ -1890,7 +1906,7 @@
           <a:p>
             <a:fld id="{14A7C45A-EC31-C341-BCBA-1394489C9760}" type="datetimeFigureOut">
               <a:rPr lang="en-US" smtClean="0"/>
-              <a:t>21/10/15</a:t>
+              <a:t>7/14/16</a:t>
             </a:fld>
             <a:endParaRPr lang="en-US"/>
           </a:p>
@@ -1985,7 +2001,7 @@
           <a:p>
             <a:fld id="{14A7C45A-EC31-C341-BCBA-1394489C9760}" type="datetimeFigureOut">
               <a:rPr lang="en-US" smtClean="0"/>
-              <a:t>21/10/15</a:t>
+              <a:t>7/14/16</a:t>
             </a:fld>
             <a:endParaRPr lang="en-US"/>
           </a:p>
@@ -2262,7 +2278,7 @@
           <a:p>
             <a:fld id="{14A7C45A-EC31-C341-BCBA-1394489C9760}" type="datetimeFigureOut">
               <a:rPr lang="en-US" smtClean="0"/>
-              <a:t>21/10/15</a:t>
+              <a:t>7/14/16</a:t>
             </a:fld>
             <a:endParaRPr lang="en-US"/>
           </a:p>
@@ -2515,7 +2531,7 @@
           <a:p>
             <a:fld id="{14A7C45A-EC31-C341-BCBA-1394489C9760}" type="datetimeFigureOut">
               <a:rPr lang="en-US" smtClean="0"/>
-              <a:t>21/10/15</a:t>
+              <a:t>7/14/16</a:t>
             </a:fld>
             <a:endParaRPr lang="en-US"/>
           </a:p>
@@ -2728,7 +2744,7 @@
           <a:p>
             <a:fld id="{14A7C45A-EC31-C341-BCBA-1394489C9760}" type="datetimeFigureOut">
               <a:rPr lang="en-US" smtClean="0"/>
-              <a:t>21/10/15</a:t>
+              <a:t>7/14/16</a:t>
             </a:fld>
             <a:endParaRPr lang="en-US"/>
           </a:p>
@@ -13289,8 +13305,8 @@
         </p:nvSpPr>
         <p:spPr>
           <a:xfrm>
-            <a:off x="3057123" y="780708"/>
-            <a:ext cx="2162611" cy="2213164"/>
+            <a:off x="2541319" y="780708"/>
+            <a:ext cx="3063834" cy="2213164"/>
           </a:xfrm>
           <a:prstGeom prst="roundRect">
             <a:avLst>
@@ -13328,7 +13344,7 @@
               </a:spcAft>
             </a:pPr>
             <a:r>
-              <a:rPr lang="en-US" sz="1400" kern="0" dirty="0" smtClean="0">
+              <a:rPr lang="en-US" sz="1400" kern="0" dirty="0">
                 <a:solidFill>
                   <a:prstClr val="black">
                     <a:lumMod val="85000"/>
@@ -13338,7 +13354,7 @@
                 <a:latin typeface="Tahoma"/>
                 <a:ea typeface="ＭＳ Ｐゴシック" pitchFamily="46" charset="-128"/>
               </a:rPr>
-              <a:t>JMS Queues</a:t>
+              <a:t>Rabbit AMQP</a:t>
             </a:r>
             <a:endParaRPr lang="en-US" sz="1400" kern="0" dirty="0">
               <a:solidFill>
@@ -13361,7 +13377,7 @@
         </p:nvGrpSpPr>
         <p:grpSpPr>
           <a:xfrm>
-            <a:off x="764897" y="1111394"/>
+            <a:off x="384887" y="1180659"/>
             <a:ext cx="1620510" cy="1049808"/>
             <a:chOff x="6842942" y="1914255"/>
             <a:chExt cx="1620510" cy="1049808"/>
@@ -13463,8 +13479,8 @@
         </p:nvSpPr>
         <p:spPr>
           <a:xfrm rot="16200000" flipH="1">
-            <a:off x="3971916" y="633378"/>
-            <a:ext cx="383252" cy="1594223"/>
+            <a:off x="4717964" y="1273729"/>
+            <a:ext cx="383252" cy="863668"/>
           </a:xfrm>
           <a:prstGeom prst="can">
             <a:avLst/>
@@ -13540,8 +13556,8 @@
         </p:nvCxnSpPr>
         <p:spPr>
           <a:xfrm>
-            <a:off x="4960654" y="1430490"/>
-            <a:ext cx="980709" cy="275073"/>
+            <a:off x="5341424" y="1705563"/>
+            <a:ext cx="599939" cy="0"/>
           </a:xfrm>
           <a:prstGeom prst="straightConnector1">
             <a:avLst/>
@@ -13550,7 +13566,7 @@
             <a:solidFill>
               <a:srgbClr val="E68F00"/>
             </a:solidFill>
-            <a:headEnd type="none" w="med" len="med"/>
+            <a:headEnd type="triangle" w="med" len="med"/>
             <a:tailEnd type="triangle" w="med" len="med"/>
           </a:ln>
         </p:spPr>
@@ -13624,80 +13640,6 @@
           </a:p>
         </p:txBody>
       </p:sp>
-      <p:sp>
-        <p:nvSpPr>
-          <p:cNvPr id="16" name="Can 15"/>
-          <p:cNvSpPr/>
-          <p:nvPr/>
-        </p:nvSpPr>
-        <p:spPr>
-          <a:xfrm rot="5400000">
-            <a:off x="3971915" y="1281805"/>
-            <a:ext cx="383252" cy="1594223"/>
-          </a:xfrm>
-          <a:prstGeom prst="can">
-            <a:avLst/>
-          </a:prstGeom>
-          <a:solidFill>
-            <a:schemeClr val="bg1"/>
-          </a:solidFill>
-          <a:ln w="6350" cap="flat" cmpd="sng" algn="ctr">
-            <a:solidFill>
-              <a:schemeClr val="tx1">
-                <a:lumMod val="65000"/>
-                <a:lumOff val="35000"/>
-              </a:schemeClr>
-            </a:solidFill>
-            <a:prstDash val="solid"/>
-            <a:round/>
-            <a:headEnd type="none" w="med" len="med"/>
-            <a:tailEnd type="none" w="med" len="med"/>
-          </a:ln>
-          <a:effectLst>
-            <a:outerShdw blurRad="190500" dist="25400" dir="2700000">
-              <a:srgbClr val="000000">
-                <a:alpha val="43000"/>
-              </a:srgbClr>
-            </a:outerShdw>
-          </a:effectLst>
-        </p:spPr>
-        <p:txBody>
-          <a:bodyPr rtlCol="0" anchor="ctr"/>
-          <a:lstStyle/>
-          <a:p>
-            <a:pPr marL="0" marR="0" indent="0" algn="ctr" defTabSz="914400" eaLnBrk="1" fontAlgn="auto" latinLnBrk="0" hangingPunct="1">
-              <a:lnSpc>
-                <a:spcPct val="100000"/>
-              </a:lnSpc>
-              <a:spcBef>
-                <a:spcPts val="0"/>
-              </a:spcBef>
-              <a:spcAft>
-                <a:spcPts val="0"/>
-              </a:spcAft>
-              <a:buClrTx/>
-              <a:buSzTx/>
-              <a:buFontTx/>
-              <a:buNone/>
-              <a:tabLst/>
-            </a:pPr>
-            <a:endParaRPr kumimoji="0" lang="en-US" sz="1800" b="0" i="0" u="none" strike="noStrike" kern="0" cap="none" spc="0" normalizeH="0" baseline="0" noProof="0">
-              <a:ln>
-                <a:noFill/>
-              </a:ln>
-              <a:solidFill>
-                <a:sysClr val="window" lastClr="FFFFFF"/>
-              </a:solidFill>
-              <a:effectLst/>
-              <a:uLnTx/>
-              <a:uFillTx/>
-              <a:latin typeface="Tahoma"/>
-              <a:ea typeface="+mn-ea"/>
-              <a:cs typeface="+mn-cs"/>
-            </a:endParaRPr>
-          </a:p>
-        </p:txBody>
-      </p:sp>
       <p:cxnSp>
         <p:nvCxnSpPr>
           <p:cNvPr id="19" name="Elbow Connector 21"/>
@@ -13708,8 +13650,8 @@
         </p:nvCxnSpPr>
         <p:spPr>
           <a:xfrm flipV="1">
-            <a:off x="2385407" y="1430490"/>
-            <a:ext cx="981022" cy="205808"/>
+            <a:off x="2005397" y="1705562"/>
+            <a:ext cx="863668" cy="1"/>
           </a:xfrm>
           <a:prstGeom prst="straightConnector1">
             <a:avLst/>
@@ -13718,7 +13660,7 @@
             <a:solidFill>
               <a:srgbClr val="E68F00"/>
             </a:solidFill>
-            <a:headEnd type="none" w="med" len="med"/>
+            <a:headEnd type="triangle" w="med" len="med"/>
             <a:tailEnd type="triangle" w="med" len="med"/>
           </a:ln>
         </p:spPr>
@@ -13737,19 +13679,78 @@
           </a:fontRef>
         </p:style>
       </p:cxnSp>
+      <p:sp>
+        <p:nvSpPr>
+          <p:cNvPr id="18" name="Can 17"/>
+          <p:cNvSpPr/>
+          <p:nvPr/>
+        </p:nvSpPr>
+        <p:spPr>
+          <a:xfrm>
+            <a:off x="2869065" y="1570836"/>
+            <a:ext cx="630925" cy="269453"/>
+          </a:xfrm>
+          <a:prstGeom prst="can">
+            <a:avLst>
+              <a:gd name="adj" fmla="val 50000"/>
+            </a:avLst>
+          </a:prstGeom>
+          <a:gradFill>
+            <a:gsLst>
+              <a:gs pos="100000">
+                <a:schemeClr val="bg1"/>
+              </a:gs>
+              <a:gs pos="100000">
+                <a:schemeClr val="accent1">
+                  <a:tint val="50000"/>
+                  <a:shade val="100000"/>
+                  <a:satMod val="350000"/>
+                </a:schemeClr>
+              </a:gs>
+            </a:gsLst>
+          </a:gradFill>
+          <a:ln>
+            <a:solidFill>
+              <a:schemeClr val="tx1"/>
+            </a:solidFill>
+          </a:ln>
+        </p:spPr>
+        <p:style>
+          <a:lnRef idx="1">
+            <a:schemeClr val="accent1"/>
+          </a:lnRef>
+          <a:fillRef idx="3">
+            <a:schemeClr val="accent1"/>
+          </a:fillRef>
+          <a:effectRef idx="2">
+            <a:schemeClr val="accent1"/>
+          </a:effectRef>
+          <a:fontRef idx="minor">
+            <a:schemeClr val="lt1"/>
+          </a:fontRef>
+        </p:style>
+        <p:txBody>
+          <a:bodyPr rtlCol="0" anchor="ctr"/>
+          <a:lstStyle/>
+          <a:p>
+            <a:pPr algn="ctr"/>
+            <a:endParaRPr lang="en-US"/>
+          </a:p>
+        </p:txBody>
+      </p:sp>
       <p:cxnSp>
         <p:nvCxnSpPr>
-          <p:cNvPr id="22" name="Elbow Connector 21"/>
+          <p:cNvPr id="24" name="Elbow Connector 21"/>
           <p:cNvCxnSpPr>
-            <a:stCxn id="16" idx="3"/>
-            <a:endCxn id="3" idx="3"/>
+            <a:stCxn id="18" idx="4"/>
+            <a:endCxn id="9" idx="1"/>
           </p:cNvCxnSpPr>
           <p:nvPr/>
         </p:nvCxnSpPr>
         <p:spPr>
-          <a:xfrm flipH="1" flipV="1">
-            <a:off x="2385407" y="1636298"/>
-            <a:ext cx="981023" cy="442619"/>
+          <a:xfrm>
+            <a:off x="3499990" y="1705563"/>
+            <a:ext cx="977766" cy="0"/>
           </a:xfrm>
           <a:prstGeom prst="straightConnector1">
             <a:avLst/>
@@ -13758,7 +13759,7 @@
             <a:solidFill>
               <a:srgbClr val="E68F00"/>
             </a:solidFill>
-            <a:headEnd type="none" w="med" len="med"/>
+            <a:headEnd type="triangle" w="med" len="med"/>
             <a:tailEnd type="triangle" w="med" len="med"/>
           </a:ln>
         </p:spPr>
@@ -13777,46 +13778,66 @@
           </a:fontRef>
         </p:style>
       </p:cxnSp>
-      <p:cxnSp>
-        <p:nvCxnSpPr>
-          <p:cNvPr id="25" name="Elbow Connector 21"/>
-          <p:cNvCxnSpPr>
-            <a:stCxn id="15" idx="1"/>
-            <a:endCxn id="16" idx="1"/>
-          </p:cNvCxnSpPr>
-          <p:nvPr/>
-        </p:nvCxnSpPr>
-        <p:spPr>
-          <a:xfrm flipH="1">
-            <a:off x="4960653" y="1705563"/>
-            <a:ext cx="980710" cy="373354"/>
-          </a:xfrm>
-          <a:prstGeom prst="straightConnector1">
-            <a:avLst/>
-          </a:prstGeom>
-          <a:ln w="57150">
-            <a:solidFill>
-              <a:srgbClr val="E68F00"/>
-            </a:solidFill>
-            <a:headEnd type="none" w="med" len="med"/>
-            <a:tailEnd type="triangle" w="med" len="med"/>
-          </a:ln>
-        </p:spPr>
-        <p:style>
-          <a:lnRef idx="2">
-            <a:schemeClr val="accent4"/>
-          </a:lnRef>
-          <a:fillRef idx="1">
-            <a:schemeClr val="lt1"/>
-          </a:fillRef>
-          <a:effectRef idx="0">
-            <a:schemeClr val="accent4"/>
-          </a:effectRef>
-          <a:fontRef idx="minor">
-            <a:schemeClr val="dk1"/>
-          </a:fontRef>
-        </p:style>
-      </p:cxnSp>
+      <p:sp>
+        <p:nvSpPr>
+          <p:cNvPr id="26" name="TextBox 25"/>
+          <p:cNvSpPr txBox="1"/>
+          <p:nvPr/>
+        </p:nvSpPr>
+        <p:spPr>
+          <a:xfrm>
+            <a:off x="2700499" y="1887290"/>
+            <a:ext cx="1072768" cy="369332"/>
+          </a:xfrm>
+          <a:prstGeom prst="rect">
+            <a:avLst/>
+          </a:prstGeom>
+          <a:noFill/>
+        </p:spPr>
+        <p:txBody>
+          <a:bodyPr wrap="square" rtlCol="0">
+            <a:spAutoFit/>
+          </a:bodyPr>
+          <a:lstStyle/>
+          <a:p>
+            <a:r>
+              <a:rPr lang="en-US" smtClean="0"/>
+              <a:t>exchange</a:t>
+            </a:r>
+            <a:endParaRPr lang="en-US" dirty="0"/>
+          </a:p>
+        </p:txBody>
+      </p:sp>
+      <p:sp>
+        <p:nvSpPr>
+          <p:cNvPr id="29" name="TextBox 28"/>
+          <p:cNvSpPr txBox="1"/>
+          <p:nvPr/>
+        </p:nvSpPr>
+        <p:spPr>
+          <a:xfrm>
+            <a:off x="4477756" y="1891440"/>
+            <a:ext cx="978540" cy="369332"/>
+          </a:xfrm>
+          <a:prstGeom prst="rect">
+            <a:avLst/>
+          </a:prstGeom>
+          <a:noFill/>
+        </p:spPr>
+        <p:txBody>
+          <a:bodyPr wrap="square" rtlCol="0">
+            <a:spAutoFit/>
+          </a:bodyPr>
+          <a:lstStyle/>
+          <a:p>
+            <a:r>
+              <a:rPr lang="en-US" smtClean="0"/>
+              <a:t>queue</a:t>
+            </a:r>
+            <a:endParaRPr lang="en-US" dirty="0"/>
+          </a:p>
+        </p:txBody>
+      </p:sp>
     </p:spTree>
     <p:extLst>
       <p:ext uri="{BB962C8B-B14F-4D97-AF65-F5344CB8AC3E}">
@@ -13855,8 +13876,8 @@
         </p:nvSpPr>
         <p:spPr>
           <a:xfrm>
-            <a:off x="3879347" y="1398968"/>
-            <a:ext cx="2162611" cy="4072078"/>
+            <a:off x="3455719" y="1398968"/>
+            <a:ext cx="2586239" cy="4072078"/>
           </a:xfrm>
           <a:prstGeom prst="roundRect">
             <a:avLst>
@@ -13904,7 +13925,7 @@
                 <a:latin typeface="Tahoma"/>
                 <a:ea typeface="ＭＳ Ｐゴシック" pitchFamily="46" charset="-128"/>
               </a:rPr>
-              <a:t>JMS Queues</a:t>
+              <a:t>Rabbit AMQP</a:t>
             </a:r>
             <a:endParaRPr lang="en-US" sz="1400" kern="0" dirty="0">
               <a:solidFill>
@@ -13982,8 +14003,8 @@
         </p:nvSpPr>
         <p:spPr>
           <a:xfrm rot="5400000">
-            <a:off x="4674973" y="1316614"/>
-            <a:ext cx="383252" cy="1594223"/>
+            <a:off x="3762857" y="1609366"/>
+            <a:ext cx="383252" cy="997528"/>
           </a:xfrm>
           <a:prstGeom prst="can">
             <a:avLst/>
@@ -14070,14 +14091,14 @@
           <p:cNvPr id="25" name="Elbow Connector 21"/>
           <p:cNvCxnSpPr>
             <a:stCxn id="15" idx="1"/>
-            <a:endCxn id="16" idx="1"/>
+            <a:endCxn id="26" idx="4"/>
           </p:cNvCxnSpPr>
           <p:nvPr/>
         </p:nvCxnSpPr>
         <p:spPr>
-          <a:xfrm flipH="1" flipV="1">
-            <a:off x="5663711" y="2113726"/>
-            <a:ext cx="1200100" cy="1046540"/>
+          <a:xfrm flipH="1">
+            <a:off x="5821606" y="3160266"/>
+            <a:ext cx="1042205" cy="4686"/>
           </a:xfrm>
           <a:prstGeom prst="straightConnector1">
             <a:avLst/>
@@ -14623,7 +14644,7 @@
         <p:spPr>
           <a:xfrm flipH="1" flipV="1">
             <a:off x="2642135" y="2108129"/>
-            <a:ext cx="1427353" cy="5597"/>
+            <a:ext cx="813584" cy="1"/>
           </a:xfrm>
           <a:prstGeom prst="straightConnector1">
             <a:avLst/>
@@ -14659,8 +14680,8 @@
         </p:nvSpPr>
         <p:spPr>
           <a:xfrm rot="5400000">
-            <a:off x="4674972" y="3589636"/>
-            <a:ext cx="383252" cy="1594223"/>
+            <a:off x="3762857" y="3871047"/>
+            <a:ext cx="383252" cy="997528"/>
           </a:xfrm>
           <a:prstGeom prst="can">
             <a:avLst/>
@@ -14744,17 +14765,146 @@
       </p:sp>
       <p:cxnSp>
         <p:nvCxnSpPr>
-          <p:cNvPr id="48" name="Elbow Connector 21"/>
+          <p:cNvPr id="51" name="Elbow Connector 21"/>
           <p:cNvCxnSpPr>
-            <a:stCxn id="15" idx="1"/>
+            <a:stCxn id="47" idx="3"/>
+            <a:endCxn id="42" idx="3"/>
+          </p:cNvCxnSpPr>
+          <p:nvPr/>
+        </p:nvCxnSpPr>
+        <p:spPr>
+          <a:xfrm flipH="1" flipV="1">
+            <a:off x="2642135" y="4369810"/>
+            <a:ext cx="813584" cy="1"/>
+          </a:xfrm>
+          <a:prstGeom prst="straightConnector1">
+            <a:avLst/>
+          </a:prstGeom>
+          <a:ln w="57150">
+            <a:solidFill>
+              <a:srgbClr val="E68F00"/>
+            </a:solidFill>
+            <a:headEnd type="triangle" w="med" len="med"/>
+            <a:tailEnd type="triangle" w="med" len="med"/>
+          </a:ln>
+        </p:spPr>
+        <p:style>
+          <a:lnRef idx="2">
+            <a:schemeClr val="accent4"/>
+          </a:lnRef>
+          <a:fillRef idx="1">
+            <a:schemeClr val="lt1"/>
+          </a:fillRef>
+          <a:effectRef idx="0">
+            <a:schemeClr val="accent4"/>
+          </a:effectRef>
+          <a:fontRef idx="minor">
+            <a:schemeClr val="dk1"/>
+          </a:fontRef>
+        </p:style>
+      </p:cxnSp>
+      <p:sp>
+        <p:nvSpPr>
+          <p:cNvPr id="26" name="Can 25"/>
+          <p:cNvSpPr/>
+          <p:nvPr/>
+        </p:nvSpPr>
+        <p:spPr>
+          <a:xfrm>
+            <a:off x="5190681" y="3006725"/>
+            <a:ext cx="630925" cy="316454"/>
+          </a:xfrm>
+          <a:prstGeom prst="can">
+            <a:avLst>
+              <a:gd name="adj" fmla="val 50000"/>
+            </a:avLst>
+          </a:prstGeom>
+          <a:gradFill>
+            <a:gsLst>
+              <a:gs pos="100000">
+                <a:schemeClr val="bg1"/>
+              </a:gs>
+              <a:gs pos="100000">
+                <a:schemeClr val="accent1">
+                  <a:tint val="50000"/>
+                  <a:shade val="100000"/>
+                  <a:satMod val="350000"/>
+                </a:schemeClr>
+              </a:gs>
+            </a:gsLst>
+          </a:gradFill>
+          <a:ln>
+            <a:solidFill>
+              <a:schemeClr val="tx1"/>
+            </a:solidFill>
+          </a:ln>
+        </p:spPr>
+        <p:style>
+          <a:lnRef idx="1">
+            <a:schemeClr val="accent1"/>
+          </a:lnRef>
+          <a:fillRef idx="3">
+            <a:schemeClr val="accent1"/>
+          </a:fillRef>
+          <a:effectRef idx="2">
+            <a:schemeClr val="accent1"/>
+          </a:effectRef>
+          <a:fontRef idx="minor">
+            <a:schemeClr val="lt1"/>
+          </a:fontRef>
+        </p:style>
+        <p:txBody>
+          <a:bodyPr rtlCol="0" anchor="ctr"/>
+          <a:lstStyle/>
+          <a:p>
+            <a:pPr algn="ctr"/>
+            <a:endParaRPr lang="en-US"/>
+          </a:p>
+        </p:txBody>
+      </p:sp>
+      <p:sp>
+        <p:nvSpPr>
+          <p:cNvPr id="27" name="TextBox 26"/>
+          <p:cNvSpPr txBox="1"/>
+          <p:nvPr/>
+        </p:nvSpPr>
+        <p:spPr>
+          <a:xfrm>
+            <a:off x="4991870" y="3301426"/>
+            <a:ext cx="1072768" cy="369332"/>
+          </a:xfrm>
+          <a:prstGeom prst="rect">
+            <a:avLst/>
+          </a:prstGeom>
+          <a:noFill/>
+        </p:spPr>
+        <p:txBody>
+          <a:bodyPr wrap="square" rtlCol="0">
+            <a:spAutoFit/>
+          </a:bodyPr>
+          <a:lstStyle/>
+          <a:p>
+            <a:r>
+              <a:rPr lang="en-US" smtClean="0"/>
+              <a:t>exchange</a:t>
+            </a:r>
+            <a:endParaRPr lang="en-US" dirty="0"/>
+          </a:p>
+        </p:txBody>
+      </p:sp>
+      <p:cxnSp>
+        <p:nvCxnSpPr>
+          <p:cNvPr id="30" name="Elbow Connector 21"/>
+          <p:cNvCxnSpPr>
+            <a:stCxn id="26" idx="2"/>
             <a:endCxn id="47" idx="1"/>
           </p:cNvCxnSpPr>
           <p:nvPr/>
         </p:nvCxnSpPr>
         <p:spPr>
           <a:xfrm flipH="1">
-            <a:off x="5663710" y="3160266"/>
-            <a:ext cx="1200101" cy="1226482"/>
+            <a:off x="4453247" y="3164952"/>
+            <a:ext cx="737434" cy="1204859"/>
           </a:xfrm>
           <a:prstGeom prst="straightConnector1">
             <a:avLst/>
@@ -14784,17 +14934,17 @@
       </p:cxnSp>
       <p:cxnSp>
         <p:nvCxnSpPr>
-          <p:cNvPr id="51" name="Elbow Connector 21"/>
+          <p:cNvPr id="36" name="Elbow Connector 21"/>
           <p:cNvCxnSpPr>
-            <a:stCxn id="47" idx="3"/>
-            <a:endCxn id="42" idx="3"/>
+            <a:stCxn id="26" idx="2"/>
+            <a:endCxn id="16" idx="1"/>
           </p:cNvCxnSpPr>
           <p:nvPr/>
         </p:nvCxnSpPr>
         <p:spPr>
           <a:xfrm flipH="1" flipV="1">
-            <a:off x="2642135" y="4369810"/>
-            <a:ext cx="1427352" cy="16938"/>
+            <a:off x="4453247" y="2108130"/>
+            <a:ext cx="737434" cy="1056822"/>
           </a:xfrm>
           <a:prstGeom prst="straightConnector1">
             <a:avLst/>

</xml_diff>